<commit_message>
Change in memory layout in DOD sample
</commit_message>
<xml_diff>
--- a/Presentation/Presentation.pptx
+++ b/Presentation/Presentation.pptx
@@ -263,7 +263,7 @@
           <a:p>
             <a:fld id="{2919E1E2-61BE-4B8C-866A-656E5D301163}" type="datetimeFigureOut">
               <a:rPr lang="en-US" smtClean="0"/>
-              <a:t>8/3/2019</a:t>
+              <a:t>8/24/2019</a:t>
             </a:fld>
             <a:endParaRPr lang="en-US"/>
           </a:p>
@@ -440,7 +440,7 @@
           <a:p>
             <a:fld id="{2919E1E2-61BE-4B8C-866A-656E5D301163}" type="datetimeFigureOut">
               <a:rPr lang="en-US" smtClean="0"/>
-              <a:t>8/3/2019</a:t>
+              <a:t>8/24/2019</a:t>
             </a:fld>
             <a:endParaRPr lang="en-US"/>
           </a:p>
@@ -620,7 +620,7 @@
           <a:p>
             <a:fld id="{2919E1E2-61BE-4B8C-866A-656E5D301163}" type="datetimeFigureOut">
               <a:rPr lang="en-US" smtClean="0"/>
-              <a:t>8/3/2019</a:t>
+              <a:t>8/24/2019</a:t>
             </a:fld>
             <a:endParaRPr lang="en-US"/>
           </a:p>
@@ -1008,7 +1008,7 @@
           <a:p>
             <a:fld id="{2919E1E2-61BE-4B8C-866A-656E5D301163}" type="datetimeFigureOut">
               <a:rPr lang="en-US" smtClean="0"/>
-              <a:t>8/3/2019</a:t>
+              <a:t>8/24/2019</a:t>
             </a:fld>
             <a:endParaRPr lang="en-US"/>
           </a:p>
@@ -1240,7 +1240,7 @@
           <a:p>
             <a:fld id="{2919E1E2-61BE-4B8C-866A-656E5D301163}" type="datetimeFigureOut">
               <a:rPr lang="en-US" smtClean="0"/>
-              <a:t>8/3/2019</a:t>
+              <a:t>8/24/2019</a:t>
             </a:fld>
             <a:endParaRPr lang="en-US"/>
           </a:p>
@@ -1607,7 +1607,7 @@
           <a:p>
             <a:fld id="{2919E1E2-61BE-4B8C-866A-656E5D301163}" type="datetimeFigureOut">
               <a:rPr lang="en-US" smtClean="0"/>
-              <a:t>8/3/2019</a:t>
+              <a:t>8/24/2019</a:t>
             </a:fld>
             <a:endParaRPr lang="en-US"/>
           </a:p>
@@ -1725,7 +1725,7 @@
           <a:p>
             <a:fld id="{2919E1E2-61BE-4B8C-866A-656E5D301163}" type="datetimeFigureOut">
               <a:rPr lang="en-US" smtClean="0"/>
-              <a:t>8/3/2019</a:t>
+              <a:t>8/24/2019</a:t>
             </a:fld>
             <a:endParaRPr lang="en-US"/>
           </a:p>
@@ -1820,7 +1820,7 @@
           <a:p>
             <a:fld id="{2919E1E2-61BE-4B8C-866A-656E5D301163}" type="datetimeFigureOut">
               <a:rPr lang="en-US" smtClean="0"/>
-              <a:t>8/3/2019</a:t>
+              <a:t>8/24/2019</a:t>
             </a:fld>
             <a:endParaRPr lang="en-US"/>
           </a:p>
@@ -2097,7 +2097,7 @@
           <a:p>
             <a:fld id="{2919E1E2-61BE-4B8C-866A-656E5D301163}" type="datetimeFigureOut">
               <a:rPr lang="en-US" smtClean="0"/>
-              <a:t>8/3/2019</a:t>
+              <a:t>8/24/2019</a:t>
             </a:fld>
             <a:endParaRPr lang="en-US"/>
           </a:p>
@@ -2354,7 +2354,7 @@
           <a:p>
             <a:fld id="{2919E1E2-61BE-4B8C-866A-656E5D301163}" type="datetimeFigureOut">
               <a:rPr lang="en-US" smtClean="0"/>
-              <a:t>8/3/2019</a:t>
+              <a:t>8/24/2019</a:t>
             </a:fld>
             <a:endParaRPr lang="en-US"/>
           </a:p>
@@ -2567,7 +2567,7 @@
           <a:p>
             <a:fld id="{2919E1E2-61BE-4B8C-866A-656E5D301163}" type="datetimeFigureOut">
               <a:rPr lang="en-US" smtClean="0"/>
-              <a:t>8/3/2019</a:t>
+              <a:t>8/24/2019</a:t>
             </a:fld>
             <a:endParaRPr lang="en-US"/>
           </a:p>
@@ -3329,7 +3329,6 @@
               <a:rPr lang="en-US" dirty="0" smtClean="0"/>
               <a:t>problem?</a:t>
             </a:r>
-            <a:endParaRPr lang="en-US" dirty="0" smtClean="0"/>
           </a:p>
           <a:p>
             <a:r>
@@ -3507,7 +3506,6 @@
               <a:rPr lang="en-US" dirty="0"/>
               <a:t>Let's Discuss</a:t>
             </a:r>
-            <a:endParaRPr lang="en-US" dirty="0"/>
           </a:p>
         </p:txBody>
       </p:sp>
@@ -3550,6 +3548,1856 @@
           </a:p>
         </p:txBody>
       </p:sp>
+      <p:graphicFrame>
+        <p:nvGraphicFramePr>
+          <p:cNvPr id="4" name="Table 3"/>
+          <p:cNvGraphicFramePr>
+            <a:graphicFrameLocks noGrp="1"/>
+          </p:cNvGraphicFramePr>
+          <p:nvPr>
+            <p:extLst>
+              <p:ext uri="{D42A27DB-BD31-4B8C-83A1-F6EECF244321}">
+                <p14:modId xmlns:p14="http://schemas.microsoft.com/office/powerpoint/2010/main" val="1040444007"/>
+              </p:ext>
+            </p:extLst>
+          </p:nvPr>
+        </p:nvGraphicFramePr>
+        <p:xfrm>
+          <a:off x="838200" y="4165600"/>
+          <a:ext cx="10464804" cy="1112520"/>
+        </p:xfrm>
+        <a:graphic>
+          <a:graphicData uri="http://schemas.openxmlformats.org/drawingml/2006/table">
+            <a:tbl>
+              <a:tblPr firstRow="1" bandRow="1">
+                <a:tableStyleId>{5C22544A-7EE6-4342-B048-85BDC9FD1C3A}</a:tableStyleId>
+              </a:tblPr>
+              <a:tblGrid>
+                <a:gridCol w="1162756"/>
+                <a:gridCol w="1162756"/>
+                <a:gridCol w="1162756"/>
+                <a:gridCol w="1162756"/>
+                <a:gridCol w="1162756"/>
+                <a:gridCol w="1162756"/>
+                <a:gridCol w="1162756"/>
+                <a:gridCol w="1162756"/>
+                <a:gridCol w="1162756"/>
+              </a:tblGrid>
+              <a:tr h="370840">
+                <a:tc gridSpan="3">
+                  <a:txBody>
+                    <a:bodyPr/>
+                    <a:lstStyle/>
+                    <a:p>
+                      <a:pPr algn="ctr"/>
+                      <a:r>
+                        <a:rPr lang="en-US" dirty="0" smtClean="0"/>
+                        <a:t>Ant 1</a:t>
+                      </a:r>
+                      <a:endParaRPr lang="en-US" dirty="0"/>
+                    </a:p>
+                  </a:txBody>
+                  <a:tcPr>
+                    <a:lnL w="12700" cap="flat" cmpd="sng" algn="ctr">
+                      <a:solidFill>
+                        <a:schemeClr val="tx1"/>
+                      </a:solidFill>
+                      <a:prstDash val="solid"/>
+                      <a:round/>
+                      <a:headEnd type="none" w="med" len="med"/>
+                      <a:tailEnd type="none" w="med" len="med"/>
+                    </a:lnL>
+                    <a:lnR w="12700" cap="flat" cmpd="sng" algn="ctr">
+                      <a:solidFill>
+                        <a:schemeClr val="tx1"/>
+                      </a:solidFill>
+                      <a:prstDash val="solid"/>
+                      <a:round/>
+                      <a:headEnd type="none" w="med" len="med"/>
+                      <a:tailEnd type="none" w="med" len="med"/>
+                    </a:lnR>
+                    <a:lnT w="12700" cap="flat" cmpd="sng" algn="ctr">
+                      <a:solidFill>
+                        <a:schemeClr val="tx1"/>
+                      </a:solidFill>
+                      <a:prstDash val="solid"/>
+                      <a:round/>
+                      <a:headEnd type="none" w="med" len="med"/>
+                      <a:tailEnd type="none" w="med" len="med"/>
+                    </a:lnT>
+                    <a:lnB w="12700" cap="flat" cmpd="sng" algn="ctr">
+                      <a:solidFill>
+                        <a:schemeClr val="tx1"/>
+                      </a:solidFill>
+                      <a:prstDash val="solid"/>
+                      <a:round/>
+                      <a:headEnd type="none" w="med" len="med"/>
+                      <a:tailEnd type="none" w="med" len="med"/>
+                    </a:lnB>
+                    <a:lnTlToBr w="12700" cmpd="sng">
+                      <a:noFill/>
+                      <a:prstDash val="solid"/>
+                    </a:lnTlToBr>
+                    <a:lnBlToTr w="12700" cmpd="sng">
+                      <a:noFill/>
+                      <a:prstDash val="solid"/>
+                    </a:lnBlToTr>
+                    <a:solidFill>
+                      <a:schemeClr val="tx1">
+                        <a:lumMod val="50000"/>
+                      </a:schemeClr>
+                    </a:solidFill>
+                  </a:tcPr>
+                </a:tc>
+                <a:tc hMerge="1">
+                  <a:txBody>
+                    <a:bodyPr/>
+                    <a:lstStyle/>
+                    <a:p>
+                      <a:endParaRPr lang="en-US" dirty="0"/>
+                    </a:p>
+                  </a:txBody>
+                  <a:tcPr>
+                    <a:lnL w="12700" cap="flat" cmpd="sng" algn="ctr">
+                      <a:solidFill>
+                        <a:schemeClr val="tx1"/>
+                      </a:solidFill>
+                      <a:prstDash val="solid"/>
+                      <a:round/>
+                      <a:headEnd type="none" w="med" len="med"/>
+                      <a:tailEnd type="none" w="med" len="med"/>
+                    </a:lnL>
+                    <a:lnR w="12700" cap="flat" cmpd="sng" algn="ctr">
+                      <a:solidFill>
+                        <a:schemeClr val="tx1"/>
+                      </a:solidFill>
+                      <a:prstDash val="solid"/>
+                      <a:round/>
+                      <a:headEnd type="none" w="med" len="med"/>
+                      <a:tailEnd type="none" w="med" len="med"/>
+                    </a:lnR>
+                    <a:lnT w="12700" cap="flat" cmpd="sng" algn="ctr">
+                      <a:solidFill>
+                        <a:schemeClr val="tx1"/>
+                      </a:solidFill>
+                      <a:prstDash val="solid"/>
+                      <a:round/>
+                      <a:headEnd type="none" w="med" len="med"/>
+                      <a:tailEnd type="none" w="med" len="med"/>
+                    </a:lnT>
+                    <a:lnB w="12700" cap="flat" cmpd="sng" algn="ctr">
+                      <a:solidFill>
+                        <a:schemeClr val="tx1"/>
+                      </a:solidFill>
+                      <a:prstDash val="solid"/>
+                      <a:round/>
+                      <a:headEnd type="none" w="med" len="med"/>
+                      <a:tailEnd type="none" w="med" len="med"/>
+                    </a:lnB>
+                    <a:lnTlToBr w="12700" cmpd="sng">
+                      <a:noFill/>
+                      <a:prstDash val="solid"/>
+                    </a:lnTlToBr>
+                    <a:lnBlToTr w="12700" cmpd="sng">
+                      <a:noFill/>
+                      <a:prstDash val="solid"/>
+                    </a:lnBlToTr>
+                    <a:solidFill>
+                      <a:schemeClr val="tx1">
+                        <a:lumMod val="50000"/>
+                      </a:schemeClr>
+                    </a:solidFill>
+                  </a:tcPr>
+                </a:tc>
+                <a:tc hMerge="1">
+                  <a:txBody>
+                    <a:bodyPr/>
+                    <a:lstStyle/>
+                    <a:p>
+                      <a:endParaRPr lang="en-US" dirty="0"/>
+                    </a:p>
+                  </a:txBody>
+                  <a:tcPr>
+                    <a:lnL w="12700" cap="flat" cmpd="sng" algn="ctr">
+                      <a:solidFill>
+                        <a:schemeClr val="tx1"/>
+                      </a:solidFill>
+                      <a:prstDash val="solid"/>
+                      <a:round/>
+                      <a:headEnd type="none" w="med" len="med"/>
+                      <a:tailEnd type="none" w="med" len="med"/>
+                    </a:lnL>
+                    <a:lnR w="12700" cap="flat" cmpd="sng" algn="ctr">
+                      <a:solidFill>
+                        <a:schemeClr val="tx1"/>
+                      </a:solidFill>
+                      <a:prstDash val="solid"/>
+                      <a:round/>
+                      <a:headEnd type="none" w="med" len="med"/>
+                      <a:tailEnd type="none" w="med" len="med"/>
+                    </a:lnR>
+                    <a:lnT w="12700" cap="flat" cmpd="sng" algn="ctr">
+                      <a:solidFill>
+                        <a:schemeClr val="tx1"/>
+                      </a:solidFill>
+                      <a:prstDash val="solid"/>
+                      <a:round/>
+                      <a:headEnd type="none" w="med" len="med"/>
+                      <a:tailEnd type="none" w="med" len="med"/>
+                    </a:lnT>
+                    <a:lnB w="12700" cap="flat" cmpd="sng" algn="ctr">
+                      <a:solidFill>
+                        <a:schemeClr val="tx1"/>
+                      </a:solidFill>
+                      <a:prstDash val="solid"/>
+                      <a:round/>
+                      <a:headEnd type="none" w="med" len="med"/>
+                      <a:tailEnd type="none" w="med" len="med"/>
+                    </a:lnB>
+                    <a:lnTlToBr w="12700" cmpd="sng">
+                      <a:noFill/>
+                      <a:prstDash val="solid"/>
+                    </a:lnTlToBr>
+                    <a:lnBlToTr w="12700" cmpd="sng">
+                      <a:noFill/>
+                      <a:prstDash val="solid"/>
+                    </a:lnBlToTr>
+                    <a:solidFill>
+                      <a:schemeClr val="tx1">
+                        <a:lumMod val="50000"/>
+                      </a:schemeClr>
+                    </a:solidFill>
+                  </a:tcPr>
+                </a:tc>
+                <a:tc gridSpan="3">
+                  <a:txBody>
+                    <a:bodyPr/>
+                    <a:lstStyle/>
+                    <a:p>
+                      <a:pPr algn="ctr"/>
+                      <a:r>
+                        <a:rPr lang="en-US" dirty="0" smtClean="0"/>
+                        <a:t>Ant 2</a:t>
+                      </a:r>
+                    </a:p>
+                  </a:txBody>
+                  <a:tcPr>
+                    <a:lnL w="12700" cap="flat" cmpd="sng" algn="ctr">
+                      <a:solidFill>
+                        <a:schemeClr val="tx1"/>
+                      </a:solidFill>
+                      <a:prstDash val="solid"/>
+                      <a:round/>
+                      <a:headEnd type="none" w="med" len="med"/>
+                      <a:tailEnd type="none" w="med" len="med"/>
+                    </a:lnL>
+                    <a:lnR w="12700" cap="flat" cmpd="sng" algn="ctr">
+                      <a:solidFill>
+                        <a:schemeClr val="tx1"/>
+                      </a:solidFill>
+                      <a:prstDash val="solid"/>
+                      <a:round/>
+                      <a:headEnd type="none" w="med" len="med"/>
+                      <a:tailEnd type="none" w="med" len="med"/>
+                    </a:lnR>
+                    <a:lnT w="12700" cap="flat" cmpd="sng" algn="ctr">
+                      <a:solidFill>
+                        <a:schemeClr val="tx1"/>
+                      </a:solidFill>
+                      <a:prstDash val="solid"/>
+                      <a:round/>
+                      <a:headEnd type="none" w="med" len="med"/>
+                      <a:tailEnd type="none" w="med" len="med"/>
+                    </a:lnT>
+                    <a:lnB w="12700" cap="flat" cmpd="sng" algn="ctr">
+                      <a:solidFill>
+                        <a:schemeClr val="tx1"/>
+                      </a:solidFill>
+                      <a:prstDash val="solid"/>
+                      <a:round/>
+                      <a:headEnd type="none" w="med" len="med"/>
+                      <a:tailEnd type="none" w="med" len="med"/>
+                    </a:lnB>
+                    <a:lnTlToBr w="12700" cmpd="sng">
+                      <a:noFill/>
+                      <a:prstDash val="solid"/>
+                    </a:lnTlToBr>
+                    <a:lnBlToTr w="12700" cmpd="sng">
+                      <a:noFill/>
+                      <a:prstDash val="solid"/>
+                    </a:lnBlToTr>
+                    <a:solidFill>
+                      <a:schemeClr val="tx1">
+                        <a:lumMod val="50000"/>
+                      </a:schemeClr>
+                    </a:solidFill>
+                  </a:tcPr>
+                </a:tc>
+                <a:tc hMerge="1">
+                  <a:txBody>
+                    <a:bodyPr/>
+                    <a:lstStyle/>
+                    <a:p>
+                      <a:endParaRPr lang="en-US" dirty="0"/>
+                    </a:p>
+                  </a:txBody>
+                  <a:tcPr>
+                    <a:lnL w="12700" cap="flat" cmpd="sng" algn="ctr">
+                      <a:solidFill>
+                        <a:schemeClr val="tx1"/>
+                      </a:solidFill>
+                      <a:prstDash val="solid"/>
+                      <a:round/>
+                      <a:headEnd type="none" w="med" len="med"/>
+                      <a:tailEnd type="none" w="med" len="med"/>
+                    </a:lnL>
+                    <a:lnR w="12700" cap="flat" cmpd="sng" algn="ctr">
+                      <a:solidFill>
+                        <a:schemeClr val="tx1"/>
+                      </a:solidFill>
+                      <a:prstDash val="solid"/>
+                      <a:round/>
+                      <a:headEnd type="none" w="med" len="med"/>
+                      <a:tailEnd type="none" w="med" len="med"/>
+                    </a:lnR>
+                    <a:lnT w="12700" cap="flat" cmpd="sng" algn="ctr">
+                      <a:solidFill>
+                        <a:schemeClr val="tx1"/>
+                      </a:solidFill>
+                      <a:prstDash val="solid"/>
+                      <a:round/>
+                      <a:headEnd type="none" w="med" len="med"/>
+                      <a:tailEnd type="none" w="med" len="med"/>
+                    </a:lnT>
+                    <a:lnB w="12700" cap="flat" cmpd="sng" algn="ctr">
+                      <a:solidFill>
+                        <a:schemeClr val="tx1"/>
+                      </a:solidFill>
+                      <a:prstDash val="solid"/>
+                      <a:round/>
+                      <a:headEnd type="none" w="med" len="med"/>
+                      <a:tailEnd type="none" w="med" len="med"/>
+                    </a:lnB>
+                    <a:lnTlToBr w="12700" cmpd="sng">
+                      <a:noFill/>
+                      <a:prstDash val="solid"/>
+                    </a:lnTlToBr>
+                    <a:lnBlToTr w="12700" cmpd="sng">
+                      <a:noFill/>
+                      <a:prstDash val="solid"/>
+                    </a:lnBlToTr>
+                    <a:solidFill>
+                      <a:schemeClr val="tx1">
+                        <a:lumMod val="50000"/>
+                      </a:schemeClr>
+                    </a:solidFill>
+                  </a:tcPr>
+                </a:tc>
+                <a:tc hMerge="1">
+                  <a:txBody>
+                    <a:bodyPr/>
+                    <a:lstStyle/>
+                    <a:p>
+                      <a:endParaRPr lang="en-US" dirty="0"/>
+                    </a:p>
+                  </a:txBody>
+                  <a:tcPr>
+                    <a:lnL w="12700" cap="flat" cmpd="sng" algn="ctr">
+                      <a:solidFill>
+                        <a:schemeClr val="tx1"/>
+                      </a:solidFill>
+                      <a:prstDash val="solid"/>
+                      <a:round/>
+                      <a:headEnd type="none" w="med" len="med"/>
+                      <a:tailEnd type="none" w="med" len="med"/>
+                    </a:lnL>
+                    <a:lnR w="12700" cap="flat" cmpd="sng" algn="ctr">
+                      <a:solidFill>
+                        <a:schemeClr val="tx1"/>
+                      </a:solidFill>
+                      <a:prstDash val="solid"/>
+                      <a:round/>
+                      <a:headEnd type="none" w="med" len="med"/>
+                      <a:tailEnd type="none" w="med" len="med"/>
+                    </a:lnR>
+                    <a:lnT w="12700" cap="flat" cmpd="sng" algn="ctr">
+                      <a:solidFill>
+                        <a:schemeClr val="tx1"/>
+                      </a:solidFill>
+                      <a:prstDash val="solid"/>
+                      <a:round/>
+                      <a:headEnd type="none" w="med" len="med"/>
+                      <a:tailEnd type="none" w="med" len="med"/>
+                    </a:lnT>
+                    <a:lnB w="12700" cap="flat" cmpd="sng" algn="ctr">
+                      <a:solidFill>
+                        <a:schemeClr val="tx1"/>
+                      </a:solidFill>
+                      <a:prstDash val="solid"/>
+                      <a:round/>
+                      <a:headEnd type="none" w="med" len="med"/>
+                      <a:tailEnd type="none" w="med" len="med"/>
+                    </a:lnB>
+                    <a:lnTlToBr w="12700" cmpd="sng">
+                      <a:noFill/>
+                      <a:prstDash val="solid"/>
+                    </a:lnTlToBr>
+                    <a:lnBlToTr w="12700" cmpd="sng">
+                      <a:noFill/>
+                      <a:prstDash val="solid"/>
+                    </a:lnBlToTr>
+                    <a:solidFill>
+                      <a:schemeClr val="tx1">
+                        <a:lumMod val="50000"/>
+                      </a:schemeClr>
+                    </a:solidFill>
+                  </a:tcPr>
+                </a:tc>
+                <a:tc gridSpan="3">
+                  <a:txBody>
+                    <a:bodyPr/>
+                    <a:lstStyle/>
+                    <a:p>
+                      <a:pPr algn="ctr"/>
+                      <a:r>
+                        <a:rPr lang="en-US" dirty="0" smtClean="0"/>
+                        <a:t>Ant ...n</a:t>
+                      </a:r>
+                      <a:endParaRPr lang="en-US" dirty="0" smtClean="0"/>
+                    </a:p>
+                  </a:txBody>
+                  <a:tcPr>
+                    <a:lnL w="12700" cap="flat" cmpd="sng" algn="ctr">
+                      <a:solidFill>
+                        <a:schemeClr val="tx1"/>
+                      </a:solidFill>
+                      <a:prstDash val="solid"/>
+                      <a:round/>
+                      <a:headEnd type="none" w="med" len="med"/>
+                      <a:tailEnd type="none" w="med" len="med"/>
+                    </a:lnL>
+                    <a:lnR w="12700" cap="flat" cmpd="sng" algn="ctr">
+                      <a:solidFill>
+                        <a:schemeClr val="tx1"/>
+                      </a:solidFill>
+                      <a:prstDash val="solid"/>
+                      <a:round/>
+                      <a:headEnd type="none" w="med" len="med"/>
+                      <a:tailEnd type="none" w="med" len="med"/>
+                    </a:lnR>
+                    <a:lnT w="12700" cap="flat" cmpd="sng" algn="ctr">
+                      <a:solidFill>
+                        <a:schemeClr val="tx1"/>
+                      </a:solidFill>
+                      <a:prstDash val="solid"/>
+                      <a:round/>
+                      <a:headEnd type="none" w="med" len="med"/>
+                      <a:tailEnd type="none" w="med" len="med"/>
+                    </a:lnT>
+                    <a:lnB w="12700" cap="flat" cmpd="sng" algn="ctr">
+                      <a:solidFill>
+                        <a:schemeClr val="tx1"/>
+                      </a:solidFill>
+                      <a:prstDash val="solid"/>
+                      <a:round/>
+                      <a:headEnd type="none" w="med" len="med"/>
+                      <a:tailEnd type="none" w="med" len="med"/>
+                    </a:lnB>
+                    <a:lnTlToBr w="12700" cmpd="sng">
+                      <a:noFill/>
+                      <a:prstDash val="solid"/>
+                    </a:lnTlToBr>
+                    <a:lnBlToTr w="12700" cmpd="sng">
+                      <a:noFill/>
+                      <a:prstDash val="solid"/>
+                    </a:lnBlToTr>
+                    <a:solidFill>
+                      <a:schemeClr val="tx1">
+                        <a:lumMod val="50000"/>
+                      </a:schemeClr>
+                    </a:solidFill>
+                  </a:tcPr>
+                </a:tc>
+                <a:tc hMerge="1">
+                  <a:txBody>
+                    <a:bodyPr/>
+                    <a:lstStyle/>
+                    <a:p>
+                      <a:endParaRPr lang="en-US" dirty="0"/>
+                    </a:p>
+                  </a:txBody>
+                  <a:tcPr>
+                    <a:lnL w="12700" cap="flat" cmpd="sng" algn="ctr">
+                      <a:solidFill>
+                        <a:schemeClr val="tx1"/>
+                      </a:solidFill>
+                      <a:prstDash val="solid"/>
+                      <a:round/>
+                      <a:headEnd type="none" w="med" len="med"/>
+                      <a:tailEnd type="none" w="med" len="med"/>
+                    </a:lnL>
+                    <a:lnR w="12700" cap="flat" cmpd="sng" algn="ctr">
+                      <a:solidFill>
+                        <a:schemeClr val="tx1"/>
+                      </a:solidFill>
+                      <a:prstDash val="solid"/>
+                      <a:round/>
+                      <a:headEnd type="none" w="med" len="med"/>
+                      <a:tailEnd type="none" w="med" len="med"/>
+                    </a:lnR>
+                    <a:lnT w="12700" cap="flat" cmpd="sng" algn="ctr">
+                      <a:solidFill>
+                        <a:schemeClr val="tx1"/>
+                      </a:solidFill>
+                      <a:prstDash val="solid"/>
+                      <a:round/>
+                      <a:headEnd type="none" w="med" len="med"/>
+                      <a:tailEnd type="none" w="med" len="med"/>
+                    </a:lnT>
+                    <a:lnB w="12700" cap="flat" cmpd="sng" algn="ctr">
+                      <a:solidFill>
+                        <a:schemeClr val="tx1"/>
+                      </a:solidFill>
+                      <a:prstDash val="solid"/>
+                      <a:round/>
+                      <a:headEnd type="none" w="med" len="med"/>
+                      <a:tailEnd type="none" w="med" len="med"/>
+                    </a:lnB>
+                    <a:lnTlToBr w="12700" cmpd="sng">
+                      <a:noFill/>
+                      <a:prstDash val="solid"/>
+                    </a:lnTlToBr>
+                    <a:lnBlToTr w="12700" cmpd="sng">
+                      <a:noFill/>
+                      <a:prstDash val="solid"/>
+                    </a:lnBlToTr>
+                    <a:solidFill>
+                      <a:schemeClr val="tx1">
+                        <a:lumMod val="50000"/>
+                      </a:schemeClr>
+                    </a:solidFill>
+                  </a:tcPr>
+                </a:tc>
+                <a:tc hMerge="1">
+                  <a:txBody>
+                    <a:bodyPr/>
+                    <a:lstStyle/>
+                    <a:p>
+                      <a:endParaRPr lang="en-US" dirty="0"/>
+                    </a:p>
+                  </a:txBody>
+                  <a:tcPr>
+                    <a:lnL w="12700" cap="flat" cmpd="sng" algn="ctr">
+                      <a:solidFill>
+                        <a:schemeClr val="tx1"/>
+                      </a:solidFill>
+                      <a:prstDash val="solid"/>
+                      <a:round/>
+                      <a:headEnd type="none" w="med" len="med"/>
+                      <a:tailEnd type="none" w="med" len="med"/>
+                    </a:lnL>
+                    <a:lnR w="12700" cap="flat" cmpd="sng" algn="ctr">
+                      <a:solidFill>
+                        <a:schemeClr val="tx1"/>
+                      </a:solidFill>
+                      <a:prstDash val="solid"/>
+                      <a:round/>
+                      <a:headEnd type="none" w="med" len="med"/>
+                      <a:tailEnd type="none" w="med" len="med"/>
+                    </a:lnR>
+                    <a:lnT w="12700" cap="flat" cmpd="sng" algn="ctr">
+                      <a:solidFill>
+                        <a:schemeClr val="tx1"/>
+                      </a:solidFill>
+                      <a:prstDash val="solid"/>
+                      <a:round/>
+                      <a:headEnd type="none" w="med" len="med"/>
+                      <a:tailEnd type="none" w="med" len="med"/>
+                    </a:lnT>
+                    <a:lnB w="12700" cap="flat" cmpd="sng" algn="ctr">
+                      <a:solidFill>
+                        <a:schemeClr val="tx1"/>
+                      </a:solidFill>
+                      <a:prstDash val="solid"/>
+                      <a:round/>
+                      <a:headEnd type="none" w="med" len="med"/>
+                      <a:tailEnd type="none" w="med" len="med"/>
+                    </a:lnB>
+                    <a:lnTlToBr w="12700" cmpd="sng">
+                      <a:noFill/>
+                      <a:prstDash val="solid"/>
+                    </a:lnTlToBr>
+                    <a:lnBlToTr w="12700" cmpd="sng">
+                      <a:noFill/>
+                      <a:prstDash val="solid"/>
+                    </a:lnBlToTr>
+                    <a:solidFill>
+                      <a:schemeClr val="tx1">
+                        <a:lumMod val="50000"/>
+                      </a:schemeClr>
+                    </a:solidFill>
+                  </a:tcPr>
+                </a:tc>
+              </a:tr>
+              <a:tr h="370840">
+                <a:tc>
+                  <a:txBody>
+                    <a:bodyPr/>
+                    <a:lstStyle/>
+                    <a:p>
+                      <a:pPr marL="0" algn="l" defTabSz="914400" rtl="0" eaLnBrk="1" latinLnBrk="0" hangingPunct="1"/>
+                      <a:r>
+                        <a:rPr lang="en-US" sz="1800" kern="1200" dirty="0" smtClean="0">
+                          <a:solidFill>
+                            <a:schemeClr val="dk1"/>
+                          </a:solidFill>
+                          <a:latin typeface="+mn-lt"/>
+                          <a:ea typeface="+mn-ea"/>
+                          <a:cs typeface="+mn-cs"/>
+                        </a:rPr>
+                        <a:t>Position</a:t>
+                      </a:r>
+                      <a:endParaRPr lang="en-US" sz="1800" kern="1200" dirty="0">
+                        <a:solidFill>
+                          <a:schemeClr val="dk1"/>
+                        </a:solidFill>
+                        <a:latin typeface="+mn-lt"/>
+                        <a:ea typeface="+mn-ea"/>
+                        <a:cs typeface="+mn-cs"/>
+                      </a:endParaRPr>
+                    </a:p>
+                  </a:txBody>
+                  <a:tcPr>
+                    <a:lnL w="12700" cap="flat" cmpd="sng" algn="ctr">
+                      <a:solidFill>
+                        <a:schemeClr val="tx1"/>
+                      </a:solidFill>
+                      <a:prstDash val="solid"/>
+                      <a:round/>
+                      <a:headEnd type="none" w="med" len="med"/>
+                      <a:tailEnd type="none" w="med" len="med"/>
+                    </a:lnL>
+                    <a:lnR w="12700" cap="flat" cmpd="sng" algn="ctr">
+                      <a:solidFill>
+                        <a:schemeClr val="tx1"/>
+                      </a:solidFill>
+                      <a:prstDash val="solid"/>
+                      <a:round/>
+                      <a:headEnd type="none" w="med" len="med"/>
+                      <a:tailEnd type="none" w="med" len="med"/>
+                    </a:lnR>
+                    <a:lnT w="12700" cap="flat" cmpd="sng" algn="ctr">
+                      <a:solidFill>
+                        <a:schemeClr val="tx1"/>
+                      </a:solidFill>
+                      <a:prstDash val="solid"/>
+                      <a:round/>
+                      <a:headEnd type="none" w="med" len="med"/>
+                      <a:tailEnd type="none" w="med" len="med"/>
+                    </a:lnT>
+                    <a:lnB w="12700" cap="flat" cmpd="sng" algn="ctr">
+                      <a:solidFill>
+                        <a:schemeClr val="tx1"/>
+                      </a:solidFill>
+                      <a:prstDash val="solid"/>
+                      <a:round/>
+                      <a:headEnd type="none" w="med" len="med"/>
+                      <a:tailEnd type="none" w="med" len="med"/>
+                    </a:lnB>
+                    <a:lnTlToBr w="12700" cmpd="sng">
+                      <a:noFill/>
+                      <a:prstDash val="solid"/>
+                    </a:lnTlToBr>
+                    <a:lnBlToTr w="12700" cmpd="sng">
+                      <a:noFill/>
+                      <a:prstDash val="solid"/>
+                    </a:lnBlToTr>
+                    <a:solidFill>
+                      <a:schemeClr val="bg2">
+                        <a:lumMod val="60000"/>
+                        <a:lumOff val="40000"/>
+                      </a:schemeClr>
+                    </a:solidFill>
+                  </a:tcPr>
+                </a:tc>
+                <a:tc>
+                  <a:txBody>
+                    <a:bodyPr/>
+                    <a:lstStyle/>
+                    <a:p>
+                      <a:pPr marL="0" algn="l" defTabSz="914400" rtl="0" eaLnBrk="1" latinLnBrk="0" hangingPunct="1"/>
+                      <a:r>
+                        <a:rPr lang="en-US" sz="1800" kern="1200" dirty="0" smtClean="0">
+                          <a:solidFill>
+                            <a:schemeClr val="dk1"/>
+                          </a:solidFill>
+                          <a:latin typeface="+mn-lt"/>
+                          <a:ea typeface="+mn-ea"/>
+                          <a:cs typeface="+mn-cs"/>
+                        </a:rPr>
+                        <a:t>Target</a:t>
+                      </a:r>
+                      <a:endParaRPr lang="en-US" sz="1800" kern="1200" dirty="0">
+                        <a:solidFill>
+                          <a:schemeClr val="dk1"/>
+                        </a:solidFill>
+                        <a:latin typeface="+mn-lt"/>
+                        <a:ea typeface="+mn-ea"/>
+                        <a:cs typeface="+mn-cs"/>
+                      </a:endParaRPr>
+                    </a:p>
+                  </a:txBody>
+                  <a:tcPr>
+                    <a:lnL w="12700" cap="flat" cmpd="sng" algn="ctr">
+                      <a:solidFill>
+                        <a:schemeClr val="tx1"/>
+                      </a:solidFill>
+                      <a:prstDash val="solid"/>
+                      <a:round/>
+                      <a:headEnd type="none" w="med" len="med"/>
+                      <a:tailEnd type="none" w="med" len="med"/>
+                    </a:lnL>
+                    <a:lnR w="12700" cap="flat" cmpd="sng" algn="ctr">
+                      <a:solidFill>
+                        <a:schemeClr val="tx1"/>
+                      </a:solidFill>
+                      <a:prstDash val="solid"/>
+                      <a:round/>
+                      <a:headEnd type="none" w="med" len="med"/>
+                      <a:tailEnd type="none" w="med" len="med"/>
+                    </a:lnR>
+                    <a:lnT w="12700" cap="flat" cmpd="sng" algn="ctr">
+                      <a:solidFill>
+                        <a:schemeClr val="tx1"/>
+                      </a:solidFill>
+                      <a:prstDash val="solid"/>
+                      <a:round/>
+                      <a:headEnd type="none" w="med" len="med"/>
+                      <a:tailEnd type="none" w="med" len="med"/>
+                    </a:lnT>
+                    <a:lnB w="12700" cap="flat" cmpd="sng" algn="ctr">
+                      <a:solidFill>
+                        <a:schemeClr val="tx1"/>
+                      </a:solidFill>
+                      <a:prstDash val="solid"/>
+                      <a:round/>
+                      <a:headEnd type="none" w="med" len="med"/>
+                      <a:tailEnd type="none" w="med" len="med"/>
+                    </a:lnB>
+                    <a:lnTlToBr w="12700" cmpd="sng">
+                      <a:noFill/>
+                      <a:prstDash val="solid"/>
+                    </a:lnTlToBr>
+                    <a:lnBlToTr w="12700" cmpd="sng">
+                      <a:noFill/>
+                      <a:prstDash val="solid"/>
+                    </a:lnBlToTr>
+                    <a:solidFill>
+                      <a:schemeClr val="accent2">
+                        <a:lumMod val="60000"/>
+                        <a:lumOff val="40000"/>
+                      </a:schemeClr>
+                    </a:solidFill>
+                  </a:tcPr>
+                </a:tc>
+                <a:tc>
+                  <a:txBody>
+                    <a:bodyPr/>
+                    <a:lstStyle/>
+                    <a:p>
+                      <a:pPr marL="0" algn="l" defTabSz="914400" rtl="0" eaLnBrk="1" latinLnBrk="0" hangingPunct="1"/>
+                      <a:r>
+                        <a:rPr lang="en-US" sz="1800" kern="1200" dirty="0" smtClean="0">
+                          <a:solidFill>
+                            <a:schemeClr val="dk1"/>
+                          </a:solidFill>
+                          <a:latin typeface="+mn-lt"/>
+                          <a:ea typeface="+mn-ea"/>
+                          <a:cs typeface="+mn-cs"/>
+                        </a:rPr>
+                        <a:t>StepCount</a:t>
+                      </a:r>
+                      <a:endParaRPr lang="en-US" sz="1800" kern="1200" dirty="0">
+                        <a:solidFill>
+                          <a:schemeClr val="dk1"/>
+                        </a:solidFill>
+                        <a:latin typeface="+mn-lt"/>
+                        <a:ea typeface="+mn-ea"/>
+                        <a:cs typeface="+mn-cs"/>
+                      </a:endParaRPr>
+                    </a:p>
+                  </a:txBody>
+                  <a:tcPr>
+                    <a:lnL w="12700" cap="flat" cmpd="sng" algn="ctr">
+                      <a:solidFill>
+                        <a:schemeClr val="tx1"/>
+                      </a:solidFill>
+                      <a:prstDash val="solid"/>
+                      <a:round/>
+                      <a:headEnd type="none" w="med" len="med"/>
+                      <a:tailEnd type="none" w="med" len="med"/>
+                    </a:lnL>
+                    <a:lnR w="12700" cap="flat" cmpd="sng" algn="ctr">
+                      <a:solidFill>
+                        <a:schemeClr val="tx1"/>
+                      </a:solidFill>
+                      <a:prstDash val="solid"/>
+                      <a:round/>
+                      <a:headEnd type="none" w="med" len="med"/>
+                      <a:tailEnd type="none" w="med" len="med"/>
+                    </a:lnR>
+                    <a:lnT w="12700" cap="flat" cmpd="sng" algn="ctr">
+                      <a:solidFill>
+                        <a:schemeClr val="tx1"/>
+                      </a:solidFill>
+                      <a:prstDash val="solid"/>
+                      <a:round/>
+                      <a:headEnd type="none" w="med" len="med"/>
+                      <a:tailEnd type="none" w="med" len="med"/>
+                    </a:lnT>
+                    <a:lnB w="12700" cap="flat" cmpd="sng" algn="ctr">
+                      <a:solidFill>
+                        <a:schemeClr val="tx1"/>
+                      </a:solidFill>
+                      <a:prstDash val="solid"/>
+                      <a:round/>
+                      <a:headEnd type="none" w="med" len="med"/>
+                      <a:tailEnd type="none" w="med" len="med"/>
+                    </a:lnB>
+                    <a:lnTlToBr w="12700" cmpd="sng">
+                      <a:noFill/>
+                      <a:prstDash val="solid"/>
+                    </a:lnTlToBr>
+                    <a:lnBlToTr w="12700" cmpd="sng">
+                      <a:noFill/>
+                      <a:prstDash val="solid"/>
+                    </a:lnBlToTr>
+                    <a:solidFill>
+                      <a:schemeClr val="accent4">
+                        <a:lumMod val="60000"/>
+                        <a:lumOff val="40000"/>
+                      </a:schemeClr>
+                    </a:solidFill>
+                  </a:tcPr>
+                </a:tc>
+                <a:tc>
+                  <a:txBody>
+                    <a:bodyPr/>
+                    <a:lstStyle/>
+                    <a:p>
+                      <a:pPr marL="0" algn="l" defTabSz="914400" rtl="0" eaLnBrk="1" latinLnBrk="0" hangingPunct="1"/>
+                      <a:r>
+                        <a:rPr lang="en-US" sz="1800" kern="1200" dirty="0" smtClean="0">
+                          <a:solidFill>
+                            <a:schemeClr val="dk1"/>
+                          </a:solidFill>
+                          <a:latin typeface="+mn-lt"/>
+                          <a:ea typeface="+mn-ea"/>
+                          <a:cs typeface="+mn-cs"/>
+                        </a:rPr>
+                        <a:t>Position</a:t>
+                      </a:r>
+                      <a:endParaRPr lang="en-US" sz="1800" kern="1200" dirty="0">
+                        <a:solidFill>
+                          <a:schemeClr val="dk1"/>
+                        </a:solidFill>
+                        <a:latin typeface="+mn-lt"/>
+                        <a:ea typeface="+mn-ea"/>
+                        <a:cs typeface="+mn-cs"/>
+                      </a:endParaRPr>
+                    </a:p>
+                  </a:txBody>
+                  <a:tcPr>
+                    <a:lnL w="12700" cap="flat" cmpd="sng" algn="ctr">
+                      <a:solidFill>
+                        <a:schemeClr val="tx1"/>
+                      </a:solidFill>
+                      <a:prstDash val="solid"/>
+                      <a:round/>
+                      <a:headEnd type="none" w="med" len="med"/>
+                      <a:tailEnd type="none" w="med" len="med"/>
+                    </a:lnL>
+                    <a:lnR w="12700" cap="flat" cmpd="sng" algn="ctr">
+                      <a:solidFill>
+                        <a:schemeClr val="tx1"/>
+                      </a:solidFill>
+                      <a:prstDash val="solid"/>
+                      <a:round/>
+                      <a:headEnd type="none" w="med" len="med"/>
+                      <a:tailEnd type="none" w="med" len="med"/>
+                    </a:lnR>
+                    <a:lnT w="12700" cap="flat" cmpd="sng" algn="ctr">
+                      <a:solidFill>
+                        <a:schemeClr val="tx1"/>
+                      </a:solidFill>
+                      <a:prstDash val="solid"/>
+                      <a:round/>
+                      <a:headEnd type="none" w="med" len="med"/>
+                      <a:tailEnd type="none" w="med" len="med"/>
+                    </a:lnT>
+                    <a:lnB w="12700" cap="flat" cmpd="sng" algn="ctr">
+                      <a:solidFill>
+                        <a:schemeClr val="tx1"/>
+                      </a:solidFill>
+                      <a:prstDash val="solid"/>
+                      <a:round/>
+                      <a:headEnd type="none" w="med" len="med"/>
+                      <a:tailEnd type="none" w="med" len="med"/>
+                    </a:lnB>
+                    <a:lnTlToBr w="12700" cmpd="sng">
+                      <a:noFill/>
+                      <a:prstDash val="solid"/>
+                    </a:lnTlToBr>
+                    <a:lnBlToTr w="12700" cmpd="sng">
+                      <a:noFill/>
+                      <a:prstDash val="solid"/>
+                    </a:lnBlToTr>
+                    <a:solidFill>
+                      <a:schemeClr val="bg2">
+                        <a:lumMod val="60000"/>
+                        <a:lumOff val="40000"/>
+                      </a:schemeClr>
+                    </a:solidFill>
+                  </a:tcPr>
+                </a:tc>
+                <a:tc>
+                  <a:txBody>
+                    <a:bodyPr/>
+                    <a:lstStyle/>
+                    <a:p>
+                      <a:pPr marL="0" algn="l" defTabSz="914400" rtl="0" eaLnBrk="1" latinLnBrk="0" hangingPunct="1"/>
+                      <a:r>
+                        <a:rPr lang="en-US" sz="1800" kern="1200" dirty="0" smtClean="0">
+                          <a:solidFill>
+                            <a:schemeClr val="dk1"/>
+                          </a:solidFill>
+                          <a:latin typeface="+mn-lt"/>
+                          <a:ea typeface="+mn-ea"/>
+                          <a:cs typeface="+mn-cs"/>
+                        </a:rPr>
+                        <a:t>Target</a:t>
+                      </a:r>
+                      <a:endParaRPr lang="en-US" sz="1800" kern="1200" dirty="0">
+                        <a:solidFill>
+                          <a:schemeClr val="dk1"/>
+                        </a:solidFill>
+                        <a:latin typeface="+mn-lt"/>
+                        <a:ea typeface="+mn-ea"/>
+                        <a:cs typeface="+mn-cs"/>
+                      </a:endParaRPr>
+                    </a:p>
+                  </a:txBody>
+                  <a:tcPr>
+                    <a:lnL w="12700" cap="flat" cmpd="sng" algn="ctr">
+                      <a:solidFill>
+                        <a:schemeClr val="tx1"/>
+                      </a:solidFill>
+                      <a:prstDash val="solid"/>
+                      <a:round/>
+                      <a:headEnd type="none" w="med" len="med"/>
+                      <a:tailEnd type="none" w="med" len="med"/>
+                    </a:lnL>
+                    <a:lnR w="12700" cap="flat" cmpd="sng" algn="ctr">
+                      <a:solidFill>
+                        <a:schemeClr val="tx1"/>
+                      </a:solidFill>
+                      <a:prstDash val="solid"/>
+                      <a:round/>
+                      <a:headEnd type="none" w="med" len="med"/>
+                      <a:tailEnd type="none" w="med" len="med"/>
+                    </a:lnR>
+                    <a:lnT w="12700" cap="flat" cmpd="sng" algn="ctr">
+                      <a:solidFill>
+                        <a:schemeClr val="tx1"/>
+                      </a:solidFill>
+                      <a:prstDash val="solid"/>
+                      <a:round/>
+                      <a:headEnd type="none" w="med" len="med"/>
+                      <a:tailEnd type="none" w="med" len="med"/>
+                    </a:lnT>
+                    <a:lnB w="12700" cap="flat" cmpd="sng" algn="ctr">
+                      <a:solidFill>
+                        <a:schemeClr val="tx1"/>
+                      </a:solidFill>
+                      <a:prstDash val="solid"/>
+                      <a:round/>
+                      <a:headEnd type="none" w="med" len="med"/>
+                      <a:tailEnd type="none" w="med" len="med"/>
+                    </a:lnB>
+                    <a:lnTlToBr w="12700" cmpd="sng">
+                      <a:noFill/>
+                      <a:prstDash val="solid"/>
+                    </a:lnTlToBr>
+                    <a:lnBlToTr w="12700" cmpd="sng">
+                      <a:noFill/>
+                      <a:prstDash val="solid"/>
+                    </a:lnBlToTr>
+                    <a:solidFill>
+                      <a:schemeClr val="accent2">
+                        <a:lumMod val="60000"/>
+                        <a:lumOff val="40000"/>
+                      </a:schemeClr>
+                    </a:solidFill>
+                  </a:tcPr>
+                </a:tc>
+                <a:tc>
+                  <a:txBody>
+                    <a:bodyPr/>
+                    <a:lstStyle/>
+                    <a:p>
+                      <a:pPr marL="0" algn="l" defTabSz="914400" rtl="0" eaLnBrk="1" latinLnBrk="0" hangingPunct="1"/>
+                      <a:r>
+                        <a:rPr lang="en-US" sz="1800" kern="1200" dirty="0" smtClean="0">
+                          <a:solidFill>
+                            <a:schemeClr val="dk1"/>
+                          </a:solidFill>
+                          <a:latin typeface="+mn-lt"/>
+                          <a:ea typeface="+mn-ea"/>
+                          <a:cs typeface="+mn-cs"/>
+                        </a:rPr>
+                        <a:t>StepCount</a:t>
+                      </a:r>
+                      <a:endParaRPr lang="en-US" sz="1800" kern="1200" dirty="0">
+                        <a:solidFill>
+                          <a:schemeClr val="dk1"/>
+                        </a:solidFill>
+                        <a:latin typeface="+mn-lt"/>
+                        <a:ea typeface="+mn-ea"/>
+                        <a:cs typeface="+mn-cs"/>
+                      </a:endParaRPr>
+                    </a:p>
+                  </a:txBody>
+                  <a:tcPr>
+                    <a:lnL w="12700" cap="flat" cmpd="sng" algn="ctr">
+                      <a:solidFill>
+                        <a:schemeClr val="tx1"/>
+                      </a:solidFill>
+                      <a:prstDash val="solid"/>
+                      <a:round/>
+                      <a:headEnd type="none" w="med" len="med"/>
+                      <a:tailEnd type="none" w="med" len="med"/>
+                    </a:lnL>
+                    <a:lnR w="12700" cap="flat" cmpd="sng" algn="ctr">
+                      <a:solidFill>
+                        <a:schemeClr val="tx1"/>
+                      </a:solidFill>
+                      <a:prstDash val="solid"/>
+                      <a:round/>
+                      <a:headEnd type="none" w="med" len="med"/>
+                      <a:tailEnd type="none" w="med" len="med"/>
+                    </a:lnR>
+                    <a:lnT w="12700" cap="flat" cmpd="sng" algn="ctr">
+                      <a:solidFill>
+                        <a:schemeClr val="tx1"/>
+                      </a:solidFill>
+                      <a:prstDash val="solid"/>
+                      <a:round/>
+                      <a:headEnd type="none" w="med" len="med"/>
+                      <a:tailEnd type="none" w="med" len="med"/>
+                    </a:lnT>
+                    <a:lnB w="12700" cap="flat" cmpd="sng" algn="ctr">
+                      <a:solidFill>
+                        <a:schemeClr val="tx1"/>
+                      </a:solidFill>
+                      <a:prstDash val="solid"/>
+                      <a:round/>
+                      <a:headEnd type="none" w="med" len="med"/>
+                      <a:tailEnd type="none" w="med" len="med"/>
+                    </a:lnB>
+                    <a:lnTlToBr w="12700" cmpd="sng">
+                      <a:noFill/>
+                      <a:prstDash val="solid"/>
+                    </a:lnTlToBr>
+                    <a:lnBlToTr w="12700" cmpd="sng">
+                      <a:noFill/>
+                      <a:prstDash val="solid"/>
+                    </a:lnBlToTr>
+                    <a:solidFill>
+                      <a:schemeClr val="accent4">
+                        <a:lumMod val="60000"/>
+                        <a:lumOff val="40000"/>
+                      </a:schemeClr>
+                    </a:solidFill>
+                  </a:tcPr>
+                </a:tc>
+                <a:tc>
+                  <a:txBody>
+                    <a:bodyPr/>
+                    <a:lstStyle/>
+                    <a:p>
+                      <a:r>
+                        <a:rPr lang="en-US" dirty="0" smtClean="0"/>
+                        <a:t>Position</a:t>
+                      </a:r>
+                      <a:endParaRPr lang="en-US" dirty="0"/>
+                    </a:p>
+                  </a:txBody>
+                  <a:tcPr>
+                    <a:lnL w="12700" cap="flat" cmpd="sng" algn="ctr">
+                      <a:solidFill>
+                        <a:schemeClr val="tx1"/>
+                      </a:solidFill>
+                      <a:prstDash val="solid"/>
+                      <a:round/>
+                      <a:headEnd type="none" w="med" len="med"/>
+                      <a:tailEnd type="none" w="med" len="med"/>
+                    </a:lnL>
+                    <a:lnR w="12700" cap="flat" cmpd="sng" algn="ctr">
+                      <a:solidFill>
+                        <a:schemeClr val="tx1"/>
+                      </a:solidFill>
+                      <a:prstDash val="solid"/>
+                      <a:round/>
+                      <a:headEnd type="none" w="med" len="med"/>
+                      <a:tailEnd type="none" w="med" len="med"/>
+                    </a:lnR>
+                    <a:lnT w="12700" cap="flat" cmpd="sng" algn="ctr">
+                      <a:solidFill>
+                        <a:schemeClr val="tx1"/>
+                      </a:solidFill>
+                      <a:prstDash val="solid"/>
+                      <a:round/>
+                      <a:headEnd type="none" w="med" len="med"/>
+                      <a:tailEnd type="none" w="med" len="med"/>
+                    </a:lnT>
+                    <a:lnB w="12700" cap="flat" cmpd="sng" algn="ctr">
+                      <a:solidFill>
+                        <a:schemeClr val="tx1"/>
+                      </a:solidFill>
+                      <a:prstDash val="solid"/>
+                      <a:round/>
+                      <a:headEnd type="none" w="med" len="med"/>
+                      <a:tailEnd type="none" w="med" len="med"/>
+                    </a:lnB>
+                    <a:lnTlToBr w="12700" cmpd="sng">
+                      <a:noFill/>
+                      <a:prstDash val="solid"/>
+                    </a:lnTlToBr>
+                    <a:lnBlToTr w="12700" cmpd="sng">
+                      <a:noFill/>
+                      <a:prstDash val="solid"/>
+                    </a:lnBlToTr>
+                    <a:solidFill>
+                      <a:schemeClr val="bg2">
+                        <a:lumMod val="60000"/>
+                        <a:lumOff val="40000"/>
+                      </a:schemeClr>
+                    </a:solidFill>
+                  </a:tcPr>
+                </a:tc>
+                <a:tc>
+                  <a:txBody>
+                    <a:bodyPr/>
+                    <a:lstStyle/>
+                    <a:p>
+                      <a:r>
+                        <a:rPr lang="en-US" dirty="0" smtClean="0"/>
+                        <a:t>Target</a:t>
+                      </a:r>
+                      <a:endParaRPr lang="en-US" dirty="0"/>
+                    </a:p>
+                  </a:txBody>
+                  <a:tcPr>
+                    <a:lnL w="12700" cap="flat" cmpd="sng" algn="ctr">
+                      <a:solidFill>
+                        <a:schemeClr val="tx1"/>
+                      </a:solidFill>
+                      <a:prstDash val="solid"/>
+                      <a:round/>
+                      <a:headEnd type="none" w="med" len="med"/>
+                      <a:tailEnd type="none" w="med" len="med"/>
+                    </a:lnL>
+                    <a:lnR w="12700" cap="flat" cmpd="sng" algn="ctr">
+                      <a:solidFill>
+                        <a:schemeClr val="tx1"/>
+                      </a:solidFill>
+                      <a:prstDash val="solid"/>
+                      <a:round/>
+                      <a:headEnd type="none" w="med" len="med"/>
+                      <a:tailEnd type="none" w="med" len="med"/>
+                    </a:lnR>
+                    <a:lnT w="12700" cap="flat" cmpd="sng" algn="ctr">
+                      <a:solidFill>
+                        <a:schemeClr val="tx1"/>
+                      </a:solidFill>
+                      <a:prstDash val="solid"/>
+                      <a:round/>
+                      <a:headEnd type="none" w="med" len="med"/>
+                      <a:tailEnd type="none" w="med" len="med"/>
+                    </a:lnT>
+                    <a:lnB w="12700" cap="flat" cmpd="sng" algn="ctr">
+                      <a:solidFill>
+                        <a:schemeClr val="tx1"/>
+                      </a:solidFill>
+                      <a:prstDash val="solid"/>
+                      <a:round/>
+                      <a:headEnd type="none" w="med" len="med"/>
+                      <a:tailEnd type="none" w="med" len="med"/>
+                    </a:lnB>
+                    <a:lnTlToBr w="12700" cmpd="sng">
+                      <a:noFill/>
+                      <a:prstDash val="solid"/>
+                    </a:lnTlToBr>
+                    <a:lnBlToTr w="12700" cmpd="sng">
+                      <a:noFill/>
+                      <a:prstDash val="solid"/>
+                    </a:lnBlToTr>
+                    <a:solidFill>
+                      <a:schemeClr val="accent2">
+                        <a:lumMod val="60000"/>
+                        <a:lumOff val="40000"/>
+                      </a:schemeClr>
+                    </a:solidFill>
+                  </a:tcPr>
+                </a:tc>
+                <a:tc>
+                  <a:txBody>
+                    <a:bodyPr/>
+                    <a:lstStyle/>
+                    <a:p>
+                      <a:r>
+                        <a:rPr lang="en-US" dirty="0" smtClean="0"/>
+                        <a:t>StepCount</a:t>
+                      </a:r>
+                      <a:endParaRPr lang="en-US" dirty="0"/>
+                    </a:p>
+                  </a:txBody>
+                  <a:tcPr>
+                    <a:lnL w="12700" cap="flat" cmpd="sng" algn="ctr">
+                      <a:solidFill>
+                        <a:schemeClr val="tx1"/>
+                      </a:solidFill>
+                      <a:prstDash val="solid"/>
+                      <a:round/>
+                      <a:headEnd type="none" w="med" len="med"/>
+                      <a:tailEnd type="none" w="med" len="med"/>
+                    </a:lnL>
+                    <a:lnR w="12700" cap="flat" cmpd="sng" algn="ctr">
+                      <a:solidFill>
+                        <a:schemeClr val="tx1"/>
+                      </a:solidFill>
+                      <a:prstDash val="solid"/>
+                      <a:round/>
+                      <a:headEnd type="none" w="med" len="med"/>
+                      <a:tailEnd type="none" w="med" len="med"/>
+                    </a:lnR>
+                    <a:lnT w="12700" cap="flat" cmpd="sng" algn="ctr">
+                      <a:solidFill>
+                        <a:schemeClr val="tx1"/>
+                      </a:solidFill>
+                      <a:prstDash val="solid"/>
+                      <a:round/>
+                      <a:headEnd type="none" w="med" len="med"/>
+                      <a:tailEnd type="none" w="med" len="med"/>
+                    </a:lnT>
+                    <a:lnB w="12700" cap="flat" cmpd="sng" algn="ctr">
+                      <a:solidFill>
+                        <a:schemeClr val="tx1"/>
+                      </a:solidFill>
+                      <a:prstDash val="solid"/>
+                      <a:round/>
+                      <a:headEnd type="none" w="med" len="med"/>
+                      <a:tailEnd type="none" w="med" len="med"/>
+                    </a:lnB>
+                    <a:lnTlToBr w="12700" cmpd="sng">
+                      <a:noFill/>
+                      <a:prstDash val="solid"/>
+                    </a:lnTlToBr>
+                    <a:lnBlToTr w="12700" cmpd="sng">
+                      <a:noFill/>
+                      <a:prstDash val="solid"/>
+                    </a:lnBlToTr>
+                    <a:solidFill>
+                      <a:schemeClr val="accent4">
+                        <a:lumMod val="60000"/>
+                        <a:lumOff val="40000"/>
+                      </a:schemeClr>
+                    </a:solidFill>
+                  </a:tcPr>
+                </a:tc>
+              </a:tr>
+              <a:tr h="370840">
+                <a:tc>
+                  <a:txBody>
+                    <a:bodyPr/>
+                    <a:lstStyle/>
+                    <a:p>
+                      <a:r>
+                        <a:rPr lang="en-US" smtClean="0"/>
+                        <a:t>8bytes</a:t>
+                      </a:r>
+                      <a:endParaRPr lang="en-US" dirty="0"/>
+                    </a:p>
+                  </a:txBody>
+                  <a:tcPr>
+                    <a:lnL w="12700" cap="flat" cmpd="sng" algn="ctr">
+                      <a:solidFill>
+                        <a:schemeClr val="tx1"/>
+                      </a:solidFill>
+                      <a:prstDash val="solid"/>
+                      <a:round/>
+                      <a:headEnd type="none" w="med" len="med"/>
+                      <a:tailEnd type="none" w="med" len="med"/>
+                    </a:lnL>
+                    <a:lnR w="12700" cap="flat" cmpd="sng" algn="ctr">
+                      <a:solidFill>
+                        <a:schemeClr val="tx1"/>
+                      </a:solidFill>
+                      <a:prstDash val="solid"/>
+                      <a:round/>
+                      <a:headEnd type="none" w="med" len="med"/>
+                      <a:tailEnd type="none" w="med" len="med"/>
+                    </a:lnR>
+                    <a:lnT w="12700" cap="flat" cmpd="sng" algn="ctr">
+                      <a:solidFill>
+                        <a:schemeClr val="tx1"/>
+                      </a:solidFill>
+                      <a:prstDash val="solid"/>
+                      <a:round/>
+                      <a:headEnd type="none" w="med" len="med"/>
+                      <a:tailEnd type="none" w="med" len="med"/>
+                    </a:lnT>
+                    <a:lnB w="12700" cap="flat" cmpd="sng" algn="ctr">
+                      <a:solidFill>
+                        <a:schemeClr val="tx1"/>
+                      </a:solidFill>
+                      <a:prstDash val="solid"/>
+                      <a:round/>
+                      <a:headEnd type="none" w="med" len="med"/>
+                      <a:tailEnd type="none" w="med" len="med"/>
+                    </a:lnB>
+                    <a:lnTlToBr w="12700" cmpd="sng">
+                      <a:noFill/>
+                      <a:prstDash val="solid"/>
+                    </a:lnTlToBr>
+                    <a:lnBlToTr w="12700" cmpd="sng">
+                      <a:noFill/>
+                      <a:prstDash val="solid"/>
+                    </a:lnBlToTr>
+                    <a:solidFill>
+                      <a:schemeClr val="tx1">
+                        <a:lumMod val="50000"/>
+                      </a:schemeClr>
+                    </a:solidFill>
+                  </a:tcPr>
+                </a:tc>
+                <a:tc>
+                  <a:txBody>
+                    <a:bodyPr/>
+                    <a:lstStyle/>
+                    <a:p>
+                      <a:r>
+                        <a:rPr lang="en-US" dirty="0" smtClean="0"/>
+                        <a:t>8bytes</a:t>
+                      </a:r>
+                      <a:endParaRPr lang="en-US" dirty="0"/>
+                    </a:p>
+                  </a:txBody>
+                  <a:tcPr>
+                    <a:lnL w="12700" cap="flat" cmpd="sng" algn="ctr">
+                      <a:solidFill>
+                        <a:schemeClr val="tx1"/>
+                      </a:solidFill>
+                      <a:prstDash val="solid"/>
+                      <a:round/>
+                      <a:headEnd type="none" w="med" len="med"/>
+                      <a:tailEnd type="none" w="med" len="med"/>
+                    </a:lnL>
+                    <a:lnR w="12700" cap="flat" cmpd="sng" algn="ctr">
+                      <a:solidFill>
+                        <a:schemeClr val="tx1"/>
+                      </a:solidFill>
+                      <a:prstDash val="solid"/>
+                      <a:round/>
+                      <a:headEnd type="none" w="med" len="med"/>
+                      <a:tailEnd type="none" w="med" len="med"/>
+                    </a:lnR>
+                    <a:lnT w="12700" cap="flat" cmpd="sng" algn="ctr">
+                      <a:solidFill>
+                        <a:schemeClr val="tx1"/>
+                      </a:solidFill>
+                      <a:prstDash val="solid"/>
+                      <a:round/>
+                      <a:headEnd type="none" w="med" len="med"/>
+                      <a:tailEnd type="none" w="med" len="med"/>
+                    </a:lnT>
+                    <a:lnB w="12700" cap="flat" cmpd="sng" algn="ctr">
+                      <a:solidFill>
+                        <a:schemeClr val="tx1"/>
+                      </a:solidFill>
+                      <a:prstDash val="solid"/>
+                      <a:round/>
+                      <a:headEnd type="none" w="med" len="med"/>
+                      <a:tailEnd type="none" w="med" len="med"/>
+                    </a:lnB>
+                    <a:lnTlToBr w="12700" cmpd="sng">
+                      <a:noFill/>
+                      <a:prstDash val="solid"/>
+                    </a:lnTlToBr>
+                    <a:lnBlToTr w="12700" cmpd="sng">
+                      <a:noFill/>
+                      <a:prstDash val="solid"/>
+                    </a:lnBlToTr>
+                    <a:solidFill>
+                      <a:schemeClr val="tx1">
+                        <a:lumMod val="50000"/>
+                      </a:schemeClr>
+                    </a:solidFill>
+                  </a:tcPr>
+                </a:tc>
+                <a:tc>
+                  <a:txBody>
+                    <a:bodyPr/>
+                    <a:lstStyle/>
+                    <a:p>
+                      <a:r>
+                        <a:rPr lang="en-US" smtClean="0"/>
+                        <a:t>4bytes</a:t>
+                      </a:r>
+                      <a:endParaRPr lang="en-US" dirty="0"/>
+                    </a:p>
+                  </a:txBody>
+                  <a:tcPr>
+                    <a:lnL w="12700" cap="flat" cmpd="sng" algn="ctr">
+                      <a:solidFill>
+                        <a:schemeClr val="tx1"/>
+                      </a:solidFill>
+                      <a:prstDash val="solid"/>
+                      <a:round/>
+                      <a:headEnd type="none" w="med" len="med"/>
+                      <a:tailEnd type="none" w="med" len="med"/>
+                    </a:lnL>
+                    <a:lnR w="12700" cap="flat" cmpd="sng" algn="ctr">
+                      <a:solidFill>
+                        <a:schemeClr val="tx1"/>
+                      </a:solidFill>
+                      <a:prstDash val="solid"/>
+                      <a:round/>
+                      <a:headEnd type="none" w="med" len="med"/>
+                      <a:tailEnd type="none" w="med" len="med"/>
+                    </a:lnR>
+                    <a:lnT w="12700" cap="flat" cmpd="sng" algn="ctr">
+                      <a:solidFill>
+                        <a:schemeClr val="tx1"/>
+                      </a:solidFill>
+                      <a:prstDash val="solid"/>
+                      <a:round/>
+                      <a:headEnd type="none" w="med" len="med"/>
+                      <a:tailEnd type="none" w="med" len="med"/>
+                    </a:lnT>
+                    <a:lnB w="12700" cap="flat" cmpd="sng" algn="ctr">
+                      <a:solidFill>
+                        <a:schemeClr val="tx1"/>
+                      </a:solidFill>
+                      <a:prstDash val="solid"/>
+                      <a:round/>
+                      <a:headEnd type="none" w="med" len="med"/>
+                      <a:tailEnd type="none" w="med" len="med"/>
+                    </a:lnB>
+                    <a:lnTlToBr w="12700" cmpd="sng">
+                      <a:noFill/>
+                      <a:prstDash val="solid"/>
+                    </a:lnTlToBr>
+                    <a:lnBlToTr w="12700" cmpd="sng">
+                      <a:noFill/>
+                      <a:prstDash val="solid"/>
+                    </a:lnBlToTr>
+                    <a:solidFill>
+                      <a:schemeClr val="tx1">
+                        <a:lumMod val="50000"/>
+                      </a:schemeClr>
+                    </a:solidFill>
+                  </a:tcPr>
+                </a:tc>
+                <a:tc>
+                  <a:txBody>
+                    <a:bodyPr/>
+                    <a:lstStyle/>
+                    <a:p>
+                      <a:r>
+                        <a:rPr lang="en-US" smtClean="0"/>
+                        <a:t>8bytes</a:t>
+                      </a:r>
+                      <a:endParaRPr lang="en-US" dirty="0"/>
+                    </a:p>
+                  </a:txBody>
+                  <a:tcPr>
+                    <a:lnL w="12700" cap="flat" cmpd="sng" algn="ctr">
+                      <a:solidFill>
+                        <a:schemeClr val="tx1"/>
+                      </a:solidFill>
+                      <a:prstDash val="solid"/>
+                      <a:round/>
+                      <a:headEnd type="none" w="med" len="med"/>
+                      <a:tailEnd type="none" w="med" len="med"/>
+                    </a:lnL>
+                    <a:lnR w="12700" cap="flat" cmpd="sng" algn="ctr">
+                      <a:solidFill>
+                        <a:schemeClr val="tx1"/>
+                      </a:solidFill>
+                      <a:prstDash val="solid"/>
+                      <a:round/>
+                      <a:headEnd type="none" w="med" len="med"/>
+                      <a:tailEnd type="none" w="med" len="med"/>
+                    </a:lnR>
+                    <a:lnT w="12700" cap="flat" cmpd="sng" algn="ctr">
+                      <a:solidFill>
+                        <a:schemeClr val="tx1"/>
+                      </a:solidFill>
+                      <a:prstDash val="solid"/>
+                      <a:round/>
+                      <a:headEnd type="none" w="med" len="med"/>
+                      <a:tailEnd type="none" w="med" len="med"/>
+                    </a:lnT>
+                    <a:lnB w="12700" cap="flat" cmpd="sng" algn="ctr">
+                      <a:solidFill>
+                        <a:schemeClr val="tx1"/>
+                      </a:solidFill>
+                      <a:prstDash val="solid"/>
+                      <a:round/>
+                      <a:headEnd type="none" w="med" len="med"/>
+                      <a:tailEnd type="none" w="med" len="med"/>
+                    </a:lnB>
+                    <a:lnTlToBr w="12700" cmpd="sng">
+                      <a:noFill/>
+                      <a:prstDash val="solid"/>
+                    </a:lnTlToBr>
+                    <a:lnBlToTr w="12700" cmpd="sng">
+                      <a:noFill/>
+                      <a:prstDash val="solid"/>
+                    </a:lnBlToTr>
+                    <a:solidFill>
+                      <a:schemeClr val="tx1">
+                        <a:lumMod val="50000"/>
+                      </a:schemeClr>
+                    </a:solidFill>
+                  </a:tcPr>
+                </a:tc>
+                <a:tc>
+                  <a:txBody>
+                    <a:bodyPr/>
+                    <a:lstStyle/>
+                    <a:p>
+                      <a:r>
+                        <a:rPr lang="en-US" dirty="0" smtClean="0"/>
+                        <a:t>8bytes</a:t>
+                      </a:r>
+                      <a:endParaRPr lang="en-US" dirty="0"/>
+                    </a:p>
+                  </a:txBody>
+                  <a:tcPr>
+                    <a:lnL w="12700" cap="flat" cmpd="sng" algn="ctr">
+                      <a:solidFill>
+                        <a:schemeClr val="tx1"/>
+                      </a:solidFill>
+                      <a:prstDash val="solid"/>
+                      <a:round/>
+                      <a:headEnd type="none" w="med" len="med"/>
+                      <a:tailEnd type="none" w="med" len="med"/>
+                    </a:lnL>
+                    <a:lnR w="12700" cap="flat" cmpd="sng" algn="ctr">
+                      <a:solidFill>
+                        <a:schemeClr val="tx1"/>
+                      </a:solidFill>
+                      <a:prstDash val="solid"/>
+                      <a:round/>
+                      <a:headEnd type="none" w="med" len="med"/>
+                      <a:tailEnd type="none" w="med" len="med"/>
+                    </a:lnR>
+                    <a:lnT w="12700" cap="flat" cmpd="sng" algn="ctr">
+                      <a:solidFill>
+                        <a:schemeClr val="tx1"/>
+                      </a:solidFill>
+                      <a:prstDash val="solid"/>
+                      <a:round/>
+                      <a:headEnd type="none" w="med" len="med"/>
+                      <a:tailEnd type="none" w="med" len="med"/>
+                    </a:lnT>
+                    <a:lnB w="12700" cap="flat" cmpd="sng" algn="ctr">
+                      <a:solidFill>
+                        <a:schemeClr val="tx1"/>
+                      </a:solidFill>
+                      <a:prstDash val="solid"/>
+                      <a:round/>
+                      <a:headEnd type="none" w="med" len="med"/>
+                      <a:tailEnd type="none" w="med" len="med"/>
+                    </a:lnB>
+                    <a:lnTlToBr w="12700" cmpd="sng">
+                      <a:noFill/>
+                      <a:prstDash val="solid"/>
+                    </a:lnTlToBr>
+                    <a:lnBlToTr w="12700" cmpd="sng">
+                      <a:noFill/>
+                      <a:prstDash val="solid"/>
+                    </a:lnBlToTr>
+                    <a:solidFill>
+                      <a:schemeClr val="tx1">
+                        <a:lumMod val="50000"/>
+                      </a:schemeClr>
+                    </a:solidFill>
+                  </a:tcPr>
+                </a:tc>
+                <a:tc>
+                  <a:txBody>
+                    <a:bodyPr/>
+                    <a:lstStyle/>
+                    <a:p>
+                      <a:r>
+                        <a:rPr lang="en-US" dirty="0" smtClean="0"/>
+                        <a:t>4bytes</a:t>
+                      </a:r>
+                      <a:endParaRPr lang="en-US" dirty="0"/>
+                    </a:p>
+                  </a:txBody>
+                  <a:tcPr>
+                    <a:lnL w="12700" cap="flat" cmpd="sng" algn="ctr">
+                      <a:solidFill>
+                        <a:schemeClr val="tx1"/>
+                      </a:solidFill>
+                      <a:prstDash val="solid"/>
+                      <a:round/>
+                      <a:headEnd type="none" w="med" len="med"/>
+                      <a:tailEnd type="none" w="med" len="med"/>
+                    </a:lnL>
+                    <a:lnR w="12700" cap="flat" cmpd="sng" algn="ctr">
+                      <a:solidFill>
+                        <a:schemeClr val="tx1"/>
+                      </a:solidFill>
+                      <a:prstDash val="solid"/>
+                      <a:round/>
+                      <a:headEnd type="none" w="med" len="med"/>
+                      <a:tailEnd type="none" w="med" len="med"/>
+                    </a:lnR>
+                    <a:lnT w="12700" cap="flat" cmpd="sng" algn="ctr">
+                      <a:solidFill>
+                        <a:schemeClr val="tx1"/>
+                      </a:solidFill>
+                      <a:prstDash val="solid"/>
+                      <a:round/>
+                      <a:headEnd type="none" w="med" len="med"/>
+                      <a:tailEnd type="none" w="med" len="med"/>
+                    </a:lnT>
+                    <a:lnB w="12700" cap="flat" cmpd="sng" algn="ctr">
+                      <a:solidFill>
+                        <a:schemeClr val="tx1"/>
+                      </a:solidFill>
+                      <a:prstDash val="solid"/>
+                      <a:round/>
+                      <a:headEnd type="none" w="med" len="med"/>
+                      <a:tailEnd type="none" w="med" len="med"/>
+                    </a:lnB>
+                    <a:lnTlToBr w="12700" cmpd="sng">
+                      <a:noFill/>
+                      <a:prstDash val="solid"/>
+                    </a:lnTlToBr>
+                    <a:lnBlToTr w="12700" cmpd="sng">
+                      <a:noFill/>
+                      <a:prstDash val="solid"/>
+                    </a:lnBlToTr>
+                    <a:solidFill>
+                      <a:schemeClr val="tx1">
+                        <a:lumMod val="50000"/>
+                      </a:schemeClr>
+                    </a:solidFill>
+                  </a:tcPr>
+                </a:tc>
+                <a:tc>
+                  <a:txBody>
+                    <a:bodyPr/>
+                    <a:lstStyle/>
+                    <a:p>
+                      <a:r>
+                        <a:rPr lang="en-US" smtClean="0"/>
+                        <a:t>8bytes</a:t>
+                      </a:r>
+                      <a:endParaRPr lang="en-US" dirty="0"/>
+                    </a:p>
+                  </a:txBody>
+                  <a:tcPr>
+                    <a:lnL w="12700" cap="flat" cmpd="sng" algn="ctr">
+                      <a:solidFill>
+                        <a:schemeClr val="tx1"/>
+                      </a:solidFill>
+                      <a:prstDash val="solid"/>
+                      <a:round/>
+                      <a:headEnd type="none" w="med" len="med"/>
+                      <a:tailEnd type="none" w="med" len="med"/>
+                    </a:lnL>
+                    <a:lnR w="12700" cap="flat" cmpd="sng" algn="ctr">
+                      <a:solidFill>
+                        <a:schemeClr val="tx1"/>
+                      </a:solidFill>
+                      <a:prstDash val="solid"/>
+                      <a:round/>
+                      <a:headEnd type="none" w="med" len="med"/>
+                      <a:tailEnd type="none" w="med" len="med"/>
+                    </a:lnR>
+                    <a:lnT w="12700" cap="flat" cmpd="sng" algn="ctr">
+                      <a:solidFill>
+                        <a:schemeClr val="tx1"/>
+                      </a:solidFill>
+                      <a:prstDash val="solid"/>
+                      <a:round/>
+                      <a:headEnd type="none" w="med" len="med"/>
+                      <a:tailEnd type="none" w="med" len="med"/>
+                    </a:lnT>
+                    <a:lnB w="12700" cap="flat" cmpd="sng" algn="ctr">
+                      <a:solidFill>
+                        <a:schemeClr val="tx1"/>
+                      </a:solidFill>
+                      <a:prstDash val="solid"/>
+                      <a:round/>
+                      <a:headEnd type="none" w="med" len="med"/>
+                      <a:tailEnd type="none" w="med" len="med"/>
+                    </a:lnB>
+                    <a:lnTlToBr w="12700" cmpd="sng">
+                      <a:noFill/>
+                      <a:prstDash val="solid"/>
+                    </a:lnTlToBr>
+                    <a:lnBlToTr w="12700" cmpd="sng">
+                      <a:noFill/>
+                      <a:prstDash val="solid"/>
+                    </a:lnBlToTr>
+                    <a:solidFill>
+                      <a:schemeClr val="tx1">
+                        <a:lumMod val="50000"/>
+                      </a:schemeClr>
+                    </a:solidFill>
+                  </a:tcPr>
+                </a:tc>
+                <a:tc>
+                  <a:txBody>
+                    <a:bodyPr/>
+                    <a:lstStyle/>
+                    <a:p>
+                      <a:r>
+                        <a:rPr lang="en-US" dirty="0" smtClean="0"/>
+                        <a:t>8bytes</a:t>
+                      </a:r>
+                      <a:endParaRPr lang="en-US" dirty="0"/>
+                    </a:p>
+                  </a:txBody>
+                  <a:tcPr>
+                    <a:lnL w="12700" cap="flat" cmpd="sng" algn="ctr">
+                      <a:solidFill>
+                        <a:schemeClr val="tx1"/>
+                      </a:solidFill>
+                      <a:prstDash val="solid"/>
+                      <a:round/>
+                      <a:headEnd type="none" w="med" len="med"/>
+                      <a:tailEnd type="none" w="med" len="med"/>
+                    </a:lnL>
+                    <a:lnR w="12700" cap="flat" cmpd="sng" algn="ctr">
+                      <a:solidFill>
+                        <a:schemeClr val="tx1"/>
+                      </a:solidFill>
+                      <a:prstDash val="solid"/>
+                      <a:round/>
+                      <a:headEnd type="none" w="med" len="med"/>
+                      <a:tailEnd type="none" w="med" len="med"/>
+                    </a:lnR>
+                    <a:lnT w="12700" cap="flat" cmpd="sng" algn="ctr">
+                      <a:solidFill>
+                        <a:schemeClr val="tx1"/>
+                      </a:solidFill>
+                      <a:prstDash val="solid"/>
+                      <a:round/>
+                      <a:headEnd type="none" w="med" len="med"/>
+                      <a:tailEnd type="none" w="med" len="med"/>
+                    </a:lnT>
+                    <a:lnB w="12700" cap="flat" cmpd="sng" algn="ctr">
+                      <a:solidFill>
+                        <a:schemeClr val="tx1"/>
+                      </a:solidFill>
+                      <a:prstDash val="solid"/>
+                      <a:round/>
+                      <a:headEnd type="none" w="med" len="med"/>
+                      <a:tailEnd type="none" w="med" len="med"/>
+                    </a:lnB>
+                    <a:lnTlToBr w="12700" cmpd="sng">
+                      <a:noFill/>
+                      <a:prstDash val="solid"/>
+                    </a:lnTlToBr>
+                    <a:lnBlToTr w="12700" cmpd="sng">
+                      <a:noFill/>
+                      <a:prstDash val="solid"/>
+                    </a:lnBlToTr>
+                    <a:solidFill>
+                      <a:schemeClr val="tx1">
+                        <a:lumMod val="50000"/>
+                      </a:schemeClr>
+                    </a:solidFill>
+                  </a:tcPr>
+                </a:tc>
+                <a:tc>
+                  <a:txBody>
+                    <a:bodyPr/>
+                    <a:lstStyle/>
+                    <a:p>
+                      <a:r>
+                        <a:rPr lang="en-US" dirty="0" smtClean="0"/>
+                        <a:t>4bytes</a:t>
+                      </a:r>
+                      <a:endParaRPr lang="en-US" dirty="0"/>
+                    </a:p>
+                  </a:txBody>
+                  <a:tcPr>
+                    <a:lnL w="12700" cap="flat" cmpd="sng" algn="ctr">
+                      <a:solidFill>
+                        <a:schemeClr val="tx1"/>
+                      </a:solidFill>
+                      <a:prstDash val="solid"/>
+                      <a:round/>
+                      <a:headEnd type="none" w="med" len="med"/>
+                      <a:tailEnd type="none" w="med" len="med"/>
+                    </a:lnL>
+                    <a:lnR w="12700" cap="flat" cmpd="sng" algn="ctr">
+                      <a:solidFill>
+                        <a:schemeClr val="tx1"/>
+                      </a:solidFill>
+                      <a:prstDash val="solid"/>
+                      <a:round/>
+                      <a:headEnd type="none" w="med" len="med"/>
+                      <a:tailEnd type="none" w="med" len="med"/>
+                    </a:lnR>
+                    <a:lnT w="12700" cap="flat" cmpd="sng" algn="ctr">
+                      <a:solidFill>
+                        <a:schemeClr val="tx1"/>
+                      </a:solidFill>
+                      <a:prstDash val="solid"/>
+                      <a:round/>
+                      <a:headEnd type="none" w="med" len="med"/>
+                      <a:tailEnd type="none" w="med" len="med"/>
+                    </a:lnT>
+                    <a:lnB w="12700" cap="flat" cmpd="sng" algn="ctr">
+                      <a:solidFill>
+                        <a:schemeClr val="tx1"/>
+                      </a:solidFill>
+                      <a:prstDash val="solid"/>
+                      <a:round/>
+                      <a:headEnd type="none" w="med" len="med"/>
+                      <a:tailEnd type="none" w="med" len="med"/>
+                    </a:lnB>
+                    <a:lnTlToBr w="12700" cmpd="sng">
+                      <a:noFill/>
+                      <a:prstDash val="solid"/>
+                    </a:lnTlToBr>
+                    <a:lnBlToTr w="12700" cmpd="sng">
+                      <a:noFill/>
+                      <a:prstDash val="solid"/>
+                    </a:lnBlToTr>
+                    <a:solidFill>
+                      <a:schemeClr val="tx1">
+                        <a:lumMod val="50000"/>
+                      </a:schemeClr>
+                    </a:solidFill>
+                  </a:tcPr>
+                </a:tc>
+              </a:tr>
+            </a:tbl>
+          </a:graphicData>
+        </a:graphic>
+      </p:graphicFrame>
     </p:spTree>
     <p:extLst>
       <p:ext uri="{BB962C8B-B14F-4D97-AF65-F5344CB8AC3E}">
@@ -3715,7 +5563,6 @@
               <a:rPr lang="en-US" dirty="0"/>
               <a:t>Any other solution?</a:t>
             </a:r>
-            <a:endParaRPr lang="en-US" dirty="0"/>
           </a:p>
         </p:txBody>
       </p:sp>
@@ -3768,7 +5615,6 @@
               <a:rPr lang="en-US" dirty="0"/>
               <a:t>What's the actual problem?</a:t>
             </a:r>
-            <a:endParaRPr lang="en-US" dirty="0"/>
           </a:p>
         </p:txBody>
       </p:sp>
@@ -3821,7 +5667,6 @@
               <a:rPr lang="en-US" dirty="0"/>
               <a:t>So what's the next step?</a:t>
             </a:r>
-            <a:endParaRPr lang="en-US" dirty="0"/>
           </a:p>
         </p:txBody>
       </p:sp>
@@ -3955,7 +5800,6 @@
               <a:rPr lang="en-US" dirty="0"/>
               <a:t>Data-Oriented Design Principles</a:t>
             </a:r>
-            <a:endParaRPr lang="en-US" dirty="0"/>
           </a:p>
         </p:txBody>
       </p:sp>

</xml_diff>

<commit_message>
Missing    MemoryAccessSample/Main.cpp Modified   MemoryAccessSample/MemoryAccessSample.vcxproj Modified   MemoryAccessSample/MemoryAccessSample.vcxproj.filters Modified   Presentation/Presentation.pptx
</commit_message>
<xml_diff>
--- a/Presentation/Presentation.pptx
+++ b/Presentation/Presentation.pptx
@@ -5686,14 +5686,14 @@
           <p:nvPr>
             <p:extLst>
               <p:ext uri="{D42A27DB-BD31-4B8C-83A1-F6EECF244321}">
-                <p14:modId xmlns:p14="http://schemas.microsoft.com/office/powerpoint/2010/main" val="2050264080"/>
+                <p14:modId xmlns:p14="http://schemas.microsoft.com/office/powerpoint/2010/main" val="3691015575"/>
               </p:ext>
             </p:extLst>
           </p:nvPr>
         </p:nvGraphicFramePr>
         <p:xfrm>
-          <a:off x="838200" y="4165600"/>
-          <a:ext cx="10464804" cy="1112520"/>
+          <a:off x="321734" y="4001294"/>
+          <a:ext cx="3488268" cy="1483360"/>
         </p:xfrm>
         <a:graphic>
           <a:graphicData uri="http://schemas.openxmlformats.org/drawingml/2006/table">
@@ -5705,13 +5705,102 @@
                 <a:gridCol w="1162756"/>
                 <a:gridCol w="1162756"/>
                 <a:gridCol w="1162756"/>
-                <a:gridCol w="1162756"/>
-                <a:gridCol w="1162756"/>
-                <a:gridCol w="1162756"/>
-                <a:gridCol w="1162756"/>
-                <a:gridCol w="1162756"/>
-                <a:gridCol w="1162756"/>
               </a:tblGrid>
+              <a:tr h="370840">
+                <a:tc gridSpan="3">
+                  <a:txBody>
+                    <a:bodyPr/>
+                    <a:lstStyle/>
+                    <a:p>
+                      <a:pPr algn="ctr"/>
+                      <a:r>
+                        <a:rPr lang="en-US" b="0" dirty="0" smtClean="0">
+                          <a:solidFill>
+                            <a:schemeClr val="bg1"/>
+                          </a:solidFill>
+                        </a:rPr>
+                        <a:t>0x0</a:t>
+                      </a:r>
+                      <a:endParaRPr lang="en-US" b="0" dirty="0">
+                        <a:solidFill>
+                          <a:schemeClr val="bg1"/>
+                        </a:solidFill>
+                      </a:endParaRPr>
+                    </a:p>
+                  </a:txBody>
+                  <a:tcPr>
+                    <a:lnL w="12700" cap="flat" cmpd="sng" algn="ctr">
+                      <a:solidFill>
+                        <a:schemeClr val="tx1"/>
+                      </a:solidFill>
+                      <a:prstDash val="solid"/>
+                      <a:round/>
+                      <a:headEnd type="none" w="med" len="med"/>
+                      <a:tailEnd type="none" w="med" len="med"/>
+                    </a:lnL>
+                    <a:lnR w="12700" cap="flat" cmpd="sng" algn="ctr">
+                      <a:solidFill>
+                        <a:schemeClr val="tx1"/>
+                      </a:solidFill>
+                      <a:prstDash val="solid"/>
+                      <a:round/>
+                      <a:headEnd type="none" w="med" len="med"/>
+                      <a:tailEnd type="none" w="med" len="med"/>
+                    </a:lnR>
+                    <a:lnT w="12700" cap="flat" cmpd="sng" algn="ctr">
+                      <a:solidFill>
+                        <a:schemeClr val="tx1"/>
+                      </a:solidFill>
+                      <a:prstDash val="solid"/>
+                      <a:round/>
+                      <a:headEnd type="none" w="med" len="med"/>
+                      <a:tailEnd type="none" w="med" len="med"/>
+                    </a:lnT>
+                    <a:lnB w="12700" cap="flat" cmpd="sng" algn="ctr">
+                      <a:solidFill>
+                        <a:schemeClr val="tx1"/>
+                      </a:solidFill>
+                      <a:prstDash val="solid"/>
+                      <a:round/>
+                      <a:headEnd type="none" w="med" len="med"/>
+                      <a:tailEnd type="none" w="med" len="med"/>
+                    </a:lnB>
+                    <a:lnTlToBr w="12700" cmpd="sng">
+                      <a:noFill/>
+                      <a:prstDash val="solid"/>
+                    </a:lnTlToBr>
+                    <a:lnBlToTr w="12700" cmpd="sng">
+                      <a:noFill/>
+                      <a:prstDash val="solid"/>
+                    </a:lnBlToTr>
+                    <a:solidFill>
+                      <a:schemeClr val="tx1">
+                        <a:lumMod val="50000"/>
+                      </a:schemeClr>
+                    </a:solidFill>
+                  </a:tcPr>
+                </a:tc>
+                <a:tc hMerge="1">
+                  <a:txBody>
+                    <a:bodyPr/>
+                    <a:lstStyle/>
+                    <a:p>
+                      <a:endParaRPr lang="en-US"/>
+                    </a:p>
+                  </a:txBody>
+                  <a:tcPr/>
+                </a:tc>
+                <a:tc hMerge="1">
+                  <a:txBody>
+                    <a:bodyPr/>
+                    <a:lstStyle/>
+                    <a:p>
+                      <a:endParaRPr lang="en-US"/>
+                    </a:p>
+                  </a:txBody>
+                  <a:tcPr/>
+                </a:tc>
+              </a:tr>
               <a:tr h="370840">
                 <a:tc gridSpan="3">
                   <a:txBody>
@@ -5732,382 +5821,6 @@
                           <a:schemeClr val="bg1"/>
                         </a:solidFill>
                       </a:endParaRPr>
-                    </a:p>
-                  </a:txBody>
-                  <a:tcPr>
-                    <a:lnL w="12700" cap="flat" cmpd="sng" algn="ctr">
-                      <a:solidFill>
-                        <a:schemeClr val="tx1"/>
-                      </a:solidFill>
-                      <a:prstDash val="solid"/>
-                      <a:round/>
-                      <a:headEnd type="none" w="med" len="med"/>
-                      <a:tailEnd type="none" w="med" len="med"/>
-                    </a:lnL>
-                    <a:lnR w="12700" cap="flat" cmpd="sng" algn="ctr">
-                      <a:solidFill>
-                        <a:schemeClr val="tx1"/>
-                      </a:solidFill>
-                      <a:prstDash val="solid"/>
-                      <a:round/>
-                      <a:headEnd type="none" w="med" len="med"/>
-                      <a:tailEnd type="none" w="med" len="med"/>
-                    </a:lnR>
-                    <a:lnT w="12700" cap="flat" cmpd="sng" algn="ctr">
-                      <a:solidFill>
-                        <a:schemeClr val="tx1"/>
-                      </a:solidFill>
-                      <a:prstDash val="solid"/>
-                      <a:round/>
-                      <a:headEnd type="none" w="med" len="med"/>
-                      <a:tailEnd type="none" w="med" len="med"/>
-                    </a:lnT>
-                    <a:lnB w="12700" cap="flat" cmpd="sng" algn="ctr">
-                      <a:solidFill>
-                        <a:schemeClr val="tx1"/>
-                      </a:solidFill>
-                      <a:prstDash val="solid"/>
-                      <a:round/>
-                      <a:headEnd type="none" w="med" len="med"/>
-                      <a:tailEnd type="none" w="med" len="med"/>
-                    </a:lnB>
-                    <a:lnTlToBr w="12700" cmpd="sng">
-                      <a:noFill/>
-                      <a:prstDash val="solid"/>
-                    </a:lnTlToBr>
-                    <a:lnBlToTr w="12700" cmpd="sng">
-                      <a:noFill/>
-                      <a:prstDash val="solid"/>
-                    </a:lnBlToTr>
-                    <a:solidFill>
-                      <a:schemeClr val="tx1">
-                        <a:lumMod val="50000"/>
-                      </a:schemeClr>
-                    </a:solidFill>
-                  </a:tcPr>
-                </a:tc>
-                <a:tc hMerge="1">
-                  <a:txBody>
-                    <a:bodyPr/>
-                    <a:lstStyle/>
-                    <a:p>
-                      <a:endParaRPr lang="en-US" dirty="0"/>
-                    </a:p>
-                  </a:txBody>
-                  <a:tcPr>
-                    <a:lnL w="12700" cap="flat" cmpd="sng" algn="ctr">
-                      <a:solidFill>
-                        <a:schemeClr val="tx1"/>
-                      </a:solidFill>
-                      <a:prstDash val="solid"/>
-                      <a:round/>
-                      <a:headEnd type="none" w="med" len="med"/>
-                      <a:tailEnd type="none" w="med" len="med"/>
-                    </a:lnL>
-                    <a:lnR w="12700" cap="flat" cmpd="sng" algn="ctr">
-                      <a:solidFill>
-                        <a:schemeClr val="tx1"/>
-                      </a:solidFill>
-                      <a:prstDash val="solid"/>
-                      <a:round/>
-                      <a:headEnd type="none" w="med" len="med"/>
-                      <a:tailEnd type="none" w="med" len="med"/>
-                    </a:lnR>
-                    <a:lnT w="12700" cap="flat" cmpd="sng" algn="ctr">
-                      <a:solidFill>
-                        <a:schemeClr val="tx1"/>
-                      </a:solidFill>
-                      <a:prstDash val="solid"/>
-                      <a:round/>
-                      <a:headEnd type="none" w="med" len="med"/>
-                      <a:tailEnd type="none" w="med" len="med"/>
-                    </a:lnT>
-                    <a:lnB w="12700" cap="flat" cmpd="sng" algn="ctr">
-                      <a:solidFill>
-                        <a:schemeClr val="tx1"/>
-                      </a:solidFill>
-                      <a:prstDash val="solid"/>
-                      <a:round/>
-                      <a:headEnd type="none" w="med" len="med"/>
-                      <a:tailEnd type="none" w="med" len="med"/>
-                    </a:lnB>
-                    <a:lnTlToBr w="12700" cmpd="sng">
-                      <a:noFill/>
-                      <a:prstDash val="solid"/>
-                    </a:lnTlToBr>
-                    <a:lnBlToTr w="12700" cmpd="sng">
-                      <a:noFill/>
-                      <a:prstDash val="solid"/>
-                    </a:lnBlToTr>
-                    <a:solidFill>
-                      <a:schemeClr val="tx1">
-                        <a:lumMod val="50000"/>
-                      </a:schemeClr>
-                    </a:solidFill>
-                  </a:tcPr>
-                </a:tc>
-                <a:tc hMerge="1">
-                  <a:txBody>
-                    <a:bodyPr/>
-                    <a:lstStyle/>
-                    <a:p>
-                      <a:endParaRPr lang="en-US" dirty="0"/>
-                    </a:p>
-                  </a:txBody>
-                  <a:tcPr>
-                    <a:lnL w="12700" cap="flat" cmpd="sng" algn="ctr">
-                      <a:solidFill>
-                        <a:schemeClr val="tx1"/>
-                      </a:solidFill>
-                      <a:prstDash val="solid"/>
-                      <a:round/>
-                      <a:headEnd type="none" w="med" len="med"/>
-                      <a:tailEnd type="none" w="med" len="med"/>
-                    </a:lnL>
-                    <a:lnR w="12700" cap="flat" cmpd="sng" algn="ctr">
-                      <a:solidFill>
-                        <a:schemeClr val="tx1"/>
-                      </a:solidFill>
-                      <a:prstDash val="solid"/>
-                      <a:round/>
-                      <a:headEnd type="none" w="med" len="med"/>
-                      <a:tailEnd type="none" w="med" len="med"/>
-                    </a:lnR>
-                    <a:lnT w="12700" cap="flat" cmpd="sng" algn="ctr">
-                      <a:solidFill>
-                        <a:schemeClr val="tx1"/>
-                      </a:solidFill>
-                      <a:prstDash val="solid"/>
-                      <a:round/>
-                      <a:headEnd type="none" w="med" len="med"/>
-                      <a:tailEnd type="none" w="med" len="med"/>
-                    </a:lnT>
-                    <a:lnB w="12700" cap="flat" cmpd="sng" algn="ctr">
-                      <a:solidFill>
-                        <a:schemeClr val="tx1"/>
-                      </a:solidFill>
-                      <a:prstDash val="solid"/>
-                      <a:round/>
-                      <a:headEnd type="none" w="med" len="med"/>
-                      <a:tailEnd type="none" w="med" len="med"/>
-                    </a:lnB>
-                    <a:lnTlToBr w="12700" cmpd="sng">
-                      <a:noFill/>
-                      <a:prstDash val="solid"/>
-                    </a:lnTlToBr>
-                    <a:lnBlToTr w="12700" cmpd="sng">
-                      <a:noFill/>
-                      <a:prstDash val="solid"/>
-                    </a:lnBlToTr>
-                    <a:solidFill>
-                      <a:schemeClr val="tx1">
-                        <a:lumMod val="50000"/>
-                      </a:schemeClr>
-                    </a:solidFill>
-                  </a:tcPr>
-                </a:tc>
-                <a:tc gridSpan="3">
-                  <a:txBody>
-                    <a:bodyPr/>
-                    <a:lstStyle/>
-                    <a:p>
-                      <a:pPr algn="ctr"/>
-                      <a:r>
-                        <a:rPr lang="en-US" b="0" dirty="0" smtClean="0">
-                          <a:solidFill>
-                            <a:schemeClr val="bg1"/>
-                          </a:solidFill>
-                        </a:rPr>
-                        <a:t>Ant 2</a:t>
-                      </a:r>
-                    </a:p>
-                  </a:txBody>
-                  <a:tcPr>
-                    <a:lnL w="12700" cap="flat" cmpd="sng" algn="ctr">
-                      <a:solidFill>
-                        <a:schemeClr val="tx1"/>
-                      </a:solidFill>
-                      <a:prstDash val="solid"/>
-                      <a:round/>
-                      <a:headEnd type="none" w="med" len="med"/>
-                      <a:tailEnd type="none" w="med" len="med"/>
-                    </a:lnL>
-                    <a:lnR w="12700" cap="flat" cmpd="sng" algn="ctr">
-                      <a:solidFill>
-                        <a:schemeClr val="tx1"/>
-                      </a:solidFill>
-                      <a:prstDash val="solid"/>
-                      <a:round/>
-                      <a:headEnd type="none" w="med" len="med"/>
-                      <a:tailEnd type="none" w="med" len="med"/>
-                    </a:lnR>
-                    <a:lnT w="12700" cap="flat" cmpd="sng" algn="ctr">
-                      <a:solidFill>
-                        <a:schemeClr val="tx1"/>
-                      </a:solidFill>
-                      <a:prstDash val="solid"/>
-                      <a:round/>
-                      <a:headEnd type="none" w="med" len="med"/>
-                      <a:tailEnd type="none" w="med" len="med"/>
-                    </a:lnT>
-                    <a:lnB w="12700" cap="flat" cmpd="sng" algn="ctr">
-                      <a:solidFill>
-                        <a:schemeClr val="tx1"/>
-                      </a:solidFill>
-                      <a:prstDash val="solid"/>
-                      <a:round/>
-                      <a:headEnd type="none" w="med" len="med"/>
-                      <a:tailEnd type="none" w="med" len="med"/>
-                    </a:lnB>
-                    <a:lnTlToBr w="12700" cmpd="sng">
-                      <a:noFill/>
-                      <a:prstDash val="solid"/>
-                    </a:lnTlToBr>
-                    <a:lnBlToTr w="12700" cmpd="sng">
-                      <a:noFill/>
-                      <a:prstDash val="solid"/>
-                    </a:lnBlToTr>
-                    <a:solidFill>
-                      <a:schemeClr val="tx1">
-                        <a:lumMod val="50000"/>
-                      </a:schemeClr>
-                    </a:solidFill>
-                  </a:tcPr>
-                </a:tc>
-                <a:tc hMerge="1">
-                  <a:txBody>
-                    <a:bodyPr/>
-                    <a:lstStyle/>
-                    <a:p>
-                      <a:endParaRPr lang="en-US" dirty="0"/>
-                    </a:p>
-                  </a:txBody>
-                  <a:tcPr>
-                    <a:lnL w="12700" cap="flat" cmpd="sng" algn="ctr">
-                      <a:solidFill>
-                        <a:schemeClr val="tx1"/>
-                      </a:solidFill>
-                      <a:prstDash val="solid"/>
-                      <a:round/>
-                      <a:headEnd type="none" w="med" len="med"/>
-                      <a:tailEnd type="none" w="med" len="med"/>
-                    </a:lnL>
-                    <a:lnR w="12700" cap="flat" cmpd="sng" algn="ctr">
-                      <a:solidFill>
-                        <a:schemeClr val="tx1"/>
-                      </a:solidFill>
-                      <a:prstDash val="solid"/>
-                      <a:round/>
-                      <a:headEnd type="none" w="med" len="med"/>
-                      <a:tailEnd type="none" w="med" len="med"/>
-                    </a:lnR>
-                    <a:lnT w="12700" cap="flat" cmpd="sng" algn="ctr">
-                      <a:solidFill>
-                        <a:schemeClr val="tx1"/>
-                      </a:solidFill>
-                      <a:prstDash val="solid"/>
-                      <a:round/>
-                      <a:headEnd type="none" w="med" len="med"/>
-                      <a:tailEnd type="none" w="med" len="med"/>
-                    </a:lnT>
-                    <a:lnB w="12700" cap="flat" cmpd="sng" algn="ctr">
-                      <a:solidFill>
-                        <a:schemeClr val="tx1"/>
-                      </a:solidFill>
-                      <a:prstDash val="solid"/>
-                      <a:round/>
-                      <a:headEnd type="none" w="med" len="med"/>
-                      <a:tailEnd type="none" w="med" len="med"/>
-                    </a:lnB>
-                    <a:lnTlToBr w="12700" cmpd="sng">
-                      <a:noFill/>
-                      <a:prstDash val="solid"/>
-                    </a:lnTlToBr>
-                    <a:lnBlToTr w="12700" cmpd="sng">
-                      <a:noFill/>
-                      <a:prstDash val="solid"/>
-                    </a:lnBlToTr>
-                    <a:solidFill>
-                      <a:schemeClr val="tx1">
-                        <a:lumMod val="50000"/>
-                      </a:schemeClr>
-                    </a:solidFill>
-                  </a:tcPr>
-                </a:tc>
-                <a:tc hMerge="1">
-                  <a:txBody>
-                    <a:bodyPr/>
-                    <a:lstStyle/>
-                    <a:p>
-                      <a:endParaRPr lang="en-US" dirty="0"/>
-                    </a:p>
-                  </a:txBody>
-                  <a:tcPr>
-                    <a:lnL w="12700" cap="flat" cmpd="sng" algn="ctr">
-                      <a:solidFill>
-                        <a:schemeClr val="tx1"/>
-                      </a:solidFill>
-                      <a:prstDash val="solid"/>
-                      <a:round/>
-                      <a:headEnd type="none" w="med" len="med"/>
-                      <a:tailEnd type="none" w="med" len="med"/>
-                    </a:lnL>
-                    <a:lnR w="12700" cap="flat" cmpd="sng" algn="ctr">
-                      <a:solidFill>
-                        <a:schemeClr val="tx1"/>
-                      </a:solidFill>
-                      <a:prstDash val="solid"/>
-                      <a:round/>
-                      <a:headEnd type="none" w="med" len="med"/>
-                      <a:tailEnd type="none" w="med" len="med"/>
-                    </a:lnR>
-                    <a:lnT w="12700" cap="flat" cmpd="sng" algn="ctr">
-                      <a:solidFill>
-                        <a:schemeClr val="tx1"/>
-                      </a:solidFill>
-                      <a:prstDash val="solid"/>
-                      <a:round/>
-                      <a:headEnd type="none" w="med" len="med"/>
-                      <a:tailEnd type="none" w="med" len="med"/>
-                    </a:lnT>
-                    <a:lnB w="12700" cap="flat" cmpd="sng" algn="ctr">
-                      <a:solidFill>
-                        <a:schemeClr val="tx1"/>
-                      </a:solidFill>
-                      <a:prstDash val="solid"/>
-                      <a:round/>
-                      <a:headEnd type="none" w="med" len="med"/>
-                      <a:tailEnd type="none" w="med" len="med"/>
-                    </a:lnB>
-                    <a:lnTlToBr w="12700" cmpd="sng">
-                      <a:noFill/>
-                      <a:prstDash val="solid"/>
-                    </a:lnTlToBr>
-                    <a:lnBlToTr w="12700" cmpd="sng">
-                      <a:noFill/>
-                      <a:prstDash val="solid"/>
-                    </a:lnBlToTr>
-                    <a:solidFill>
-                      <a:schemeClr val="tx1">
-                        <a:lumMod val="50000"/>
-                      </a:schemeClr>
-                    </a:solidFill>
-                  </a:tcPr>
-                </a:tc>
-                <a:tc gridSpan="3">
-                  <a:txBody>
-                    <a:bodyPr/>
-                    <a:lstStyle/>
-                    <a:p>
-                      <a:pPr algn="ctr"/>
-                      <a:r>
-                        <a:rPr lang="en-US" b="0" dirty="0" smtClean="0">
-                          <a:solidFill>
-                            <a:schemeClr val="bg1"/>
-                          </a:solidFill>
-                        </a:rPr>
-                        <a:t>Ant ...n</a:t>
-                      </a:r>
                     </a:p>
                   </a:txBody>
                   <a:tcPr>
@@ -6524,6 +6237,533 @@
                     </a:solidFill>
                   </a:tcPr>
                 </a:tc>
+              </a:tr>
+              <a:tr h="370840">
+                <a:tc>
+                  <a:txBody>
+                    <a:bodyPr/>
+                    <a:lstStyle/>
+                    <a:p>
+                      <a:r>
+                        <a:rPr lang="en-US" dirty="0" smtClean="0"/>
+                        <a:t>8bytes</a:t>
+                      </a:r>
+                      <a:endParaRPr lang="en-US" dirty="0"/>
+                    </a:p>
+                  </a:txBody>
+                  <a:tcPr>
+                    <a:lnL w="12700" cap="flat" cmpd="sng" algn="ctr">
+                      <a:solidFill>
+                        <a:schemeClr val="tx1"/>
+                      </a:solidFill>
+                      <a:prstDash val="solid"/>
+                      <a:round/>
+                      <a:headEnd type="none" w="med" len="med"/>
+                      <a:tailEnd type="none" w="med" len="med"/>
+                    </a:lnL>
+                    <a:lnR w="12700" cap="flat" cmpd="sng" algn="ctr">
+                      <a:solidFill>
+                        <a:schemeClr val="tx1"/>
+                      </a:solidFill>
+                      <a:prstDash val="solid"/>
+                      <a:round/>
+                      <a:headEnd type="none" w="med" len="med"/>
+                      <a:tailEnd type="none" w="med" len="med"/>
+                    </a:lnR>
+                    <a:lnT w="12700" cap="flat" cmpd="sng" algn="ctr">
+                      <a:solidFill>
+                        <a:schemeClr val="tx1"/>
+                      </a:solidFill>
+                      <a:prstDash val="solid"/>
+                      <a:round/>
+                      <a:headEnd type="none" w="med" len="med"/>
+                      <a:tailEnd type="none" w="med" len="med"/>
+                    </a:lnT>
+                    <a:lnB w="12700" cap="flat" cmpd="sng" algn="ctr">
+                      <a:solidFill>
+                        <a:schemeClr val="tx1"/>
+                      </a:solidFill>
+                      <a:prstDash val="solid"/>
+                      <a:round/>
+                      <a:headEnd type="none" w="med" len="med"/>
+                      <a:tailEnd type="none" w="med" len="med"/>
+                    </a:lnB>
+                    <a:lnTlToBr w="12700" cmpd="sng">
+                      <a:noFill/>
+                      <a:prstDash val="solid"/>
+                    </a:lnTlToBr>
+                    <a:lnBlToTr w="12700" cmpd="sng">
+                      <a:noFill/>
+                      <a:prstDash val="solid"/>
+                    </a:lnBlToTr>
+                    <a:solidFill>
+                      <a:schemeClr val="tx1">
+                        <a:lumMod val="50000"/>
+                      </a:schemeClr>
+                    </a:solidFill>
+                  </a:tcPr>
+                </a:tc>
+                <a:tc>
+                  <a:txBody>
+                    <a:bodyPr/>
+                    <a:lstStyle/>
+                    <a:p>
+                      <a:r>
+                        <a:rPr lang="en-US" dirty="0" smtClean="0"/>
+                        <a:t>8bytes</a:t>
+                      </a:r>
+                      <a:endParaRPr lang="en-US" dirty="0"/>
+                    </a:p>
+                  </a:txBody>
+                  <a:tcPr>
+                    <a:lnL w="12700" cap="flat" cmpd="sng" algn="ctr">
+                      <a:solidFill>
+                        <a:schemeClr val="tx1"/>
+                      </a:solidFill>
+                      <a:prstDash val="solid"/>
+                      <a:round/>
+                      <a:headEnd type="none" w="med" len="med"/>
+                      <a:tailEnd type="none" w="med" len="med"/>
+                    </a:lnL>
+                    <a:lnR w="12700" cap="flat" cmpd="sng" algn="ctr">
+                      <a:solidFill>
+                        <a:schemeClr val="tx1"/>
+                      </a:solidFill>
+                      <a:prstDash val="solid"/>
+                      <a:round/>
+                      <a:headEnd type="none" w="med" len="med"/>
+                      <a:tailEnd type="none" w="med" len="med"/>
+                    </a:lnR>
+                    <a:lnT w="12700" cap="flat" cmpd="sng" algn="ctr">
+                      <a:solidFill>
+                        <a:schemeClr val="tx1"/>
+                      </a:solidFill>
+                      <a:prstDash val="solid"/>
+                      <a:round/>
+                      <a:headEnd type="none" w="med" len="med"/>
+                      <a:tailEnd type="none" w="med" len="med"/>
+                    </a:lnT>
+                    <a:lnB w="12700" cap="flat" cmpd="sng" algn="ctr">
+                      <a:solidFill>
+                        <a:schemeClr val="tx1"/>
+                      </a:solidFill>
+                      <a:prstDash val="solid"/>
+                      <a:round/>
+                      <a:headEnd type="none" w="med" len="med"/>
+                      <a:tailEnd type="none" w="med" len="med"/>
+                    </a:lnB>
+                    <a:lnTlToBr w="12700" cmpd="sng">
+                      <a:noFill/>
+                      <a:prstDash val="solid"/>
+                    </a:lnTlToBr>
+                    <a:lnBlToTr w="12700" cmpd="sng">
+                      <a:noFill/>
+                      <a:prstDash val="solid"/>
+                    </a:lnBlToTr>
+                    <a:solidFill>
+                      <a:schemeClr val="tx1">
+                        <a:lumMod val="50000"/>
+                      </a:schemeClr>
+                    </a:solidFill>
+                  </a:tcPr>
+                </a:tc>
+                <a:tc>
+                  <a:txBody>
+                    <a:bodyPr/>
+                    <a:lstStyle/>
+                    <a:p>
+                      <a:r>
+                        <a:rPr lang="en-US" dirty="0" smtClean="0"/>
+                        <a:t>4bytes</a:t>
+                      </a:r>
+                      <a:endParaRPr lang="en-US" dirty="0"/>
+                    </a:p>
+                  </a:txBody>
+                  <a:tcPr>
+                    <a:lnL w="12700" cap="flat" cmpd="sng" algn="ctr">
+                      <a:solidFill>
+                        <a:schemeClr val="tx1"/>
+                      </a:solidFill>
+                      <a:prstDash val="solid"/>
+                      <a:round/>
+                      <a:headEnd type="none" w="med" len="med"/>
+                      <a:tailEnd type="none" w="med" len="med"/>
+                    </a:lnL>
+                    <a:lnR w="12700" cap="flat" cmpd="sng" algn="ctr">
+                      <a:solidFill>
+                        <a:schemeClr val="tx1"/>
+                      </a:solidFill>
+                      <a:prstDash val="solid"/>
+                      <a:round/>
+                      <a:headEnd type="none" w="med" len="med"/>
+                      <a:tailEnd type="none" w="med" len="med"/>
+                    </a:lnR>
+                    <a:lnT w="12700" cap="flat" cmpd="sng" algn="ctr">
+                      <a:solidFill>
+                        <a:schemeClr val="tx1"/>
+                      </a:solidFill>
+                      <a:prstDash val="solid"/>
+                      <a:round/>
+                      <a:headEnd type="none" w="med" len="med"/>
+                      <a:tailEnd type="none" w="med" len="med"/>
+                    </a:lnT>
+                    <a:lnB w="12700" cap="flat" cmpd="sng" algn="ctr">
+                      <a:solidFill>
+                        <a:schemeClr val="tx1"/>
+                      </a:solidFill>
+                      <a:prstDash val="solid"/>
+                      <a:round/>
+                      <a:headEnd type="none" w="med" len="med"/>
+                      <a:tailEnd type="none" w="med" len="med"/>
+                    </a:lnB>
+                    <a:lnTlToBr w="12700" cmpd="sng">
+                      <a:noFill/>
+                      <a:prstDash val="solid"/>
+                    </a:lnTlToBr>
+                    <a:lnBlToTr w="12700" cmpd="sng">
+                      <a:noFill/>
+                      <a:prstDash val="solid"/>
+                    </a:lnBlToTr>
+                    <a:solidFill>
+                      <a:schemeClr val="tx1">
+                        <a:lumMod val="50000"/>
+                      </a:schemeClr>
+                    </a:solidFill>
+                  </a:tcPr>
+                </a:tc>
+              </a:tr>
+            </a:tbl>
+          </a:graphicData>
+        </a:graphic>
+      </p:graphicFrame>
+      <p:graphicFrame>
+        <p:nvGraphicFramePr>
+          <p:cNvPr id="5" name="Table 4"/>
+          <p:cNvGraphicFramePr>
+            <a:graphicFrameLocks noGrp="1"/>
+          </p:cNvGraphicFramePr>
+          <p:nvPr>
+            <p:extLst>
+              <p:ext uri="{D42A27DB-BD31-4B8C-83A1-F6EECF244321}">
+                <p14:modId xmlns:p14="http://schemas.microsoft.com/office/powerpoint/2010/main" val="1221252816"/>
+              </p:ext>
+            </p:extLst>
+          </p:nvPr>
+        </p:nvGraphicFramePr>
+        <p:xfrm>
+          <a:off x="4842933" y="2856600"/>
+          <a:ext cx="3488268" cy="1483360"/>
+        </p:xfrm>
+        <a:graphic>
+          <a:graphicData uri="http://schemas.openxmlformats.org/drawingml/2006/table">
+            <a:tbl>
+              <a:tblPr firstRow="1" bandRow="1">
+                <a:tableStyleId>{5C22544A-7EE6-4342-B048-85BDC9FD1C3A}</a:tableStyleId>
+              </a:tblPr>
+              <a:tblGrid>
+                <a:gridCol w="1162756"/>
+                <a:gridCol w="1162756"/>
+                <a:gridCol w="1162756"/>
+              </a:tblGrid>
+              <a:tr h="370840">
+                <a:tc gridSpan="3">
+                  <a:txBody>
+                    <a:bodyPr/>
+                    <a:lstStyle/>
+                    <a:p>
+                      <a:pPr algn="ctr"/>
+                      <a:r>
+                        <a:rPr lang="en-US" b="0" dirty="0" smtClean="0">
+                          <a:solidFill>
+                            <a:schemeClr val="bg1"/>
+                          </a:solidFill>
+                        </a:rPr>
+                        <a:t>0x105</a:t>
+                      </a:r>
+                      <a:endParaRPr lang="en-US" b="0" dirty="0">
+                        <a:solidFill>
+                          <a:schemeClr val="bg1"/>
+                        </a:solidFill>
+                      </a:endParaRPr>
+                    </a:p>
+                  </a:txBody>
+                  <a:tcPr>
+                    <a:lnL w="12700" cap="flat" cmpd="sng" algn="ctr">
+                      <a:solidFill>
+                        <a:schemeClr val="tx1"/>
+                      </a:solidFill>
+                      <a:prstDash val="solid"/>
+                      <a:round/>
+                      <a:headEnd type="none" w="med" len="med"/>
+                      <a:tailEnd type="none" w="med" len="med"/>
+                    </a:lnL>
+                    <a:lnR w="12700" cap="flat" cmpd="sng" algn="ctr">
+                      <a:solidFill>
+                        <a:schemeClr val="tx1"/>
+                      </a:solidFill>
+                      <a:prstDash val="solid"/>
+                      <a:round/>
+                      <a:headEnd type="none" w="med" len="med"/>
+                      <a:tailEnd type="none" w="med" len="med"/>
+                    </a:lnR>
+                    <a:lnT w="12700" cap="flat" cmpd="sng" algn="ctr">
+                      <a:solidFill>
+                        <a:schemeClr val="tx1"/>
+                      </a:solidFill>
+                      <a:prstDash val="solid"/>
+                      <a:round/>
+                      <a:headEnd type="none" w="med" len="med"/>
+                      <a:tailEnd type="none" w="med" len="med"/>
+                    </a:lnT>
+                    <a:lnB w="12700" cap="flat" cmpd="sng" algn="ctr">
+                      <a:solidFill>
+                        <a:schemeClr val="tx1"/>
+                      </a:solidFill>
+                      <a:prstDash val="solid"/>
+                      <a:round/>
+                      <a:headEnd type="none" w="med" len="med"/>
+                      <a:tailEnd type="none" w="med" len="med"/>
+                    </a:lnB>
+                    <a:lnTlToBr w="12700" cmpd="sng">
+                      <a:noFill/>
+                      <a:prstDash val="solid"/>
+                    </a:lnTlToBr>
+                    <a:lnBlToTr w="12700" cmpd="sng">
+                      <a:noFill/>
+                      <a:prstDash val="solid"/>
+                    </a:lnBlToTr>
+                    <a:solidFill>
+                      <a:schemeClr val="tx1">
+                        <a:lumMod val="50000"/>
+                      </a:schemeClr>
+                    </a:solidFill>
+                  </a:tcPr>
+                </a:tc>
+                <a:tc hMerge="1">
+                  <a:txBody>
+                    <a:bodyPr/>
+                    <a:lstStyle/>
+                    <a:p>
+                      <a:endParaRPr lang="en-US"/>
+                    </a:p>
+                  </a:txBody>
+                  <a:tcPr/>
+                </a:tc>
+                <a:tc hMerge="1">
+                  <a:txBody>
+                    <a:bodyPr/>
+                    <a:lstStyle/>
+                    <a:p>
+                      <a:endParaRPr lang="en-US"/>
+                    </a:p>
+                  </a:txBody>
+                  <a:tcPr/>
+                </a:tc>
+              </a:tr>
+              <a:tr h="370840">
+                <a:tc gridSpan="3">
+                  <a:txBody>
+                    <a:bodyPr/>
+                    <a:lstStyle/>
+                    <a:p>
+                      <a:pPr algn="ctr"/>
+                      <a:r>
+                        <a:rPr lang="en-US" b="0" dirty="0" smtClean="0">
+                          <a:solidFill>
+                            <a:schemeClr val="bg1"/>
+                          </a:solidFill>
+                        </a:rPr>
+                        <a:t>Ant </a:t>
+                      </a:r>
+                      <a:r>
+                        <a:rPr lang="en-US" b="0" dirty="0" smtClean="0">
+                          <a:solidFill>
+                            <a:schemeClr val="bg1"/>
+                          </a:solidFill>
+                        </a:rPr>
+                        <a:t>2</a:t>
+                      </a:r>
+                      <a:endParaRPr lang="en-US" b="0" dirty="0">
+                        <a:solidFill>
+                          <a:schemeClr val="bg1"/>
+                        </a:solidFill>
+                      </a:endParaRPr>
+                    </a:p>
+                  </a:txBody>
+                  <a:tcPr>
+                    <a:lnL w="12700" cap="flat" cmpd="sng" algn="ctr">
+                      <a:solidFill>
+                        <a:schemeClr val="tx1"/>
+                      </a:solidFill>
+                      <a:prstDash val="solid"/>
+                      <a:round/>
+                      <a:headEnd type="none" w="med" len="med"/>
+                      <a:tailEnd type="none" w="med" len="med"/>
+                    </a:lnL>
+                    <a:lnR w="12700" cap="flat" cmpd="sng" algn="ctr">
+                      <a:solidFill>
+                        <a:schemeClr val="tx1"/>
+                      </a:solidFill>
+                      <a:prstDash val="solid"/>
+                      <a:round/>
+                      <a:headEnd type="none" w="med" len="med"/>
+                      <a:tailEnd type="none" w="med" len="med"/>
+                    </a:lnR>
+                    <a:lnT w="12700" cap="flat" cmpd="sng" algn="ctr">
+                      <a:solidFill>
+                        <a:schemeClr val="tx1"/>
+                      </a:solidFill>
+                      <a:prstDash val="solid"/>
+                      <a:round/>
+                      <a:headEnd type="none" w="med" len="med"/>
+                      <a:tailEnd type="none" w="med" len="med"/>
+                    </a:lnT>
+                    <a:lnB w="12700" cap="flat" cmpd="sng" algn="ctr">
+                      <a:solidFill>
+                        <a:schemeClr val="tx1"/>
+                      </a:solidFill>
+                      <a:prstDash val="solid"/>
+                      <a:round/>
+                      <a:headEnd type="none" w="med" len="med"/>
+                      <a:tailEnd type="none" w="med" len="med"/>
+                    </a:lnB>
+                    <a:lnTlToBr w="12700" cmpd="sng">
+                      <a:noFill/>
+                      <a:prstDash val="solid"/>
+                    </a:lnTlToBr>
+                    <a:lnBlToTr w="12700" cmpd="sng">
+                      <a:noFill/>
+                      <a:prstDash val="solid"/>
+                    </a:lnBlToTr>
+                    <a:solidFill>
+                      <a:schemeClr val="tx1">
+                        <a:lumMod val="50000"/>
+                      </a:schemeClr>
+                    </a:solidFill>
+                  </a:tcPr>
+                </a:tc>
+                <a:tc hMerge="1">
+                  <a:txBody>
+                    <a:bodyPr/>
+                    <a:lstStyle/>
+                    <a:p>
+                      <a:endParaRPr lang="en-US" dirty="0"/>
+                    </a:p>
+                  </a:txBody>
+                  <a:tcPr>
+                    <a:lnL w="12700" cap="flat" cmpd="sng" algn="ctr">
+                      <a:solidFill>
+                        <a:schemeClr val="tx1"/>
+                      </a:solidFill>
+                      <a:prstDash val="solid"/>
+                      <a:round/>
+                      <a:headEnd type="none" w="med" len="med"/>
+                      <a:tailEnd type="none" w="med" len="med"/>
+                    </a:lnL>
+                    <a:lnR w="12700" cap="flat" cmpd="sng" algn="ctr">
+                      <a:solidFill>
+                        <a:schemeClr val="tx1"/>
+                      </a:solidFill>
+                      <a:prstDash val="solid"/>
+                      <a:round/>
+                      <a:headEnd type="none" w="med" len="med"/>
+                      <a:tailEnd type="none" w="med" len="med"/>
+                    </a:lnR>
+                    <a:lnT w="12700" cap="flat" cmpd="sng" algn="ctr">
+                      <a:solidFill>
+                        <a:schemeClr val="tx1"/>
+                      </a:solidFill>
+                      <a:prstDash val="solid"/>
+                      <a:round/>
+                      <a:headEnd type="none" w="med" len="med"/>
+                      <a:tailEnd type="none" w="med" len="med"/>
+                    </a:lnT>
+                    <a:lnB w="12700" cap="flat" cmpd="sng" algn="ctr">
+                      <a:solidFill>
+                        <a:schemeClr val="tx1"/>
+                      </a:solidFill>
+                      <a:prstDash val="solid"/>
+                      <a:round/>
+                      <a:headEnd type="none" w="med" len="med"/>
+                      <a:tailEnd type="none" w="med" len="med"/>
+                    </a:lnB>
+                    <a:lnTlToBr w="12700" cmpd="sng">
+                      <a:noFill/>
+                      <a:prstDash val="solid"/>
+                    </a:lnTlToBr>
+                    <a:lnBlToTr w="12700" cmpd="sng">
+                      <a:noFill/>
+                      <a:prstDash val="solid"/>
+                    </a:lnBlToTr>
+                    <a:solidFill>
+                      <a:schemeClr val="tx1">
+                        <a:lumMod val="50000"/>
+                      </a:schemeClr>
+                    </a:solidFill>
+                  </a:tcPr>
+                </a:tc>
+                <a:tc hMerge="1">
+                  <a:txBody>
+                    <a:bodyPr/>
+                    <a:lstStyle/>
+                    <a:p>
+                      <a:endParaRPr lang="en-US" dirty="0"/>
+                    </a:p>
+                  </a:txBody>
+                  <a:tcPr>
+                    <a:lnL w="12700" cap="flat" cmpd="sng" algn="ctr">
+                      <a:solidFill>
+                        <a:schemeClr val="tx1"/>
+                      </a:solidFill>
+                      <a:prstDash val="solid"/>
+                      <a:round/>
+                      <a:headEnd type="none" w="med" len="med"/>
+                      <a:tailEnd type="none" w="med" len="med"/>
+                    </a:lnL>
+                    <a:lnR w="12700" cap="flat" cmpd="sng" algn="ctr">
+                      <a:solidFill>
+                        <a:schemeClr val="tx1"/>
+                      </a:solidFill>
+                      <a:prstDash val="solid"/>
+                      <a:round/>
+                      <a:headEnd type="none" w="med" len="med"/>
+                      <a:tailEnd type="none" w="med" len="med"/>
+                    </a:lnR>
+                    <a:lnT w="12700" cap="flat" cmpd="sng" algn="ctr">
+                      <a:solidFill>
+                        <a:schemeClr val="tx1"/>
+                      </a:solidFill>
+                      <a:prstDash val="solid"/>
+                      <a:round/>
+                      <a:headEnd type="none" w="med" len="med"/>
+                      <a:tailEnd type="none" w="med" len="med"/>
+                    </a:lnT>
+                    <a:lnB w="12700" cap="flat" cmpd="sng" algn="ctr">
+                      <a:solidFill>
+                        <a:schemeClr val="tx1"/>
+                      </a:solidFill>
+                      <a:prstDash val="solid"/>
+                      <a:round/>
+                      <a:headEnd type="none" w="med" len="med"/>
+                      <a:tailEnd type="none" w="med" len="med"/>
+                    </a:lnB>
+                    <a:lnTlToBr w="12700" cmpd="sng">
+                      <a:noFill/>
+                      <a:prstDash val="solid"/>
+                    </a:lnTlToBr>
+                    <a:lnBlToTr w="12700" cmpd="sng">
+                      <a:noFill/>
+                      <a:prstDash val="solid"/>
+                    </a:lnBlToTr>
+                    <a:solidFill>
+                      <a:schemeClr val="tx1">
+                        <a:lumMod val="50000"/>
+                      </a:schemeClr>
+                    </a:solidFill>
+                  </a:tcPr>
+                </a:tc>
+              </a:tr>
+              <a:tr h="370840">
                 <a:tc>
                   <a:txBody>
                     <a:bodyPr/>
@@ -6764,6 +7004,8 @@
                     </a:solidFill>
                   </a:tcPr>
                 </a:tc>
+              </a:tr>
+              <a:tr h="370840">
                 <a:tc>
                   <a:txBody>
                     <a:bodyPr/>
@@ -6771,9 +7013,544 @@
                     <a:p>
                       <a:r>
                         <a:rPr lang="en-US" dirty="0" smtClean="0"/>
+                        <a:t>8bytes</a:t>
+                      </a:r>
+                      <a:endParaRPr lang="en-US" dirty="0"/>
+                    </a:p>
+                  </a:txBody>
+                  <a:tcPr>
+                    <a:lnL w="12700" cap="flat" cmpd="sng" algn="ctr">
+                      <a:solidFill>
+                        <a:schemeClr val="tx1"/>
+                      </a:solidFill>
+                      <a:prstDash val="solid"/>
+                      <a:round/>
+                      <a:headEnd type="none" w="med" len="med"/>
+                      <a:tailEnd type="none" w="med" len="med"/>
+                    </a:lnL>
+                    <a:lnR w="12700" cap="flat" cmpd="sng" algn="ctr">
+                      <a:solidFill>
+                        <a:schemeClr val="tx1"/>
+                      </a:solidFill>
+                      <a:prstDash val="solid"/>
+                      <a:round/>
+                      <a:headEnd type="none" w="med" len="med"/>
+                      <a:tailEnd type="none" w="med" len="med"/>
+                    </a:lnR>
+                    <a:lnT w="12700" cap="flat" cmpd="sng" algn="ctr">
+                      <a:solidFill>
+                        <a:schemeClr val="tx1"/>
+                      </a:solidFill>
+                      <a:prstDash val="solid"/>
+                      <a:round/>
+                      <a:headEnd type="none" w="med" len="med"/>
+                      <a:tailEnd type="none" w="med" len="med"/>
+                    </a:lnT>
+                    <a:lnB w="12700" cap="flat" cmpd="sng" algn="ctr">
+                      <a:solidFill>
+                        <a:schemeClr val="tx1"/>
+                      </a:solidFill>
+                      <a:prstDash val="solid"/>
+                      <a:round/>
+                      <a:headEnd type="none" w="med" len="med"/>
+                      <a:tailEnd type="none" w="med" len="med"/>
+                    </a:lnB>
+                    <a:lnTlToBr w="12700" cmpd="sng">
+                      <a:noFill/>
+                      <a:prstDash val="solid"/>
+                    </a:lnTlToBr>
+                    <a:lnBlToTr w="12700" cmpd="sng">
+                      <a:noFill/>
+                      <a:prstDash val="solid"/>
+                    </a:lnBlToTr>
+                    <a:solidFill>
+                      <a:schemeClr val="tx1">
+                        <a:lumMod val="50000"/>
+                      </a:schemeClr>
+                    </a:solidFill>
+                  </a:tcPr>
+                </a:tc>
+                <a:tc>
+                  <a:txBody>
+                    <a:bodyPr/>
+                    <a:lstStyle/>
+                    <a:p>
+                      <a:r>
+                        <a:rPr lang="en-US" dirty="0" smtClean="0"/>
+                        <a:t>8bytes</a:t>
+                      </a:r>
+                      <a:endParaRPr lang="en-US" dirty="0"/>
+                    </a:p>
+                  </a:txBody>
+                  <a:tcPr>
+                    <a:lnL w="12700" cap="flat" cmpd="sng" algn="ctr">
+                      <a:solidFill>
+                        <a:schemeClr val="tx1"/>
+                      </a:solidFill>
+                      <a:prstDash val="solid"/>
+                      <a:round/>
+                      <a:headEnd type="none" w="med" len="med"/>
+                      <a:tailEnd type="none" w="med" len="med"/>
+                    </a:lnL>
+                    <a:lnR w="12700" cap="flat" cmpd="sng" algn="ctr">
+                      <a:solidFill>
+                        <a:schemeClr val="tx1"/>
+                      </a:solidFill>
+                      <a:prstDash val="solid"/>
+                      <a:round/>
+                      <a:headEnd type="none" w="med" len="med"/>
+                      <a:tailEnd type="none" w="med" len="med"/>
+                    </a:lnR>
+                    <a:lnT w="12700" cap="flat" cmpd="sng" algn="ctr">
+                      <a:solidFill>
+                        <a:schemeClr val="tx1"/>
+                      </a:solidFill>
+                      <a:prstDash val="solid"/>
+                      <a:round/>
+                      <a:headEnd type="none" w="med" len="med"/>
+                      <a:tailEnd type="none" w="med" len="med"/>
+                    </a:lnT>
+                    <a:lnB w="12700" cap="flat" cmpd="sng" algn="ctr">
+                      <a:solidFill>
+                        <a:schemeClr val="tx1"/>
+                      </a:solidFill>
+                      <a:prstDash val="solid"/>
+                      <a:round/>
+                      <a:headEnd type="none" w="med" len="med"/>
+                      <a:tailEnd type="none" w="med" len="med"/>
+                    </a:lnB>
+                    <a:lnTlToBr w="12700" cmpd="sng">
+                      <a:noFill/>
+                      <a:prstDash val="solid"/>
+                    </a:lnTlToBr>
+                    <a:lnBlToTr w="12700" cmpd="sng">
+                      <a:noFill/>
+                      <a:prstDash val="solid"/>
+                    </a:lnBlToTr>
+                    <a:solidFill>
+                      <a:schemeClr val="tx1">
+                        <a:lumMod val="50000"/>
+                      </a:schemeClr>
+                    </a:solidFill>
+                  </a:tcPr>
+                </a:tc>
+                <a:tc>
+                  <a:txBody>
+                    <a:bodyPr/>
+                    <a:lstStyle/>
+                    <a:p>
+                      <a:r>
+                        <a:rPr lang="en-US" dirty="0" smtClean="0"/>
+                        <a:t>4bytes</a:t>
+                      </a:r>
+                      <a:endParaRPr lang="en-US" dirty="0"/>
+                    </a:p>
+                  </a:txBody>
+                  <a:tcPr>
+                    <a:lnL w="12700" cap="flat" cmpd="sng" algn="ctr">
+                      <a:solidFill>
+                        <a:schemeClr val="tx1"/>
+                      </a:solidFill>
+                      <a:prstDash val="solid"/>
+                      <a:round/>
+                      <a:headEnd type="none" w="med" len="med"/>
+                      <a:tailEnd type="none" w="med" len="med"/>
+                    </a:lnL>
+                    <a:lnR w="12700" cap="flat" cmpd="sng" algn="ctr">
+                      <a:solidFill>
+                        <a:schemeClr val="tx1"/>
+                      </a:solidFill>
+                      <a:prstDash val="solid"/>
+                      <a:round/>
+                      <a:headEnd type="none" w="med" len="med"/>
+                      <a:tailEnd type="none" w="med" len="med"/>
+                    </a:lnR>
+                    <a:lnT w="12700" cap="flat" cmpd="sng" algn="ctr">
+                      <a:solidFill>
+                        <a:schemeClr val="tx1"/>
+                      </a:solidFill>
+                      <a:prstDash val="solid"/>
+                      <a:round/>
+                      <a:headEnd type="none" w="med" len="med"/>
+                      <a:tailEnd type="none" w="med" len="med"/>
+                    </a:lnT>
+                    <a:lnB w="12700" cap="flat" cmpd="sng" algn="ctr">
+                      <a:solidFill>
+                        <a:schemeClr val="tx1"/>
+                      </a:solidFill>
+                      <a:prstDash val="solid"/>
+                      <a:round/>
+                      <a:headEnd type="none" w="med" len="med"/>
+                      <a:tailEnd type="none" w="med" len="med"/>
+                    </a:lnB>
+                    <a:lnTlToBr w="12700" cmpd="sng">
+                      <a:noFill/>
+                      <a:prstDash val="solid"/>
+                    </a:lnTlToBr>
+                    <a:lnBlToTr w="12700" cmpd="sng">
+                      <a:noFill/>
+                      <a:prstDash val="solid"/>
+                    </a:lnBlToTr>
+                    <a:solidFill>
+                      <a:schemeClr val="tx1">
+                        <a:lumMod val="50000"/>
+                      </a:schemeClr>
+                    </a:solidFill>
+                  </a:tcPr>
+                </a:tc>
+              </a:tr>
+            </a:tbl>
+          </a:graphicData>
+        </a:graphic>
+      </p:graphicFrame>
+      <p:graphicFrame>
+        <p:nvGraphicFramePr>
+          <p:cNvPr id="6" name="Table 5"/>
+          <p:cNvGraphicFramePr>
+            <a:graphicFrameLocks noGrp="1"/>
+          </p:cNvGraphicFramePr>
+          <p:nvPr>
+            <p:extLst>
+              <p:ext uri="{D42A27DB-BD31-4B8C-83A1-F6EECF244321}">
+                <p14:modId xmlns:p14="http://schemas.microsoft.com/office/powerpoint/2010/main" val="4149939043"/>
+              </p:ext>
+            </p:extLst>
+          </p:nvPr>
+        </p:nvGraphicFramePr>
+        <p:xfrm>
+          <a:off x="8466665" y="5006340"/>
+          <a:ext cx="3488268" cy="1483360"/>
+        </p:xfrm>
+        <a:graphic>
+          <a:graphicData uri="http://schemas.openxmlformats.org/drawingml/2006/table">
+            <a:tbl>
+              <a:tblPr firstRow="1" bandRow="1">
+                <a:tableStyleId>{5C22544A-7EE6-4342-B048-85BDC9FD1C3A}</a:tableStyleId>
+              </a:tblPr>
+              <a:tblGrid>
+                <a:gridCol w="1162756"/>
+                <a:gridCol w="1162756"/>
+                <a:gridCol w="1162756"/>
+              </a:tblGrid>
+              <a:tr h="370840">
+                <a:tc gridSpan="3">
+                  <a:txBody>
+                    <a:bodyPr/>
+                    <a:lstStyle/>
+                    <a:p>
+                      <a:pPr algn="ctr"/>
+                      <a:r>
+                        <a:rPr lang="en-US" b="0" dirty="0" smtClean="0">
+                          <a:solidFill>
+                            <a:schemeClr val="bg1"/>
+                          </a:solidFill>
+                        </a:rPr>
+                        <a:t>0x...n</a:t>
+                      </a:r>
+                      <a:endParaRPr lang="en-US" b="0" dirty="0">
+                        <a:solidFill>
+                          <a:schemeClr val="bg1"/>
+                        </a:solidFill>
+                      </a:endParaRPr>
+                    </a:p>
+                  </a:txBody>
+                  <a:tcPr>
+                    <a:lnL w="12700" cap="flat" cmpd="sng" algn="ctr">
+                      <a:solidFill>
+                        <a:schemeClr val="tx1"/>
+                      </a:solidFill>
+                      <a:prstDash val="solid"/>
+                      <a:round/>
+                      <a:headEnd type="none" w="med" len="med"/>
+                      <a:tailEnd type="none" w="med" len="med"/>
+                    </a:lnL>
+                    <a:lnR w="12700" cap="flat" cmpd="sng" algn="ctr">
+                      <a:solidFill>
+                        <a:schemeClr val="tx1"/>
+                      </a:solidFill>
+                      <a:prstDash val="solid"/>
+                      <a:round/>
+                      <a:headEnd type="none" w="med" len="med"/>
+                      <a:tailEnd type="none" w="med" len="med"/>
+                    </a:lnR>
+                    <a:lnT w="12700" cap="flat" cmpd="sng" algn="ctr">
+                      <a:solidFill>
+                        <a:schemeClr val="tx1"/>
+                      </a:solidFill>
+                      <a:prstDash val="solid"/>
+                      <a:round/>
+                      <a:headEnd type="none" w="med" len="med"/>
+                      <a:tailEnd type="none" w="med" len="med"/>
+                    </a:lnT>
+                    <a:lnB w="12700" cap="flat" cmpd="sng" algn="ctr">
+                      <a:solidFill>
+                        <a:schemeClr val="tx1"/>
+                      </a:solidFill>
+                      <a:prstDash val="solid"/>
+                      <a:round/>
+                      <a:headEnd type="none" w="med" len="med"/>
+                      <a:tailEnd type="none" w="med" len="med"/>
+                    </a:lnB>
+                    <a:lnTlToBr w="12700" cmpd="sng">
+                      <a:noFill/>
+                      <a:prstDash val="solid"/>
+                    </a:lnTlToBr>
+                    <a:lnBlToTr w="12700" cmpd="sng">
+                      <a:noFill/>
+                      <a:prstDash val="solid"/>
+                    </a:lnBlToTr>
+                    <a:solidFill>
+                      <a:schemeClr val="tx1">
+                        <a:lumMod val="50000"/>
+                      </a:schemeClr>
+                    </a:solidFill>
+                  </a:tcPr>
+                </a:tc>
+                <a:tc hMerge="1">
+                  <a:txBody>
+                    <a:bodyPr/>
+                    <a:lstStyle/>
+                    <a:p>
+                      <a:endParaRPr lang="en-US"/>
+                    </a:p>
+                  </a:txBody>
+                  <a:tcPr/>
+                </a:tc>
+                <a:tc hMerge="1">
+                  <a:txBody>
+                    <a:bodyPr/>
+                    <a:lstStyle/>
+                    <a:p>
+                      <a:endParaRPr lang="en-US"/>
+                    </a:p>
+                  </a:txBody>
+                  <a:tcPr/>
+                </a:tc>
+              </a:tr>
+              <a:tr h="370840">
+                <a:tc gridSpan="3">
+                  <a:txBody>
+                    <a:bodyPr/>
+                    <a:lstStyle/>
+                    <a:p>
+                      <a:pPr algn="ctr"/>
+                      <a:r>
+                        <a:rPr lang="en-US" b="0" dirty="0" smtClean="0">
+                          <a:solidFill>
+                            <a:schemeClr val="bg1"/>
+                          </a:solidFill>
+                        </a:rPr>
+                        <a:t>Ant </a:t>
+                      </a:r>
+                      <a:r>
+                        <a:rPr lang="en-US" b="0" dirty="0" smtClean="0">
+                          <a:solidFill>
+                            <a:schemeClr val="bg1"/>
+                          </a:solidFill>
+                        </a:rPr>
+                        <a:t>...n</a:t>
+                      </a:r>
+                    </a:p>
+                  </a:txBody>
+                  <a:tcPr>
+                    <a:lnL w="12700" cap="flat" cmpd="sng" algn="ctr">
+                      <a:solidFill>
+                        <a:schemeClr val="tx1"/>
+                      </a:solidFill>
+                      <a:prstDash val="solid"/>
+                      <a:round/>
+                      <a:headEnd type="none" w="med" len="med"/>
+                      <a:tailEnd type="none" w="med" len="med"/>
+                    </a:lnL>
+                    <a:lnR w="12700" cap="flat" cmpd="sng" algn="ctr">
+                      <a:solidFill>
+                        <a:schemeClr val="tx1"/>
+                      </a:solidFill>
+                      <a:prstDash val="solid"/>
+                      <a:round/>
+                      <a:headEnd type="none" w="med" len="med"/>
+                      <a:tailEnd type="none" w="med" len="med"/>
+                    </a:lnR>
+                    <a:lnT w="12700" cap="flat" cmpd="sng" algn="ctr">
+                      <a:solidFill>
+                        <a:schemeClr val="tx1"/>
+                      </a:solidFill>
+                      <a:prstDash val="solid"/>
+                      <a:round/>
+                      <a:headEnd type="none" w="med" len="med"/>
+                      <a:tailEnd type="none" w="med" len="med"/>
+                    </a:lnT>
+                    <a:lnB w="12700" cap="flat" cmpd="sng" algn="ctr">
+                      <a:solidFill>
+                        <a:schemeClr val="tx1"/>
+                      </a:solidFill>
+                      <a:prstDash val="solid"/>
+                      <a:round/>
+                      <a:headEnd type="none" w="med" len="med"/>
+                      <a:tailEnd type="none" w="med" len="med"/>
+                    </a:lnB>
+                    <a:lnTlToBr w="12700" cmpd="sng">
+                      <a:noFill/>
+                      <a:prstDash val="solid"/>
+                    </a:lnTlToBr>
+                    <a:lnBlToTr w="12700" cmpd="sng">
+                      <a:noFill/>
+                      <a:prstDash val="solid"/>
+                    </a:lnBlToTr>
+                    <a:solidFill>
+                      <a:schemeClr val="tx1">
+                        <a:lumMod val="50000"/>
+                      </a:schemeClr>
+                    </a:solidFill>
+                  </a:tcPr>
+                </a:tc>
+                <a:tc hMerge="1">
+                  <a:txBody>
+                    <a:bodyPr/>
+                    <a:lstStyle/>
+                    <a:p>
+                      <a:endParaRPr lang="en-US" dirty="0"/>
+                    </a:p>
+                  </a:txBody>
+                  <a:tcPr>
+                    <a:lnL w="12700" cap="flat" cmpd="sng" algn="ctr">
+                      <a:solidFill>
+                        <a:schemeClr val="tx1"/>
+                      </a:solidFill>
+                      <a:prstDash val="solid"/>
+                      <a:round/>
+                      <a:headEnd type="none" w="med" len="med"/>
+                      <a:tailEnd type="none" w="med" len="med"/>
+                    </a:lnL>
+                    <a:lnR w="12700" cap="flat" cmpd="sng" algn="ctr">
+                      <a:solidFill>
+                        <a:schemeClr val="tx1"/>
+                      </a:solidFill>
+                      <a:prstDash val="solid"/>
+                      <a:round/>
+                      <a:headEnd type="none" w="med" len="med"/>
+                      <a:tailEnd type="none" w="med" len="med"/>
+                    </a:lnR>
+                    <a:lnT w="12700" cap="flat" cmpd="sng" algn="ctr">
+                      <a:solidFill>
+                        <a:schemeClr val="tx1"/>
+                      </a:solidFill>
+                      <a:prstDash val="solid"/>
+                      <a:round/>
+                      <a:headEnd type="none" w="med" len="med"/>
+                      <a:tailEnd type="none" w="med" len="med"/>
+                    </a:lnT>
+                    <a:lnB w="12700" cap="flat" cmpd="sng" algn="ctr">
+                      <a:solidFill>
+                        <a:schemeClr val="tx1"/>
+                      </a:solidFill>
+                      <a:prstDash val="solid"/>
+                      <a:round/>
+                      <a:headEnd type="none" w="med" len="med"/>
+                      <a:tailEnd type="none" w="med" len="med"/>
+                    </a:lnB>
+                    <a:lnTlToBr w="12700" cmpd="sng">
+                      <a:noFill/>
+                      <a:prstDash val="solid"/>
+                    </a:lnTlToBr>
+                    <a:lnBlToTr w="12700" cmpd="sng">
+                      <a:noFill/>
+                      <a:prstDash val="solid"/>
+                    </a:lnBlToTr>
+                    <a:solidFill>
+                      <a:schemeClr val="tx1">
+                        <a:lumMod val="50000"/>
+                      </a:schemeClr>
+                    </a:solidFill>
+                  </a:tcPr>
+                </a:tc>
+                <a:tc hMerge="1">
+                  <a:txBody>
+                    <a:bodyPr/>
+                    <a:lstStyle/>
+                    <a:p>
+                      <a:endParaRPr lang="en-US" dirty="0"/>
+                    </a:p>
+                  </a:txBody>
+                  <a:tcPr>
+                    <a:lnL w="12700" cap="flat" cmpd="sng" algn="ctr">
+                      <a:solidFill>
+                        <a:schemeClr val="tx1"/>
+                      </a:solidFill>
+                      <a:prstDash val="solid"/>
+                      <a:round/>
+                      <a:headEnd type="none" w="med" len="med"/>
+                      <a:tailEnd type="none" w="med" len="med"/>
+                    </a:lnL>
+                    <a:lnR w="12700" cap="flat" cmpd="sng" algn="ctr">
+                      <a:solidFill>
+                        <a:schemeClr val="tx1"/>
+                      </a:solidFill>
+                      <a:prstDash val="solid"/>
+                      <a:round/>
+                      <a:headEnd type="none" w="med" len="med"/>
+                      <a:tailEnd type="none" w="med" len="med"/>
+                    </a:lnR>
+                    <a:lnT w="12700" cap="flat" cmpd="sng" algn="ctr">
+                      <a:solidFill>
+                        <a:schemeClr val="tx1"/>
+                      </a:solidFill>
+                      <a:prstDash val="solid"/>
+                      <a:round/>
+                      <a:headEnd type="none" w="med" len="med"/>
+                      <a:tailEnd type="none" w="med" len="med"/>
+                    </a:lnT>
+                    <a:lnB w="12700" cap="flat" cmpd="sng" algn="ctr">
+                      <a:solidFill>
+                        <a:schemeClr val="tx1"/>
+                      </a:solidFill>
+                      <a:prstDash val="solid"/>
+                      <a:round/>
+                      <a:headEnd type="none" w="med" len="med"/>
+                      <a:tailEnd type="none" w="med" len="med"/>
+                    </a:lnB>
+                    <a:lnTlToBr w="12700" cmpd="sng">
+                      <a:noFill/>
+                      <a:prstDash val="solid"/>
+                    </a:lnTlToBr>
+                    <a:lnBlToTr w="12700" cmpd="sng">
+                      <a:noFill/>
+                      <a:prstDash val="solid"/>
+                    </a:lnBlToTr>
+                    <a:solidFill>
+                      <a:schemeClr val="tx1">
+                        <a:lumMod val="50000"/>
+                      </a:schemeClr>
+                    </a:solidFill>
+                  </a:tcPr>
+                </a:tc>
+              </a:tr>
+              <a:tr h="370840">
+                <a:tc>
+                  <a:txBody>
+                    <a:bodyPr/>
+                    <a:lstStyle/>
+                    <a:p>
+                      <a:pPr marL="0" algn="l" defTabSz="914400" rtl="0" eaLnBrk="1" latinLnBrk="0" hangingPunct="1"/>
+                      <a:r>
+                        <a:rPr lang="en-US" sz="1800" kern="1200" dirty="0" smtClean="0">
+                          <a:solidFill>
+                            <a:schemeClr val="dk1"/>
+                          </a:solidFill>
+                          <a:latin typeface="+mn-lt"/>
+                          <a:ea typeface="+mn-ea"/>
+                          <a:cs typeface="+mn-cs"/>
+                        </a:rPr>
                         <a:t>Position</a:t>
                       </a:r>
-                      <a:endParaRPr lang="en-US" dirty="0"/>
+                      <a:endParaRPr lang="en-US" sz="1800" kern="1200" dirty="0">
+                        <a:solidFill>
+                          <a:schemeClr val="dk1"/>
+                        </a:solidFill>
+                        <a:latin typeface="+mn-lt"/>
+                        <a:ea typeface="+mn-ea"/>
+                        <a:cs typeface="+mn-cs"/>
+                      </a:endParaRPr>
                     </a:p>
                   </a:txBody>
                   <a:tcPr>
@@ -6834,11 +7611,26 @@
                     <a:bodyPr/>
                     <a:lstStyle/>
                     <a:p>
+                      <a:pPr marL="0" algn="l" defTabSz="914400" rtl="0" eaLnBrk="1" latinLnBrk="0" hangingPunct="1"/>
                       <a:r>
-                        <a:rPr lang="en-US" dirty="0" smtClean="0"/>
+                        <a:rPr lang="en-US" sz="1800" kern="1200" dirty="0" smtClean="0">
+                          <a:solidFill>
+                            <a:schemeClr val="dk1"/>
+                          </a:solidFill>
+                          <a:latin typeface="+mn-lt"/>
+                          <a:ea typeface="+mn-ea"/>
+                          <a:cs typeface="+mn-cs"/>
+                        </a:rPr>
                         <a:t>Target</a:t>
                       </a:r>
-                      <a:endParaRPr lang="en-US" dirty="0"/>
+                      <a:endParaRPr lang="en-US" sz="1800" kern="1200" dirty="0">
+                        <a:solidFill>
+                          <a:schemeClr val="dk1"/>
+                        </a:solidFill>
+                        <a:latin typeface="+mn-lt"/>
+                        <a:ea typeface="+mn-ea"/>
+                        <a:cs typeface="+mn-cs"/>
+                      </a:endParaRPr>
                     </a:p>
                   </a:txBody>
                   <a:tcPr>
@@ -6899,11 +7691,26 @@
                     <a:bodyPr/>
                     <a:lstStyle/>
                     <a:p>
+                      <a:pPr marL="0" algn="l" defTabSz="914400" rtl="0" eaLnBrk="1" latinLnBrk="0" hangingPunct="1"/>
                       <a:r>
-                        <a:rPr lang="en-US" dirty="0" smtClean="0"/>
+                        <a:rPr lang="en-US" sz="1800" kern="1200" dirty="0" smtClean="0">
+                          <a:solidFill>
+                            <a:schemeClr val="dk1"/>
+                          </a:solidFill>
+                          <a:latin typeface="+mn-lt"/>
+                          <a:ea typeface="+mn-ea"/>
+                          <a:cs typeface="+mn-cs"/>
+                        </a:rPr>
                         <a:t>StepCount</a:t>
                       </a:r>
-                      <a:endParaRPr lang="en-US" dirty="0"/>
+                      <a:endParaRPr lang="en-US" sz="1800" kern="1200" dirty="0">
+                        <a:solidFill>
+                          <a:schemeClr val="dk1"/>
+                        </a:solidFill>
+                        <a:latin typeface="+mn-lt"/>
+                        <a:ea typeface="+mn-ea"/>
+                        <a:cs typeface="+mn-cs"/>
+                      </a:endParaRPr>
                     </a:p>
                   </a:txBody>
                   <a:tcPr>
@@ -7095,390 +7902,6 @@
                     <a:lstStyle/>
                     <a:p>
                       <a:r>
-                        <a:rPr lang="en-US" smtClean="0"/>
-                        <a:t>4bytes</a:t>
-                      </a:r>
-                      <a:endParaRPr lang="en-US" dirty="0"/>
-                    </a:p>
-                  </a:txBody>
-                  <a:tcPr>
-                    <a:lnL w="12700" cap="flat" cmpd="sng" algn="ctr">
-                      <a:solidFill>
-                        <a:schemeClr val="tx1"/>
-                      </a:solidFill>
-                      <a:prstDash val="solid"/>
-                      <a:round/>
-                      <a:headEnd type="none" w="med" len="med"/>
-                      <a:tailEnd type="none" w="med" len="med"/>
-                    </a:lnL>
-                    <a:lnR w="12700" cap="flat" cmpd="sng" algn="ctr">
-                      <a:solidFill>
-                        <a:schemeClr val="tx1"/>
-                      </a:solidFill>
-                      <a:prstDash val="solid"/>
-                      <a:round/>
-                      <a:headEnd type="none" w="med" len="med"/>
-                      <a:tailEnd type="none" w="med" len="med"/>
-                    </a:lnR>
-                    <a:lnT w="12700" cap="flat" cmpd="sng" algn="ctr">
-                      <a:solidFill>
-                        <a:schemeClr val="tx1"/>
-                      </a:solidFill>
-                      <a:prstDash val="solid"/>
-                      <a:round/>
-                      <a:headEnd type="none" w="med" len="med"/>
-                      <a:tailEnd type="none" w="med" len="med"/>
-                    </a:lnT>
-                    <a:lnB w="12700" cap="flat" cmpd="sng" algn="ctr">
-                      <a:solidFill>
-                        <a:schemeClr val="tx1"/>
-                      </a:solidFill>
-                      <a:prstDash val="solid"/>
-                      <a:round/>
-                      <a:headEnd type="none" w="med" len="med"/>
-                      <a:tailEnd type="none" w="med" len="med"/>
-                    </a:lnB>
-                    <a:lnTlToBr w="12700" cmpd="sng">
-                      <a:noFill/>
-                      <a:prstDash val="solid"/>
-                    </a:lnTlToBr>
-                    <a:lnBlToTr w="12700" cmpd="sng">
-                      <a:noFill/>
-                      <a:prstDash val="solid"/>
-                    </a:lnBlToTr>
-                    <a:solidFill>
-                      <a:schemeClr val="tx1">
-                        <a:lumMod val="50000"/>
-                      </a:schemeClr>
-                    </a:solidFill>
-                  </a:tcPr>
-                </a:tc>
-                <a:tc>
-                  <a:txBody>
-                    <a:bodyPr/>
-                    <a:lstStyle/>
-                    <a:p>
-                      <a:r>
-                        <a:rPr lang="en-US" smtClean="0"/>
-                        <a:t>8bytes</a:t>
-                      </a:r>
-                      <a:endParaRPr lang="en-US" dirty="0"/>
-                    </a:p>
-                  </a:txBody>
-                  <a:tcPr>
-                    <a:lnL w="12700" cap="flat" cmpd="sng" algn="ctr">
-                      <a:solidFill>
-                        <a:schemeClr val="tx1"/>
-                      </a:solidFill>
-                      <a:prstDash val="solid"/>
-                      <a:round/>
-                      <a:headEnd type="none" w="med" len="med"/>
-                      <a:tailEnd type="none" w="med" len="med"/>
-                    </a:lnL>
-                    <a:lnR w="12700" cap="flat" cmpd="sng" algn="ctr">
-                      <a:solidFill>
-                        <a:schemeClr val="tx1"/>
-                      </a:solidFill>
-                      <a:prstDash val="solid"/>
-                      <a:round/>
-                      <a:headEnd type="none" w="med" len="med"/>
-                      <a:tailEnd type="none" w="med" len="med"/>
-                    </a:lnR>
-                    <a:lnT w="12700" cap="flat" cmpd="sng" algn="ctr">
-                      <a:solidFill>
-                        <a:schemeClr val="tx1"/>
-                      </a:solidFill>
-                      <a:prstDash val="solid"/>
-                      <a:round/>
-                      <a:headEnd type="none" w="med" len="med"/>
-                      <a:tailEnd type="none" w="med" len="med"/>
-                    </a:lnT>
-                    <a:lnB w="12700" cap="flat" cmpd="sng" algn="ctr">
-                      <a:solidFill>
-                        <a:schemeClr val="tx1"/>
-                      </a:solidFill>
-                      <a:prstDash val="solid"/>
-                      <a:round/>
-                      <a:headEnd type="none" w="med" len="med"/>
-                      <a:tailEnd type="none" w="med" len="med"/>
-                    </a:lnB>
-                    <a:lnTlToBr w="12700" cmpd="sng">
-                      <a:noFill/>
-                      <a:prstDash val="solid"/>
-                    </a:lnTlToBr>
-                    <a:lnBlToTr w="12700" cmpd="sng">
-                      <a:noFill/>
-                      <a:prstDash val="solid"/>
-                    </a:lnBlToTr>
-                    <a:solidFill>
-                      <a:schemeClr val="tx1">
-                        <a:lumMod val="50000"/>
-                      </a:schemeClr>
-                    </a:solidFill>
-                  </a:tcPr>
-                </a:tc>
-                <a:tc>
-                  <a:txBody>
-                    <a:bodyPr/>
-                    <a:lstStyle/>
-                    <a:p>
-                      <a:r>
-                        <a:rPr lang="en-US" dirty="0" smtClean="0"/>
-                        <a:t>8bytes</a:t>
-                      </a:r>
-                      <a:endParaRPr lang="en-US" dirty="0"/>
-                    </a:p>
-                  </a:txBody>
-                  <a:tcPr>
-                    <a:lnL w="12700" cap="flat" cmpd="sng" algn="ctr">
-                      <a:solidFill>
-                        <a:schemeClr val="tx1"/>
-                      </a:solidFill>
-                      <a:prstDash val="solid"/>
-                      <a:round/>
-                      <a:headEnd type="none" w="med" len="med"/>
-                      <a:tailEnd type="none" w="med" len="med"/>
-                    </a:lnL>
-                    <a:lnR w="12700" cap="flat" cmpd="sng" algn="ctr">
-                      <a:solidFill>
-                        <a:schemeClr val="tx1"/>
-                      </a:solidFill>
-                      <a:prstDash val="solid"/>
-                      <a:round/>
-                      <a:headEnd type="none" w="med" len="med"/>
-                      <a:tailEnd type="none" w="med" len="med"/>
-                    </a:lnR>
-                    <a:lnT w="12700" cap="flat" cmpd="sng" algn="ctr">
-                      <a:solidFill>
-                        <a:schemeClr val="tx1"/>
-                      </a:solidFill>
-                      <a:prstDash val="solid"/>
-                      <a:round/>
-                      <a:headEnd type="none" w="med" len="med"/>
-                      <a:tailEnd type="none" w="med" len="med"/>
-                    </a:lnT>
-                    <a:lnB w="12700" cap="flat" cmpd="sng" algn="ctr">
-                      <a:solidFill>
-                        <a:schemeClr val="tx1"/>
-                      </a:solidFill>
-                      <a:prstDash val="solid"/>
-                      <a:round/>
-                      <a:headEnd type="none" w="med" len="med"/>
-                      <a:tailEnd type="none" w="med" len="med"/>
-                    </a:lnB>
-                    <a:lnTlToBr w="12700" cmpd="sng">
-                      <a:noFill/>
-                      <a:prstDash val="solid"/>
-                    </a:lnTlToBr>
-                    <a:lnBlToTr w="12700" cmpd="sng">
-                      <a:noFill/>
-                      <a:prstDash val="solid"/>
-                    </a:lnBlToTr>
-                    <a:solidFill>
-                      <a:schemeClr val="tx1">
-                        <a:lumMod val="50000"/>
-                      </a:schemeClr>
-                    </a:solidFill>
-                  </a:tcPr>
-                </a:tc>
-                <a:tc>
-                  <a:txBody>
-                    <a:bodyPr/>
-                    <a:lstStyle/>
-                    <a:p>
-                      <a:r>
-                        <a:rPr lang="en-US" dirty="0" smtClean="0"/>
-                        <a:t>4bytes</a:t>
-                      </a:r>
-                      <a:endParaRPr lang="en-US" dirty="0"/>
-                    </a:p>
-                  </a:txBody>
-                  <a:tcPr>
-                    <a:lnL w="12700" cap="flat" cmpd="sng" algn="ctr">
-                      <a:solidFill>
-                        <a:schemeClr val="tx1"/>
-                      </a:solidFill>
-                      <a:prstDash val="solid"/>
-                      <a:round/>
-                      <a:headEnd type="none" w="med" len="med"/>
-                      <a:tailEnd type="none" w="med" len="med"/>
-                    </a:lnL>
-                    <a:lnR w="12700" cap="flat" cmpd="sng" algn="ctr">
-                      <a:solidFill>
-                        <a:schemeClr val="tx1"/>
-                      </a:solidFill>
-                      <a:prstDash val="solid"/>
-                      <a:round/>
-                      <a:headEnd type="none" w="med" len="med"/>
-                      <a:tailEnd type="none" w="med" len="med"/>
-                    </a:lnR>
-                    <a:lnT w="12700" cap="flat" cmpd="sng" algn="ctr">
-                      <a:solidFill>
-                        <a:schemeClr val="tx1"/>
-                      </a:solidFill>
-                      <a:prstDash val="solid"/>
-                      <a:round/>
-                      <a:headEnd type="none" w="med" len="med"/>
-                      <a:tailEnd type="none" w="med" len="med"/>
-                    </a:lnT>
-                    <a:lnB w="12700" cap="flat" cmpd="sng" algn="ctr">
-                      <a:solidFill>
-                        <a:schemeClr val="tx1"/>
-                      </a:solidFill>
-                      <a:prstDash val="solid"/>
-                      <a:round/>
-                      <a:headEnd type="none" w="med" len="med"/>
-                      <a:tailEnd type="none" w="med" len="med"/>
-                    </a:lnB>
-                    <a:lnTlToBr w="12700" cmpd="sng">
-                      <a:noFill/>
-                      <a:prstDash val="solid"/>
-                    </a:lnTlToBr>
-                    <a:lnBlToTr w="12700" cmpd="sng">
-                      <a:noFill/>
-                      <a:prstDash val="solid"/>
-                    </a:lnBlToTr>
-                    <a:solidFill>
-                      <a:schemeClr val="tx1">
-                        <a:lumMod val="50000"/>
-                      </a:schemeClr>
-                    </a:solidFill>
-                  </a:tcPr>
-                </a:tc>
-                <a:tc>
-                  <a:txBody>
-                    <a:bodyPr/>
-                    <a:lstStyle/>
-                    <a:p>
-                      <a:r>
-                        <a:rPr lang="en-US" smtClean="0"/>
-                        <a:t>8bytes</a:t>
-                      </a:r>
-                      <a:endParaRPr lang="en-US" dirty="0"/>
-                    </a:p>
-                  </a:txBody>
-                  <a:tcPr>
-                    <a:lnL w="12700" cap="flat" cmpd="sng" algn="ctr">
-                      <a:solidFill>
-                        <a:schemeClr val="tx1"/>
-                      </a:solidFill>
-                      <a:prstDash val="solid"/>
-                      <a:round/>
-                      <a:headEnd type="none" w="med" len="med"/>
-                      <a:tailEnd type="none" w="med" len="med"/>
-                    </a:lnL>
-                    <a:lnR w="12700" cap="flat" cmpd="sng" algn="ctr">
-                      <a:solidFill>
-                        <a:schemeClr val="tx1"/>
-                      </a:solidFill>
-                      <a:prstDash val="solid"/>
-                      <a:round/>
-                      <a:headEnd type="none" w="med" len="med"/>
-                      <a:tailEnd type="none" w="med" len="med"/>
-                    </a:lnR>
-                    <a:lnT w="12700" cap="flat" cmpd="sng" algn="ctr">
-                      <a:solidFill>
-                        <a:schemeClr val="tx1"/>
-                      </a:solidFill>
-                      <a:prstDash val="solid"/>
-                      <a:round/>
-                      <a:headEnd type="none" w="med" len="med"/>
-                      <a:tailEnd type="none" w="med" len="med"/>
-                    </a:lnT>
-                    <a:lnB w="12700" cap="flat" cmpd="sng" algn="ctr">
-                      <a:solidFill>
-                        <a:schemeClr val="tx1"/>
-                      </a:solidFill>
-                      <a:prstDash val="solid"/>
-                      <a:round/>
-                      <a:headEnd type="none" w="med" len="med"/>
-                      <a:tailEnd type="none" w="med" len="med"/>
-                    </a:lnB>
-                    <a:lnTlToBr w="12700" cmpd="sng">
-                      <a:noFill/>
-                      <a:prstDash val="solid"/>
-                    </a:lnTlToBr>
-                    <a:lnBlToTr w="12700" cmpd="sng">
-                      <a:noFill/>
-                      <a:prstDash val="solid"/>
-                    </a:lnBlToTr>
-                    <a:solidFill>
-                      <a:schemeClr val="tx1">
-                        <a:lumMod val="50000"/>
-                      </a:schemeClr>
-                    </a:solidFill>
-                  </a:tcPr>
-                </a:tc>
-                <a:tc>
-                  <a:txBody>
-                    <a:bodyPr/>
-                    <a:lstStyle/>
-                    <a:p>
-                      <a:r>
-                        <a:rPr lang="en-US" dirty="0" smtClean="0"/>
-                        <a:t>8bytes</a:t>
-                      </a:r>
-                      <a:endParaRPr lang="en-US" dirty="0"/>
-                    </a:p>
-                  </a:txBody>
-                  <a:tcPr>
-                    <a:lnL w="12700" cap="flat" cmpd="sng" algn="ctr">
-                      <a:solidFill>
-                        <a:schemeClr val="tx1"/>
-                      </a:solidFill>
-                      <a:prstDash val="solid"/>
-                      <a:round/>
-                      <a:headEnd type="none" w="med" len="med"/>
-                      <a:tailEnd type="none" w="med" len="med"/>
-                    </a:lnL>
-                    <a:lnR w="12700" cap="flat" cmpd="sng" algn="ctr">
-                      <a:solidFill>
-                        <a:schemeClr val="tx1"/>
-                      </a:solidFill>
-                      <a:prstDash val="solid"/>
-                      <a:round/>
-                      <a:headEnd type="none" w="med" len="med"/>
-                      <a:tailEnd type="none" w="med" len="med"/>
-                    </a:lnR>
-                    <a:lnT w="12700" cap="flat" cmpd="sng" algn="ctr">
-                      <a:solidFill>
-                        <a:schemeClr val="tx1"/>
-                      </a:solidFill>
-                      <a:prstDash val="solid"/>
-                      <a:round/>
-                      <a:headEnd type="none" w="med" len="med"/>
-                      <a:tailEnd type="none" w="med" len="med"/>
-                    </a:lnT>
-                    <a:lnB w="12700" cap="flat" cmpd="sng" algn="ctr">
-                      <a:solidFill>
-                        <a:schemeClr val="tx1"/>
-                      </a:solidFill>
-                      <a:prstDash val="solid"/>
-                      <a:round/>
-                      <a:headEnd type="none" w="med" len="med"/>
-                      <a:tailEnd type="none" w="med" len="med"/>
-                    </a:lnB>
-                    <a:lnTlToBr w="12700" cmpd="sng">
-                      <a:noFill/>
-                      <a:prstDash val="solid"/>
-                    </a:lnTlToBr>
-                    <a:lnBlToTr w="12700" cmpd="sng">
-                      <a:noFill/>
-                      <a:prstDash val="solid"/>
-                    </a:lnBlToTr>
-                    <a:solidFill>
-                      <a:schemeClr val="tx1">
-                        <a:lumMod val="50000"/>
-                      </a:schemeClr>
-                    </a:solidFill>
-                  </a:tcPr>
-                </a:tc>
-                <a:tc>
-                  <a:txBody>
-                    <a:bodyPr/>
-                    <a:lstStyle/>
-                    <a:p>
-                      <a:r>
                         <a:rPr lang="en-US" dirty="0" smtClean="0"/>
                         <a:t>4bytes</a:t>
                       </a:r>
@@ -7542,6 +7965,83 @@
           </a:graphicData>
         </a:graphic>
       </p:graphicFrame>
+      <p:cxnSp>
+        <p:nvCxnSpPr>
+          <p:cNvPr id="14" name="Curved Connector 13"/>
+          <p:cNvCxnSpPr>
+            <a:stCxn id="5" idx="3"/>
+            <a:endCxn id="6" idx="1"/>
+          </p:cNvCxnSpPr>
+          <p:nvPr/>
+        </p:nvCxnSpPr>
+        <p:spPr>
+          <a:xfrm>
+            <a:off x="8331201" y="3598280"/>
+            <a:ext cx="135464" cy="2149740"/>
+          </a:xfrm>
+          <a:prstGeom prst="curvedConnector3">
+            <a:avLst>
+              <a:gd name="adj1" fmla="val 50000"/>
+            </a:avLst>
+          </a:prstGeom>
+          <a:ln w="28575">
+            <a:tailEnd type="triangle"/>
+          </a:ln>
+        </p:spPr>
+        <p:style>
+          <a:lnRef idx="1">
+            <a:schemeClr val="accent1"/>
+          </a:lnRef>
+          <a:fillRef idx="0">
+            <a:schemeClr val="accent1"/>
+          </a:fillRef>
+          <a:effectRef idx="0">
+            <a:schemeClr val="accent1"/>
+          </a:effectRef>
+          <a:fontRef idx="minor">
+            <a:schemeClr val="tx1"/>
+          </a:fontRef>
+        </p:style>
+      </p:cxnSp>
+      <p:cxnSp>
+        <p:nvCxnSpPr>
+          <p:cNvPr id="17" name="Curved Connector 16"/>
+          <p:cNvCxnSpPr>
+            <a:stCxn id="4" idx="3"/>
+            <a:endCxn id="5" idx="1"/>
+          </p:cNvCxnSpPr>
+          <p:nvPr/>
+        </p:nvCxnSpPr>
+        <p:spPr>
+          <a:xfrm flipV="1">
+            <a:off x="3810002" y="3598280"/>
+            <a:ext cx="1032931" cy="1144694"/>
+          </a:xfrm>
+          <a:prstGeom prst="curvedConnector3">
+            <a:avLst/>
+          </a:prstGeom>
+          <a:ln w="28575">
+            <a:solidFill>
+              <a:schemeClr val="accent1"/>
+            </a:solidFill>
+            <a:tailEnd type="triangle"/>
+          </a:ln>
+        </p:spPr>
+        <p:style>
+          <a:lnRef idx="1">
+            <a:schemeClr val="accent1"/>
+          </a:lnRef>
+          <a:fillRef idx="0">
+            <a:schemeClr val="accent1"/>
+          </a:fillRef>
+          <a:effectRef idx="0">
+            <a:schemeClr val="accent1"/>
+          </a:effectRef>
+          <a:fontRef idx="minor">
+            <a:schemeClr val="tx1"/>
+          </a:fontRef>
+        </p:style>
+      </p:cxnSp>
     </p:spTree>
     <p:extLst>
       <p:ext uri="{BB962C8B-B14F-4D97-AF65-F5344CB8AC3E}">
@@ -7719,14 +8219,14 @@
           <p:nvPr>
             <p:extLst>
               <p:ext uri="{D42A27DB-BD31-4B8C-83A1-F6EECF244321}">
-                <p14:modId xmlns:p14="http://schemas.microsoft.com/office/powerpoint/2010/main" val="1268735083"/>
+                <p14:modId xmlns:p14="http://schemas.microsoft.com/office/powerpoint/2010/main" val="1808560547"/>
               </p:ext>
             </p:extLst>
           </p:nvPr>
         </p:nvGraphicFramePr>
         <p:xfrm>
           <a:off x="838200" y="4165600"/>
-          <a:ext cx="10464804" cy="1112520"/>
+          <a:ext cx="10464804" cy="1483360"/>
         </p:xfrm>
         <a:graphic>
           <a:graphicData uri="http://schemas.openxmlformats.org/drawingml/2006/table">
@@ -7745,6 +8245,295 @@
                 <a:gridCol w="1162756"/>
                 <a:gridCol w="1162756"/>
               </a:tblGrid>
+              <a:tr h="370840">
+                <a:tc gridSpan="3">
+                  <a:txBody>
+                    <a:bodyPr/>
+                    <a:lstStyle/>
+                    <a:p>
+                      <a:pPr algn="ctr"/>
+                      <a:r>
+                        <a:rPr lang="en-US" b="0" dirty="0" smtClean="0">
+                          <a:solidFill>
+                            <a:schemeClr val="bg1"/>
+                          </a:solidFill>
+                        </a:rPr>
+                        <a:t>0x0</a:t>
+                      </a:r>
+                      <a:endParaRPr lang="en-US" b="0" dirty="0">
+                        <a:solidFill>
+                          <a:schemeClr val="bg1"/>
+                        </a:solidFill>
+                      </a:endParaRPr>
+                    </a:p>
+                  </a:txBody>
+                  <a:tcPr>
+                    <a:lnL w="12700" cap="flat" cmpd="sng" algn="ctr">
+                      <a:solidFill>
+                        <a:schemeClr val="tx1"/>
+                      </a:solidFill>
+                      <a:prstDash val="solid"/>
+                      <a:round/>
+                      <a:headEnd type="none" w="med" len="med"/>
+                      <a:tailEnd type="none" w="med" len="med"/>
+                    </a:lnL>
+                    <a:lnR w="12700" cap="flat" cmpd="sng" algn="ctr">
+                      <a:solidFill>
+                        <a:schemeClr val="tx1"/>
+                      </a:solidFill>
+                      <a:prstDash val="solid"/>
+                      <a:round/>
+                      <a:headEnd type="none" w="med" len="med"/>
+                      <a:tailEnd type="none" w="med" len="med"/>
+                    </a:lnR>
+                    <a:lnT w="12700" cap="flat" cmpd="sng" algn="ctr">
+                      <a:solidFill>
+                        <a:schemeClr val="tx1"/>
+                      </a:solidFill>
+                      <a:prstDash val="solid"/>
+                      <a:round/>
+                      <a:headEnd type="none" w="med" len="med"/>
+                      <a:tailEnd type="none" w="med" len="med"/>
+                    </a:lnT>
+                    <a:lnB w="12700" cap="flat" cmpd="sng" algn="ctr">
+                      <a:solidFill>
+                        <a:schemeClr val="tx1"/>
+                      </a:solidFill>
+                      <a:prstDash val="solid"/>
+                      <a:round/>
+                      <a:headEnd type="none" w="med" len="med"/>
+                      <a:tailEnd type="none" w="med" len="med"/>
+                    </a:lnB>
+                    <a:lnTlToBr w="12700" cmpd="sng">
+                      <a:noFill/>
+                      <a:prstDash val="solid"/>
+                    </a:lnTlToBr>
+                    <a:lnBlToTr w="12700" cmpd="sng">
+                      <a:noFill/>
+                      <a:prstDash val="solid"/>
+                    </a:lnBlToTr>
+                    <a:solidFill>
+                      <a:schemeClr val="tx1">
+                        <a:lumMod val="50000"/>
+                      </a:schemeClr>
+                    </a:solidFill>
+                  </a:tcPr>
+                </a:tc>
+                <a:tc hMerge="1">
+                  <a:txBody>
+                    <a:bodyPr/>
+                    <a:lstStyle/>
+                    <a:p>
+                      <a:endParaRPr lang="en-US"/>
+                    </a:p>
+                  </a:txBody>
+                  <a:tcPr/>
+                </a:tc>
+                <a:tc hMerge="1">
+                  <a:txBody>
+                    <a:bodyPr/>
+                    <a:lstStyle/>
+                    <a:p>
+                      <a:endParaRPr lang="en-US"/>
+                    </a:p>
+                  </a:txBody>
+                  <a:tcPr/>
+                </a:tc>
+                <a:tc gridSpan="3">
+                  <a:txBody>
+                    <a:bodyPr/>
+                    <a:lstStyle/>
+                    <a:p>
+                      <a:pPr algn="ctr"/>
+                      <a:r>
+                        <a:rPr lang="en-US" b="0" dirty="0" smtClean="0">
+                          <a:solidFill>
+                            <a:schemeClr val="bg1"/>
+                          </a:solidFill>
+                        </a:rPr>
+                        <a:t>0x20</a:t>
+                      </a:r>
+                      <a:endParaRPr lang="en-US" b="0" dirty="0" smtClean="0">
+                        <a:solidFill>
+                          <a:schemeClr val="bg1"/>
+                        </a:solidFill>
+                      </a:endParaRPr>
+                    </a:p>
+                  </a:txBody>
+                  <a:tcPr>
+                    <a:lnL w="12700" cap="flat" cmpd="sng" algn="ctr">
+                      <a:solidFill>
+                        <a:schemeClr val="tx1"/>
+                      </a:solidFill>
+                      <a:prstDash val="solid"/>
+                      <a:round/>
+                      <a:headEnd type="none" w="med" len="med"/>
+                      <a:tailEnd type="none" w="med" len="med"/>
+                    </a:lnL>
+                    <a:lnR w="12700" cap="flat" cmpd="sng" algn="ctr">
+                      <a:solidFill>
+                        <a:schemeClr val="tx1"/>
+                      </a:solidFill>
+                      <a:prstDash val="solid"/>
+                      <a:round/>
+                      <a:headEnd type="none" w="med" len="med"/>
+                      <a:tailEnd type="none" w="med" len="med"/>
+                    </a:lnR>
+                    <a:lnT w="12700" cap="flat" cmpd="sng" algn="ctr">
+                      <a:solidFill>
+                        <a:schemeClr val="tx1"/>
+                      </a:solidFill>
+                      <a:prstDash val="solid"/>
+                      <a:round/>
+                      <a:headEnd type="none" w="med" len="med"/>
+                      <a:tailEnd type="none" w="med" len="med"/>
+                    </a:lnT>
+                    <a:lnB w="12700" cap="flat" cmpd="sng" algn="ctr">
+                      <a:solidFill>
+                        <a:schemeClr val="tx1"/>
+                      </a:solidFill>
+                      <a:prstDash val="solid"/>
+                      <a:round/>
+                      <a:headEnd type="none" w="med" len="med"/>
+                      <a:tailEnd type="none" w="med" len="med"/>
+                    </a:lnB>
+                    <a:lnTlToBr w="12700" cmpd="sng">
+                      <a:noFill/>
+                      <a:prstDash val="solid"/>
+                    </a:lnTlToBr>
+                    <a:lnBlToTr w="12700" cmpd="sng">
+                      <a:noFill/>
+                      <a:prstDash val="solid"/>
+                    </a:lnBlToTr>
+                    <a:solidFill>
+                      <a:schemeClr val="tx1">
+                        <a:lumMod val="50000"/>
+                      </a:schemeClr>
+                    </a:solidFill>
+                  </a:tcPr>
+                </a:tc>
+                <a:tc hMerge="1">
+                  <a:txBody>
+                    <a:bodyPr/>
+                    <a:lstStyle/>
+                    <a:p>
+                      <a:endParaRPr lang="en-US"/>
+                    </a:p>
+                  </a:txBody>
+                  <a:tcPr/>
+                </a:tc>
+                <a:tc hMerge="1">
+                  <a:txBody>
+                    <a:bodyPr/>
+                    <a:lstStyle/>
+                    <a:p>
+                      <a:endParaRPr lang="en-US"/>
+                    </a:p>
+                  </a:txBody>
+                  <a:tcPr/>
+                </a:tc>
+                <a:tc gridSpan="3">
+                  <a:txBody>
+                    <a:bodyPr/>
+                    <a:lstStyle/>
+                    <a:p>
+                      <a:pPr algn="ctr"/>
+                      <a:r>
+                        <a:rPr lang="en-US" b="0" dirty="0" smtClean="0">
+                          <a:solidFill>
+                            <a:schemeClr val="bg1"/>
+                          </a:solidFill>
+                        </a:rPr>
+                        <a:t>0x...n</a:t>
+                      </a:r>
+                      <a:r>
+                        <a:rPr lang="en-US" b="0" baseline="0" dirty="0" smtClean="0">
+                          <a:solidFill>
+                            <a:schemeClr val="bg1"/>
+                          </a:solidFill>
+                        </a:rPr>
+                        <a:t> x 20</a:t>
+                      </a:r>
+                      <a:endParaRPr lang="en-US" b="0" dirty="0" smtClean="0">
+                        <a:solidFill>
+                          <a:schemeClr val="bg1"/>
+                        </a:solidFill>
+                      </a:endParaRPr>
+                    </a:p>
+                  </a:txBody>
+                  <a:tcPr>
+                    <a:lnL w="12700" cap="flat" cmpd="sng" algn="ctr">
+                      <a:solidFill>
+                        <a:schemeClr val="tx1"/>
+                      </a:solidFill>
+                      <a:prstDash val="solid"/>
+                      <a:round/>
+                      <a:headEnd type="none" w="med" len="med"/>
+                      <a:tailEnd type="none" w="med" len="med"/>
+                    </a:lnL>
+                    <a:lnR w="12700" cap="flat" cmpd="sng" algn="ctr">
+                      <a:solidFill>
+                        <a:schemeClr val="tx1"/>
+                      </a:solidFill>
+                      <a:prstDash val="solid"/>
+                      <a:round/>
+                      <a:headEnd type="none" w="med" len="med"/>
+                      <a:tailEnd type="none" w="med" len="med"/>
+                    </a:lnR>
+                    <a:lnT w="12700" cap="flat" cmpd="sng" algn="ctr">
+                      <a:solidFill>
+                        <a:schemeClr val="tx1"/>
+                      </a:solidFill>
+                      <a:prstDash val="solid"/>
+                      <a:round/>
+                      <a:headEnd type="none" w="med" len="med"/>
+                      <a:tailEnd type="none" w="med" len="med"/>
+                    </a:lnT>
+                    <a:lnB w="12700" cap="flat" cmpd="sng" algn="ctr">
+                      <a:solidFill>
+                        <a:schemeClr val="tx1"/>
+                      </a:solidFill>
+                      <a:prstDash val="solid"/>
+                      <a:round/>
+                      <a:headEnd type="none" w="med" len="med"/>
+                      <a:tailEnd type="none" w="med" len="med"/>
+                    </a:lnB>
+                    <a:lnTlToBr w="12700" cmpd="sng">
+                      <a:noFill/>
+                      <a:prstDash val="solid"/>
+                    </a:lnTlToBr>
+                    <a:lnBlToTr w="12700" cmpd="sng">
+                      <a:noFill/>
+                      <a:prstDash val="solid"/>
+                    </a:lnBlToTr>
+                    <a:solidFill>
+                      <a:schemeClr val="tx1">
+                        <a:lumMod val="50000"/>
+                      </a:schemeClr>
+                    </a:solidFill>
+                  </a:tcPr>
+                </a:tc>
+                <a:tc hMerge="1">
+                  <a:txBody>
+                    <a:bodyPr/>
+                    <a:lstStyle/>
+                    <a:p>
+                      <a:endParaRPr lang="en-US"/>
+                    </a:p>
+                  </a:txBody>
+                  <a:tcPr/>
+                </a:tc>
+                <a:tc hMerge="1">
+                  <a:txBody>
+                    <a:bodyPr/>
+                    <a:lstStyle/>
+                    <a:p>
+                      <a:endParaRPr lang="en-US"/>
+                    </a:p>
+                  </a:txBody>
+                  <a:tcPr/>
+                </a:tc>
+              </a:tr>
               <a:tr h="370840">
                 <a:tc gridSpan="3">
                   <a:txBody>
@@ -9669,11 +10458,11 @@
           <a:p>
             <a:r>
               <a:rPr lang="en-US" dirty="0" smtClean="0"/>
-              <a:t>Cost of hitting </a:t>
+              <a:t>Cost of </a:t>
             </a:r>
             <a:r>
               <a:rPr lang="en-US" dirty="0" smtClean="0"/>
-              <a:t>RAM</a:t>
+              <a:t>Hitting RAM</a:t>
             </a:r>
             <a:endParaRPr lang="en-US" dirty="0" smtClean="0"/>
           </a:p>
@@ -9690,7 +10479,7 @@
             </a:r>
             <a:r>
               <a:rPr lang="en-US" dirty="0" smtClean="0"/>
-              <a:t>what have to do?</a:t>
+              <a:t>what we have to do?</a:t>
             </a:r>
             <a:endParaRPr lang="en-US" dirty="0"/>
           </a:p>
@@ -9751,7 +10540,7 @@
       </p:sp>
       <p:sp>
         <p:nvSpPr>
-          <p:cNvPr id="3" name="Content Placeholder 2"/>
+          <p:cNvPr id="10" name="Content Placeholder 9"/>
           <p:cNvSpPr>
             <a:spLocks noGrp="1"/>
           </p:cNvSpPr>
@@ -9761,12 +10550,80 @@
         </p:nvSpPr>
         <p:spPr/>
         <p:txBody>
-          <a:bodyPr>
-            <a:normAutofit/>
-          </a:bodyPr>
+          <a:bodyPr/>
           <a:lstStyle/>
           <a:p>
+            <a:pPr marL="0" indent="0">
+              <a:buNone/>
+            </a:pPr>
+            <a:r>
+              <a:rPr lang="en-US" dirty="0"/>
+              <a:t>ElementSize: </a:t>
+            </a:r>
+            <a:r>
+              <a:rPr lang="en-US" dirty="0" smtClean="0"/>
+              <a:t>4b </a:t>
+            </a:r>
+            <a:r>
+              <a:rPr lang="en-US" dirty="0"/>
+              <a:t>Count: 268435456 Size: 1gb CPU-Freq.:4.23285GHz</a:t>
+            </a:r>
+          </a:p>
+          <a:p>
+            <a:pPr marL="0" indent="0">
+              <a:buNone/>
+            </a:pPr>
             <a:endParaRPr lang="en-US" dirty="0"/>
+          </a:p>
+          <a:p>
+            <a:pPr marL="0" indent="0">
+              <a:buNone/>
+            </a:pPr>
+            <a:r>
+              <a:rPr lang="en-US" dirty="0" smtClean="0"/>
+              <a:t>RandomMemoryAccess</a:t>
+            </a:r>
+          </a:p>
+          <a:p>
+            <a:pPr marL="0" indent="0">
+              <a:buNone/>
+            </a:pPr>
+            <a:r>
+              <a:rPr lang="en-US" dirty="0" smtClean="0"/>
+              <a:t>Cycles</a:t>
+            </a:r>
+            <a:r>
+              <a:rPr lang="en-US" dirty="0"/>
+              <a:t>: 10G Time: 2384.97ms Speed: 429.356mb/s</a:t>
+            </a:r>
+          </a:p>
+          <a:p>
+            <a:pPr marL="0" indent="0">
+              <a:buNone/>
+            </a:pPr>
+            <a:endParaRPr lang="en-US" dirty="0"/>
+          </a:p>
+          <a:p>
+            <a:pPr marL="0" indent="0">
+              <a:buNone/>
+            </a:pPr>
+            <a:r>
+              <a:rPr lang="en-US" dirty="0" smtClean="0"/>
+              <a:t>SequentialMemoryAccess</a:t>
+            </a:r>
+          </a:p>
+          <a:p>
+            <a:pPr marL="0" indent="0">
+              <a:buNone/>
+            </a:pPr>
+            <a:r>
+              <a:rPr lang="en-US" dirty="0" smtClean="0"/>
+              <a:t>Cycles</a:t>
+            </a:r>
+            <a:r>
+              <a:rPr lang="en-US" dirty="0"/>
+              <a:t>: 3G Time: 869.802ms Speed: 1177.28mb/s</a:t>
+            </a:r>
           </a:p>
         </p:txBody>
       </p:sp>
@@ -10908,23 +11765,63 @@
           </a:graphicData>
         </a:graphic>
       </p:graphicFrame>
+      <p:sp>
+        <p:nvSpPr>
+          <p:cNvPr id="10" name="Down Arrow 9"/>
+          <p:cNvSpPr/>
+          <p:nvPr/>
+        </p:nvSpPr>
+        <p:spPr>
+          <a:xfrm>
+            <a:off x="5537200" y="3649133"/>
+            <a:ext cx="558800" cy="702733"/>
+          </a:xfrm>
+          <a:prstGeom prst="downArrow">
+            <a:avLst/>
+          </a:prstGeom>
+        </p:spPr>
+        <p:style>
+          <a:lnRef idx="2">
+            <a:schemeClr val="accent1">
+              <a:shade val="50000"/>
+            </a:schemeClr>
+          </a:lnRef>
+          <a:fillRef idx="1">
+            <a:schemeClr val="accent1"/>
+          </a:fillRef>
+          <a:effectRef idx="0">
+            <a:schemeClr val="accent1"/>
+          </a:effectRef>
+          <a:fontRef idx="minor">
+            <a:schemeClr val="lt1"/>
+          </a:fontRef>
+        </p:style>
+        <p:txBody>
+          <a:bodyPr rtlCol="0" anchor="ctr"/>
+          <a:lstStyle/>
+          <a:p>
+            <a:pPr algn="ctr"/>
+            <a:endParaRPr lang="en-US"/>
+          </a:p>
+        </p:txBody>
+      </p:sp>
       <p:graphicFrame>
         <p:nvGraphicFramePr>
-          <p:cNvPr id="5" name="Table 4"/>
+          <p:cNvPr id="12" name="Table 11"/>
           <p:cNvGraphicFramePr>
             <a:graphicFrameLocks noGrp="1"/>
           </p:cNvGraphicFramePr>
           <p:nvPr>
             <p:extLst>
               <p:ext uri="{D42A27DB-BD31-4B8C-83A1-F6EECF244321}">
-                <p14:modId xmlns:p14="http://schemas.microsoft.com/office/powerpoint/2010/main" val="1369988387"/>
+                <p14:modId xmlns:p14="http://schemas.microsoft.com/office/powerpoint/2010/main" val="3322214276"/>
               </p:ext>
             </p:extLst>
           </p:nvPr>
         </p:nvGraphicFramePr>
         <p:xfrm>
-          <a:off x="888996" y="2353734"/>
-          <a:ext cx="10464804" cy="1112520"/>
+          <a:off x="753533" y="2048934"/>
+          <a:ext cx="10464804" cy="1483360"/>
         </p:xfrm>
         <a:graphic>
           <a:graphicData uri="http://schemas.openxmlformats.org/drawingml/2006/table">
@@ -10943,6 +11840,295 @@
                 <a:gridCol w="1162756"/>
                 <a:gridCol w="1162756"/>
               </a:tblGrid>
+              <a:tr h="370840">
+                <a:tc gridSpan="3">
+                  <a:txBody>
+                    <a:bodyPr/>
+                    <a:lstStyle/>
+                    <a:p>
+                      <a:pPr algn="ctr"/>
+                      <a:r>
+                        <a:rPr lang="en-US" b="0" dirty="0" smtClean="0">
+                          <a:solidFill>
+                            <a:schemeClr val="bg1"/>
+                          </a:solidFill>
+                        </a:rPr>
+                        <a:t>0x0</a:t>
+                      </a:r>
+                      <a:endParaRPr lang="en-US" b="0" dirty="0">
+                        <a:solidFill>
+                          <a:schemeClr val="bg1"/>
+                        </a:solidFill>
+                      </a:endParaRPr>
+                    </a:p>
+                  </a:txBody>
+                  <a:tcPr>
+                    <a:lnL w="12700" cap="flat" cmpd="sng" algn="ctr">
+                      <a:solidFill>
+                        <a:schemeClr val="tx1"/>
+                      </a:solidFill>
+                      <a:prstDash val="solid"/>
+                      <a:round/>
+                      <a:headEnd type="none" w="med" len="med"/>
+                      <a:tailEnd type="none" w="med" len="med"/>
+                    </a:lnL>
+                    <a:lnR w="12700" cap="flat" cmpd="sng" algn="ctr">
+                      <a:solidFill>
+                        <a:schemeClr val="tx1"/>
+                      </a:solidFill>
+                      <a:prstDash val="solid"/>
+                      <a:round/>
+                      <a:headEnd type="none" w="med" len="med"/>
+                      <a:tailEnd type="none" w="med" len="med"/>
+                    </a:lnR>
+                    <a:lnT w="12700" cap="flat" cmpd="sng" algn="ctr">
+                      <a:solidFill>
+                        <a:schemeClr val="tx1"/>
+                      </a:solidFill>
+                      <a:prstDash val="solid"/>
+                      <a:round/>
+                      <a:headEnd type="none" w="med" len="med"/>
+                      <a:tailEnd type="none" w="med" len="med"/>
+                    </a:lnT>
+                    <a:lnB w="12700" cap="flat" cmpd="sng" algn="ctr">
+                      <a:solidFill>
+                        <a:schemeClr val="tx1"/>
+                      </a:solidFill>
+                      <a:prstDash val="solid"/>
+                      <a:round/>
+                      <a:headEnd type="none" w="med" len="med"/>
+                      <a:tailEnd type="none" w="med" len="med"/>
+                    </a:lnB>
+                    <a:lnTlToBr w="12700" cmpd="sng">
+                      <a:noFill/>
+                      <a:prstDash val="solid"/>
+                    </a:lnTlToBr>
+                    <a:lnBlToTr w="12700" cmpd="sng">
+                      <a:noFill/>
+                      <a:prstDash val="solid"/>
+                    </a:lnBlToTr>
+                    <a:solidFill>
+                      <a:schemeClr val="tx1">
+                        <a:lumMod val="50000"/>
+                      </a:schemeClr>
+                    </a:solidFill>
+                  </a:tcPr>
+                </a:tc>
+                <a:tc hMerge="1">
+                  <a:txBody>
+                    <a:bodyPr/>
+                    <a:lstStyle/>
+                    <a:p>
+                      <a:endParaRPr lang="en-US"/>
+                    </a:p>
+                  </a:txBody>
+                  <a:tcPr/>
+                </a:tc>
+                <a:tc hMerge="1">
+                  <a:txBody>
+                    <a:bodyPr/>
+                    <a:lstStyle/>
+                    <a:p>
+                      <a:endParaRPr lang="en-US"/>
+                    </a:p>
+                  </a:txBody>
+                  <a:tcPr/>
+                </a:tc>
+                <a:tc gridSpan="3">
+                  <a:txBody>
+                    <a:bodyPr/>
+                    <a:lstStyle/>
+                    <a:p>
+                      <a:pPr algn="ctr"/>
+                      <a:r>
+                        <a:rPr lang="en-US" b="0" dirty="0" smtClean="0">
+                          <a:solidFill>
+                            <a:schemeClr val="bg1"/>
+                          </a:solidFill>
+                        </a:rPr>
+                        <a:t>0x20</a:t>
+                      </a:r>
+                      <a:endParaRPr lang="en-US" b="0" dirty="0" smtClean="0">
+                        <a:solidFill>
+                          <a:schemeClr val="bg1"/>
+                        </a:solidFill>
+                      </a:endParaRPr>
+                    </a:p>
+                  </a:txBody>
+                  <a:tcPr>
+                    <a:lnL w="12700" cap="flat" cmpd="sng" algn="ctr">
+                      <a:solidFill>
+                        <a:schemeClr val="tx1"/>
+                      </a:solidFill>
+                      <a:prstDash val="solid"/>
+                      <a:round/>
+                      <a:headEnd type="none" w="med" len="med"/>
+                      <a:tailEnd type="none" w="med" len="med"/>
+                    </a:lnL>
+                    <a:lnR w="12700" cap="flat" cmpd="sng" algn="ctr">
+                      <a:solidFill>
+                        <a:schemeClr val="tx1"/>
+                      </a:solidFill>
+                      <a:prstDash val="solid"/>
+                      <a:round/>
+                      <a:headEnd type="none" w="med" len="med"/>
+                      <a:tailEnd type="none" w="med" len="med"/>
+                    </a:lnR>
+                    <a:lnT w="12700" cap="flat" cmpd="sng" algn="ctr">
+                      <a:solidFill>
+                        <a:schemeClr val="tx1"/>
+                      </a:solidFill>
+                      <a:prstDash val="solid"/>
+                      <a:round/>
+                      <a:headEnd type="none" w="med" len="med"/>
+                      <a:tailEnd type="none" w="med" len="med"/>
+                    </a:lnT>
+                    <a:lnB w="12700" cap="flat" cmpd="sng" algn="ctr">
+                      <a:solidFill>
+                        <a:schemeClr val="tx1"/>
+                      </a:solidFill>
+                      <a:prstDash val="solid"/>
+                      <a:round/>
+                      <a:headEnd type="none" w="med" len="med"/>
+                      <a:tailEnd type="none" w="med" len="med"/>
+                    </a:lnB>
+                    <a:lnTlToBr w="12700" cmpd="sng">
+                      <a:noFill/>
+                      <a:prstDash val="solid"/>
+                    </a:lnTlToBr>
+                    <a:lnBlToTr w="12700" cmpd="sng">
+                      <a:noFill/>
+                      <a:prstDash val="solid"/>
+                    </a:lnBlToTr>
+                    <a:solidFill>
+                      <a:schemeClr val="tx1">
+                        <a:lumMod val="50000"/>
+                      </a:schemeClr>
+                    </a:solidFill>
+                  </a:tcPr>
+                </a:tc>
+                <a:tc hMerge="1">
+                  <a:txBody>
+                    <a:bodyPr/>
+                    <a:lstStyle/>
+                    <a:p>
+                      <a:endParaRPr lang="en-US"/>
+                    </a:p>
+                  </a:txBody>
+                  <a:tcPr/>
+                </a:tc>
+                <a:tc hMerge="1">
+                  <a:txBody>
+                    <a:bodyPr/>
+                    <a:lstStyle/>
+                    <a:p>
+                      <a:endParaRPr lang="en-US"/>
+                    </a:p>
+                  </a:txBody>
+                  <a:tcPr/>
+                </a:tc>
+                <a:tc gridSpan="3">
+                  <a:txBody>
+                    <a:bodyPr/>
+                    <a:lstStyle/>
+                    <a:p>
+                      <a:pPr algn="ctr"/>
+                      <a:r>
+                        <a:rPr lang="en-US" b="0" dirty="0" smtClean="0">
+                          <a:solidFill>
+                            <a:schemeClr val="bg1"/>
+                          </a:solidFill>
+                        </a:rPr>
+                        <a:t>0x...n</a:t>
+                      </a:r>
+                      <a:r>
+                        <a:rPr lang="en-US" b="0" baseline="0" dirty="0" smtClean="0">
+                          <a:solidFill>
+                            <a:schemeClr val="bg1"/>
+                          </a:solidFill>
+                        </a:rPr>
+                        <a:t> x 20</a:t>
+                      </a:r>
+                      <a:endParaRPr lang="en-US" b="0" dirty="0" smtClean="0">
+                        <a:solidFill>
+                          <a:schemeClr val="bg1"/>
+                        </a:solidFill>
+                      </a:endParaRPr>
+                    </a:p>
+                  </a:txBody>
+                  <a:tcPr>
+                    <a:lnL w="12700" cap="flat" cmpd="sng" algn="ctr">
+                      <a:solidFill>
+                        <a:schemeClr val="tx1"/>
+                      </a:solidFill>
+                      <a:prstDash val="solid"/>
+                      <a:round/>
+                      <a:headEnd type="none" w="med" len="med"/>
+                      <a:tailEnd type="none" w="med" len="med"/>
+                    </a:lnL>
+                    <a:lnR w="12700" cap="flat" cmpd="sng" algn="ctr">
+                      <a:solidFill>
+                        <a:schemeClr val="tx1"/>
+                      </a:solidFill>
+                      <a:prstDash val="solid"/>
+                      <a:round/>
+                      <a:headEnd type="none" w="med" len="med"/>
+                      <a:tailEnd type="none" w="med" len="med"/>
+                    </a:lnR>
+                    <a:lnT w="12700" cap="flat" cmpd="sng" algn="ctr">
+                      <a:solidFill>
+                        <a:schemeClr val="tx1"/>
+                      </a:solidFill>
+                      <a:prstDash val="solid"/>
+                      <a:round/>
+                      <a:headEnd type="none" w="med" len="med"/>
+                      <a:tailEnd type="none" w="med" len="med"/>
+                    </a:lnT>
+                    <a:lnB w="12700" cap="flat" cmpd="sng" algn="ctr">
+                      <a:solidFill>
+                        <a:schemeClr val="tx1"/>
+                      </a:solidFill>
+                      <a:prstDash val="solid"/>
+                      <a:round/>
+                      <a:headEnd type="none" w="med" len="med"/>
+                      <a:tailEnd type="none" w="med" len="med"/>
+                    </a:lnB>
+                    <a:lnTlToBr w="12700" cmpd="sng">
+                      <a:noFill/>
+                      <a:prstDash val="solid"/>
+                    </a:lnTlToBr>
+                    <a:lnBlToTr w="12700" cmpd="sng">
+                      <a:noFill/>
+                      <a:prstDash val="solid"/>
+                    </a:lnBlToTr>
+                    <a:solidFill>
+                      <a:schemeClr val="tx1">
+                        <a:lumMod val="50000"/>
+                      </a:schemeClr>
+                    </a:solidFill>
+                  </a:tcPr>
+                </a:tc>
+                <a:tc hMerge="1">
+                  <a:txBody>
+                    <a:bodyPr/>
+                    <a:lstStyle/>
+                    <a:p>
+                      <a:endParaRPr lang="en-US"/>
+                    </a:p>
+                  </a:txBody>
+                  <a:tcPr/>
+                </a:tc>
+                <a:tc hMerge="1">
+                  <a:txBody>
+                    <a:bodyPr/>
+                    <a:lstStyle/>
+                    <a:p>
+                      <a:endParaRPr lang="en-US"/>
+                    </a:p>
+                  </a:txBody>
+                  <a:tcPr/>
+                </a:tc>
+              </a:tr>
               <a:tr h="370840">
                 <a:tc gridSpan="3">
                   <a:txBody>
@@ -12780,46 +13966,6 @@
           </a:graphicData>
         </a:graphic>
       </p:graphicFrame>
-      <p:sp>
-        <p:nvSpPr>
-          <p:cNvPr id="10" name="Down Arrow 9"/>
-          <p:cNvSpPr/>
-          <p:nvPr/>
-        </p:nvSpPr>
-        <p:spPr>
-          <a:xfrm>
-            <a:off x="5537200" y="3649133"/>
-            <a:ext cx="558800" cy="702733"/>
-          </a:xfrm>
-          <a:prstGeom prst="downArrow">
-            <a:avLst/>
-          </a:prstGeom>
-        </p:spPr>
-        <p:style>
-          <a:lnRef idx="2">
-            <a:schemeClr val="accent1">
-              <a:shade val="50000"/>
-            </a:schemeClr>
-          </a:lnRef>
-          <a:fillRef idx="1">
-            <a:schemeClr val="accent1"/>
-          </a:fillRef>
-          <a:effectRef idx="0">
-            <a:schemeClr val="accent1"/>
-          </a:effectRef>
-          <a:fontRef idx="minor">
-            <a:schemeClr val="lt1"/>
-          </a:fontRef>
-        </p:style>
-        <p:txBody>
-          <a:bodyPr rtlCol="0" anchor="ctr"/>
-          <a:lstStyle/>
-          <a:p>
-            <a:pPr algn="ctr"/>
-            <a:endParaRPr lang="en-US"/>
-          </a:p>
-        </p:txBody>
-      </p:sp>
     </p:spTree>
     <p:extLst>
       <p:ext uri="{BB962C8B-B14F-4D97-AF65-F5344CB8AC3E}">

</xml_diff>

<commit_message>
Modified   ParadigmSample/ParadigmSample.vcxproj Modified   Presentation/Presentation.pptx
</commit_message>
<xml_diff>
--- a/Presentation/Presentation.pptx
+++ b/Presentation/Presentation.pptx
@@ -902,6 +902,13 @@
         </dgm:presLayoutVars>
       </dgm:prSet>
       <dgm:spPr/>
+      <dgm:t>
+        <a:bodyPr/>
+        <a:lstStyle/>
+        <a:p>
+          <a:endParaRPr lang="en-US"/>
+        </a:p>
+      </dgm:t>
     </dgm:pt>
   </dgm:ptLst>
   <dgm:cxnLst>
@@ -4989,6 +4996,10 @@
               <a:rPr lang="en-US" sz="4400" dirty="0"/>
               <a:t>Approach to</a:t>
             </a:r>
+            <a:r>
+              <a:rPr lang="en-US" dirty="0"/>
+              <a:t/>
+            </a:r>
             <a:br>
               <a:rPr lang="en-US" dirty="0"/>
             </a:br>
@@ -5112,13 +5123,13 @@
           <a:p>
             <a:r>
               <a:rPr lang="en-US" dirty="0"/>
-              <a:t>If you don’t understand the data you don’t understand the problem.”</a:t>
+              <a:t>If you don’t understand the data, you don’t understand the problem.”</a:t>
             </a:r>
           </a:p>
           <a:p>
             <a:r>
               <a:rPr lang="en-US" dirty="0"/>
-              <a:t>Different problems require different solutions.</a:t>
+              <a:t>Different problems, require different solutions.</a:t>
             </a:r>
           </a:p>
           <a:p>
@@ -5613,21 +5624,21 @@
                 <a:gridCol w="1162756">
                   <a:extLst>
                     <a:ext uri="{9D8B030D-6E8A-4147-A177-3AD203B41FA5}">
-                      <a16:colId xmlns:a16="http://schemas.microsoft.com/office/drawing/2014/main" val="20000"/>
+                      <a16:colId xmlns:a16="http://schemas.microsoft.com/office/drawing/2014/main" xmlns="" val="20000"/>
                     </a:ext>
                   </a:extLst>
                 </a:gridCol>
                 <a:gridCol w="1162756">
                   <a:extLst>
                     <a:ext uri="{9D8B030D-6E8A-4147-A177-3AD203B41FA5}">
-                      <a16:colId xmlns:a16="http://schemas.microsoft.com/office/drawing/2014/main" val="20001"/>
+                      <a16:colId xmlns:a16="http://schemas.microsoft.com/office/drawing/2014/main" xmlns="" val="20001"/>
                     </a:ext>
                   </a:extLst>
                 </a:gridCol>
                 <a:gridCol w="1162756">
                   <a:extLst>
                     <a:ext uri="{9D8B030D-6E8A-4147-A177-3AD203B41FA5}">
-                      <a16:colId xmlns:a16="http://schemas.microsoft.com/office/drawing/2014/main" val="20002"/>
+                      <a16:colId xmlns:a16="http://schemas.microsoft.com/office/drawing/2014/main" xmlns="" val="20002"/>
                     </a:ext>
                   </a:extLst>
                 </a:gridCol>
@@ -5723,7 +5734,7 @@
                 </a:tc>
                 <a:extLst>
                   <a:ext uri="{0D108BD9-81ED-4DB2-BD59-A6C34878D82A}">
-                    <a16:rowId xmlns:a16="http://schemas.microsoft.com/office/drawing/2014/main" val="10000"/>
+                    <a16:rowId xmlns:a16="http://schemas.microsoft.com/office/drawing/2014/main" xmlns="" val="10000"/>
                   </a:ext>
                 </a:extLst>
               </a:tr>
@@ -5918,7 +5929,7 @@
                 </a:tc>
                 <a:extLst>
                   <a:ext uri="{0D108BD9-81ED-4DB2-BD59-A6C34878D82A}">
-                    <a16:rowId xmlns:a16="http://schemas.microsoft.com/office/drawing/2014/main" val="10001"/>
+                    <a16:rowId xmlns:a16="http://schemas.microsoft.com/office/drawing/2014/main" xmlns="" val="10001"/>
                   </a:ext>
                 </a:extLst>
               </a:tr>
@@ -6141,7 +6152,7 @@
                 </a:tc>
                 <a:extLst>
                   <a:ext uri="{0D108BD9-81ED-4DB2-BD59-A6C34878D82A}">
-                    <a16:rowId xmlns:a16="http://schemas.microsoft.com/office/drawing/2014/main" val="10002"/>
+                    <a16:rowId xmlns:a16="http://schemas.microsoft.com/office/drawing/2014/main" xmlns="" val="10002"/>
                   </a:ext>
                 </a:extLst>
               </a:tr>
@@ -6337,7 +6348,7 @@
                 </a:tc>
                 <a:extLst>
                   <a:ext uri="{0D108BD9-81ED-4DB2-BD59-A6C34878D82A}">
-                    <a16:rowId xmlns:a16="http://schemas.microsoft.com/office/drawing/2014/main" val="10003"/>
+                    <a16:rowId xmlns:a16="http://schemas.microsoft.com/office/drawing/2014/main" xmlns="" val="10003"/>
                   </a:ext>
                 </a:extLst>
               </a:tr>
@@ -6373,21 +6384,21 @@
                 <a:gridCol w="1162756">
                   <a:extLst>
                     <a:ext uri="{9D8B030D-6E8A-4147-A177-3AD203B41FA5}">
-                      <a16:colId xmlns:a16="http://schemas.microsoft.com/office/drawing/2014/main" val="20000"/>
+                      <a16:colId xmlns:a16="http://schemas.microsoft.com/office/drawing/2014/main" xmlns="" val="20000"/>
                     </a:ext>
                   </a:extLst>
                 </a:gridCol>
                 <a:gridCol w="1162756">
                   <a:extLst>
                     <a:ext uri="{9D8B030D-6E8A-4147-A177-3AD203B41FA5}">
-                      <a16:colId xmlns:a16="http://schemas.microsoft.com/office/drawing/2014/main" val="20001"/>
+                      <a16:colId xmlns:a16="http://schemas.microsoft.com/office/drawing/2014/main" xmlns="" val="20001"/>
                     </a:ext>
                   </a:extLst>
                 </a:gridCol>
                 <a:gridCol w="1162756">
                   <a:extLst>
                     <a:ext uri="{9D8B030D-6E8A-4147-A177-3AD203B41FA5}">
-                      <a16:colId xmlns:a16="http://schemas.microsoft.com/office/drawing/2014/main" val="20002"/>
+                      <a16:colId xmlns:a16="http://schemas.microsoft.com/office/drawing/2014/main" xmlns="" val="20002"/>
                     </a:ext>
                   </a:extLst>
                 </a:gridCol>
@@ -6483,7 +6494,7 @@
                 </a:tc>
                 <a:extLst>
                   <a:ext uri="{0D108BD9-81ED-4DB2-BD59-A6C34878D82A}">
-                    <a16:rowId xmlns:a16="http://schemas.microsoft.com/office/drawing/2014/main" val="10000"/>
+                    <a16:rowId xmlns:a16="http://schemas.microsoft.com/office/drawing/2014/main" xmlns="" val="10000"/>
                   </a:ext>
                 </a:extLst>
               </a:tr>
@@ -6678,7 +6689,7 @@
                 </a:tc>
                 <a:extLst>
                   <a:ext uri="{0D108BD9-81ED-4DB2-BD59-A6C34878D82A}">
-                    <a16:rowId xmlns:a16="http://schemas.microsoft.com/office/drawing/2014/main" val="10001"/>
+                    <a16:rowId xmlns:a16="http://schemas.microsoft.com/office/drawing/2014/main" xmlns="" val="10001"/>
                   </a:ext>
                 </a:extLst>
               </a:tr>
@@ -6901,7 +6912,7 @@
                 </a:tc>
                 <a:extLst>
                   <a:ext uri="{0D108BD9-81ED-4DB2-BD59-A6C34878D82A}">
-                    <a16:rowId xmlns:a16="http://schemas.microsoft.com/office/drawing/2014/main" val="10002"/>
+                    <a16:rowId xmlns:a16="http://schemas.microsoft.com/office/drawing/2014/main" xmlns="" val="10002"/>
                   </a:ext>
                 </a:extLst>
               </a:tr>
@@ -7097,7 +7108,7 @@
                 </a:tc>
                 <a:extLst>
                   <a:ext uri="{0D108BD9-81ED-4DB2-BD59-A6C34878D82A}">
-                    <a16:rowId xmlns:a16="http://schemas.microsoft.com/office/drawing/2014/main" val="10003"/>
+                    <a16:rowId xmlns:a16="http://schemas.microsoft.com/office/drawing/2014/main" xmlns="" val="10003"/>
                   </a:ext>
                 </a:extLst>
               </a:tr>
@@ -7133,21 +7144,21 @@
                 <a:gridCol w="1162756">
                   <a:extLst>
                     <a:ext uri="{9D8B030D-6E8A-4147-A177-3AD203B41FA5}">
-                      <a16:colId xmlns:a16="http://schemas.microsoft.com/office/drawing/2014/main" val="20000"/>
+                      <a16:colId xmlns:a16="http://schemas.microsoft.com/office/drawing/2014/main" xmlns="" val="20000"/>
                     </a:ext>
                   </a:extLst>
                 </a:gridCol>
                 <a:gridCol w="1162756">
                   <a:extLst>
                     <a:ext uri="{9D8B030D-6E8A-4147-A177-3AD203B41FA5}">
-                      <a16:colId xmlns:a16="http://schemas.microsoft.com/office/drawing/2014/main" val="20001"/>
+                      <a16:colId xmlns:a16="http://schemas.microsoft.com/office/drawing/2014/main" xmlns="" val="20001"/>
                     </a:ext>
                   </a:extLst>
                 </a:gridCol>
                 <a:gridCol w="1162756">
                   <a:extLst>
                     <a:ext uri="{9D8B030D-6E8A-4147-A177-3AD203B41FA5}">
-                      <a16:colId xmlns:a16="http://schemas.microsoft.com/office/drawing/2014/main" val="20002"/>
+                      <a16:colId xmlns:a16="http://schemas.microsoft.com/office/drawing/2014/main" xmlns="" val="20002"/>
                     </a:ext>
                   </a:extLst>
                 </a:gridCol>
@@ -7243,7 +7254,7 @@
                 </a:tc>
                 <a:extLst>
                   <a:ext uri="{0D108BD9-81ED-4DB2-BD59-A6C34878D82A}">
-                    <a16:rowId xmlns:a16="http://schemas.microsoft.com/office/drawing/2014/main" val="10000"/>
+                    <a16:rowId xmlns:a16="http://schemas.microsoft.com/office/drawing/2014/main" xmlns="" val="10000"/>
                   </a:ext>
                 </a:extLst>
               </a:tr>
@@ -7438,7 +7449,7 @@
                 </a:tc>
                 <a:extLst>
                   <a:ext uri="{0D108BD9-81ED-4DB2-BD59-A6C34878D82A}">
-                    <a16:rowId xmlns:a16="http://schemas.microsoft.com/office/drawing/2014/main" val="10001"/>
+                    <a16:rowId xmlns:a16="http://schemas.microsoft.com/office/drawing/2014/main" xmlns="" val="10001"/>
                   </a:ext>
                 </a:extLst>
               </a:tr>
@@ -7661,7 +7672,7 @@
                 </a:tc>
                 <a:extLst>
                   <a:ext uri="{0D108BD9-81ED-4DB2-BD59-A6C34878D82A}">
-                    <a16:rowId xmlns:a16="http://schemas.microsoft.com/office/drawing/2014/main" val="10002"/>
+                    <a16:rowId xmlns:a16="http://schemas.microsoft.com/office/drawing/2014/main" xmlns="" val="10002"/>
                   </a:ext>
                 </a:extLst>
               </a:tr>
@@ -7857,7 +7868,7 @@
                 </a:tc>
                 <a:extLst>
                   <a:ext uri="{0D108BD9-81ED-4DB2-BD59-A6C34878D82A}">
-                    <a16:rowId xmlns:a16="http://schemas.microsoft.com/office/drawing/2014/main" val="10003"/>
+                    <a16:rowId xmlns:a16="http://schemas.microsoft.com/office/drawing/2014/main" xmlns="" val="10003"/>
                   </a:ext>
                 </a:extLst>
               </a:tr>
@@ -8134,63 +8145,63 @@
                 <a:gridCol w="1162756">
                   <a:extLst>
                     <a:ext uri="{9D8B030D-6E8A-4147-A177-3AD203B41FA5}">
-                      <a16:colId xmlns:a16="http://schemas.microsoft.com/office/drawing/2014/main" val="20000"/>
+                      <a16:colId xmlns:a16="http://schemas.microsoft.com/office/drawing/2014/main" xmlns="" val="20000"/>
                     </a:ext>
                   </a:extLst>
                 </a:gridCol>
                 <a:gridCol w="1162756">
                   <a:extLst>
                     <a:ext uri="{9D8B030D-6E8A-4147-A177-3AD203B41FA5}">
-                      <a16:colId xmlns:a16="http://schemas.microsoft.com/office/drawing/2014/main" val="20001"/>
+                      <a16:colId xmlns:a16="http://schemas.microsoft.com/office/drawing/2014/main" xmlns="" val="20001"/>
                     </a:ext>
                   </a:extLst>
                 </a:gridCol>
                 <a:gridCol w="1162756">
                   <a:extLst>
                     <a:ext uri="{9D8B030D-6E8A-4147-A177-3AD203B41FA5}">
-                      <a16:colId xmlns:a16="http://schemas.microsoft.com/office/drawing/2014/main" val="20002"/>
+                      <a16:colId xmlns:a16="http://schemas.microsoft.com/office/drawing/2014/main" xmlns="" val="20002"/>
                     </a:ext>
                   </a:extLst>
                 </a:gridCol>
                 <a:gridCol w="1162756">
                   <a:extLst>
                     <a:ext uri="{9D8B030D-6E8A-4147-A177-3AD203B41FA5}">
-                      <a16:colId xmlns:a16="http://schemas.microsoft.com/office/drawing/2014/main" val="20003"/>
+                      <a16:colId xmlns:a16="http://schemas.microsoft.com/office/drawing/2014/main" xmlns="" val="20003"/>
                     </a:ext>
                   </a:extLst>
                 </a:gridCol>
                 <a:gridCol w="1162756">
                   <a:extLst>
                     <a:ext uri="{9D8B030D-6E8A-4147-A177-3AD203B41FA5}">
-                      <a16:colId xmlns:a16="http://schemas.microsoft.com/office/drawing/2014/main" val="20004"/>
+                      <a16:colId xmlns:a16="http://schemas.microsoft.com/office/drawing/2014/main" xmlns="" val="20004"/>
                     </a:ext>
                   </a:extLst>
                 </a:gridCol>
                 <a:gridCol w="1162756">
                   <a:extLst>
                     <a:ext uri="{9D8B030D-6E8A-4147-A177-3AD203B41FA5}">
-                      <a16:colId xmlns:a16="http://schemas.microsoft.com/office/drawing/2014/main" val="20005"/>
+                      <a16:colId xmlns:a16="http://schemas.microsoft.com/office/drawing/2014/main" xmlns="" val="20005"/>
                     </a:ext>
                   </a:extLst>
                 </a:gridCol>
                 <a:gridCol w="1162756">
                   <a:extLst>
                     <a:ext uri="{9D8B030D-6E8A-4147-A177-3AD203B41FA5}">
-                      <a16:colId xmlns:a16="http://schemas.microsoft.com/office/drawing/2014/main" val="20006"/>
+                      <a16:colId xmlns:a16="http://schemas.microsoft.com/office/drawing/2014/main" xmlns="" val="20006"/>
                     </a:ext>
                   </a:extLst>
                 </a:gridCol>
                 <a:gridCol w="1162756">
                   <a:extLst>
                     <a:ext uri="{9D8B030D-6E8A-4147-A177-3AD203B41FA5}">
-                      <a16:colId xmlns:a16="http://schemas.microsoft.com/office/drawing/2014/main" val="20007"/>
+                      <a16:colId xmlns:a16="http://schemas.microsoft.com/office/drawing/2014/main" xmlns="" val="20007"/>
                     </a:ext>
                   </a:extLst>
                 </a:gridCol>
                 <a:gridCol w="1162756">
                   <a:extLst>
                     <a:ext uri="{9D8B030D-6E8A-4147-A177-3AD203B41FA5}">
-                      <a16:colId xmlns:a16="http://schemas.microsoft.com/office/drawing/2014/main" val="20008"/>
+                      <a16:colId xmlns:a16="http://schemas.microsoft.com/office/drawing/2014/main" xmlns="" val="20008"/>
                     </a:ext>
                   </a:extLst>
                 </a:gridCol>
@@ -8475,7 +8486,7 @@
                 </a:tc>
                 <a:extLst>
                   <a:ext uri="{0D108BD9-81ED-4DB2-BD59-A6C34878D82A}">
-                    <a16:rowId xmlns:a16="http://schemas.microsoft.com/office/drawing/2014/main" val="10000"/>
+                    <a16:rowId xmlns:a16="http://schemas.microsoft.com/office/drawing/2014/main" xmlns="" val="10000"/>
                   </a:ext>
                 </a:extLst>
               </a:tr>
@@ -9046,7 +9057,7 @@
                 </a:tc>
                 <a:extLst>
                   <a:ext uri="{0D108BD9-81ED-4DB2-BD59-A6C34878D82A}">
-                    <a16:rowId xmlns:a16="http://schemas.microsoft.com/office/drawing/2014/main" val="10001"/>
+                    <a16:rowId xmlns:a16="http://schemas.microsoft.com/office/drawing/2014/main" xmlns="" val="10001"/>
                   </a:ext>
                 </a:extLst>
               </a:tr>
@@ -9685,7 +9696,7 @@
                 </a:tc>
                 <a:extLst>
                   <a:ext uri="{0D108BD9-81ED-4DB2-BD59-A6C34878D82A}">
-                    <a16:rowId xmlns:a16="http://schemas.microsoft.com/office/drawing/2014/main" val="10002"/>
+                    <a16:rowId xmlns:a16="http://schemas.microsoft.com/office/drawing/2014/main" xmlns="" val="10002"/>
                   </a:ext>
                 </a:extLst>
               </a:tr>
@@ -10262,7 +10273,7 @@
                 </a:tc>
                 <a:extLst>
                   <a:ext uri="{0D108BD9-81ED-4DB2-BD59-A6C34878D82A}">
-                    <a16:rowId xmlns:a16="http://schemas.microsoft.com/office/drawing/2014/main" val="10003"/>
+                    <a16:rowId xmlns:a16="http://schemas.microsoft.com/office/drawing/2014/main" xmlns="" val="10003"/>
                   </a:ext>
                 </a:extLst>
               </a:tr>
@@ -10364,8 +10375,12 @@
           </a:p>
           <a:p>
             <a:r>
+              <a:rPr lang="en-US" smtClean="0"/>
+              <a:t>So, </a:t>
+            </a:r>
+            <a:r>
               <a:rPr lang="en-US" dirty="0"/>
-              <a:t>So what we have to do?</a:t>
+              <a:t>what we have to do?</a:t>
             </a:r>
           </a:p>
         </p:txBody>
@@ -10600,49 +10615,49 @@
                 <a:gridCol w="1162756">
                   <a:extLst>
                     <a:ext uri="{9D8B030D-6E8A-4147-A177-3AD203B41FA5}">
-                      <a16:colId xmlns:a16="http://schemas.microsoft.com/office/drawing/2014/main" val="20000"/>
+                      <a16:colId xmlns:a16="http://schemas.microsoft.com/office/drawing/2014/main" xmlns="" val="20000"/>
                     </a:ext>
                   </a:extLst>
                 </a:gridCol>
                 <a:gridCol w="1162756">
                   <a:extLst>
                     <a:ext uri="{9D8B030D-6E8A-4147-A177-3AD203B41FA5}">
-                      <a16:colId xmlns:a16="http://schemas.microsoft.com/office/drawing/2014/main" val="20001"/>
+                      <a16:colId xmlns:a16="http://schemas.microsoft.com/office/drawing/2014/main" xmlns="" val="20001"/>
                     </a:ext>
                   </a:extLst>
                 </a:gridCol>
                 <a:gridCol w="1162756">
                   <a:extLst>
                     <a:ext uri="{9D8B030D-6E8A-4147-A177-3AD203B41FA5}">
-                      <a16:colId xmlns:a16="http://schemas.microsoft.com/office/drawing/2014/main" val="20002"/>
+                      <a16:colId xmlns:a16="http://schemas.microsoft.com/office/drawing/2014/main" xmlns="" val="20002"/>
                     </a:ext>
                   </a:extLst>
                 </a:gridCol>
                 <a:gridCol w="1162756">
                   <a:extLst>
                     <a:ext uri="{9D8B030D-6E8A-4147-A177-3AD203B41FA5}">
-                      <a16:colId xmlns:a16="http://schemas.microsoft.com/office/drawing/2014/main" val="20003"/>
+                      <a16:colId xmlns:a16="http://schemas.microsoft.com/office/drawing/2014/main" xmlns="" val="20003"/>
                     </a:ext>
                   </a:extLst>
                 </a:gridCol>
                 <a:gridCol w="1162756">
                   <a:extLst>
                     <a:ext uri="{9D8B030D-6E8A-4147-A177-3AD203B41FA5}">
-                      <a16:colId xmlns:a16="http://schemas.microsoft.com/office/drawing/2014/main" val="20004"/>
+                      <a16:colId xmlns:a16="http://schemas.microsoft.com/office/drawing/2014/main" xmlns="" val="20004"/>
                     </a:ext>
                   </a:extLst>
                 </a:gridCol>
                 <a:gridCol w="1162756">
                   <a:extLst>
                     <a:ext uri="{9D8B030D-6E8A-4147-A177-3AD203B41FA5}">
-                      <a16:colId xmlns:a16="http://schemas.microsoft.com/office/drawing/2014/main" val="20005"/>
+                      <a16:colId xmlns:a16="http://schemas.microsoft.com/office/drawing/2014/main" xmlns="" val="20005"/>
                     </a:ext>
                   </a:extLst>
                 </a:gridCol>
                 <a:gridCol w="1162756">
                   <a:extLst>
                     <a:ext uri="{9D8B030D-6E8A-4147-A177-3AD203B41FA5}">
-                      <a16:colId xmlns:a16="http://schemas.microsoft.com/office/drawing/2014/main" val="20006"/>
+                      <a16:colId xmlns:a16="http://schemas.microsoft.com/office/drawing/2014/main" xmlns="" val="20006"/>
                     </a:ext>
                   </a:extLst>
                 </a:gridCol>
@@ -11149,7 +11164,7 @@
                 </a:tc>
                 <a:extLst>
                   <a:ext uri="{0D108BD9-81ED-4DB2-BD59-A6C34878D82A}">
-                    <a16:rowId xmlns:a16="http://schemas.microsoft.com/office/drawing/2014/main" val="10000"/>
+                    <a16:rowId xmlns:a16="http://schemas.microsoft.com/office/drawing/2014/main" xmlns="" val="10000"/>
                   </a:ext>
                 </a:extLst>
               </a:tr>
@@ -11627,7 +11642,7 @@
                 </a:tc>
                 <a:extLst>
                   <a:ext uri="{0D108BD9-81ED-4DB2-BD59-A6C34878D82A}">
-                    <a16:rowId xmlns:a16="http://schemas.microsoft.com/office/drawing/2014/main" val="10001"/>
+                    <a16:rowId xmlns:a16="http://schemas.microsoft.com/office/drawing/2014/main" xmlns="" val="10001"/>
                   </a:ext>
                 </a:extLst>
               </a:tr>
@@ -11703,63 +11718,63 @@
                 <a:gridCol w="1162756">
                   <a:extLst>
                     <a:ext uri="{9D8B030D-6E8A-4147-A177-3AD203B41FA5}">
-                      <a16:colId xmlns:a16="http://schemas.microsoft.com/office/drawing/2014/main" val="20000"/>
+                      <a16:colId xmlns:a16="http://schemas.microsoft.com/office/drawing/2014/main" xmlns="" val="20000"/>
                     </a:ext>
                   </a:extLst>
                 </a:gridCol>
                 <a:gridCol w="1162756">
                   <a:extLst>
                     <a:ext uri="{9D8B030D-6E8A-4147-A177-3AD203B41FA5}">
-                      <a16:colId xmlns:a16="http://schemas.microsoft.com/office/drawing/2014/main" val="20001"/>
+                      <a16:colId xmlns:a16="http://schemas.microsoft.com/office/drawing/2014/main" xmlns="" val="20001"/>
                     </a:ext>
                   </a:extLst>
                 </a:gridCol>
                 <a:gridCol w="1162756">
                   <a:extLst>
                     <a:ext uri="{9D8B030D-6E8A-4147-A177-3AD203B41FA5}">
-                      <a16:colId xmlns:a16="http://schemas.microsoft.com/office/drawing/2014/main" val="20002"/>
+                      <a16:colId xmlns:a16="http://schemas.microsoft.com/office/drawing/2014/main" xmlns="" val="20002"/>
                     </a:ext>
                   </a:extLst>
                 </a:gridCol>
                 <a:gridCol w="1162756">
                   <a:extLst>
                     <a:ext uri="{9D8B030D-6E8A-4147-A177-3AD203B41FA5}">
-                      <a16:colId xmlns:a16="http://schemas.microsoft.com/office/drawing/2014/main" val="20003"/>
+                      <a16:colId xmlns:a16="http://schemas.microsoft.com/office/drawing/2014/main" xmlns="" val="20003"/>
                     </a:ext>
                   </a:extLst>
                 </a:gridCol>
                 <a:gridCol w="1162756">
                   <a:extLst>
                     <a:ext uri="{9D8B030D-6E8A-4147-A177-3AD203B41FA5}">
-                      <a16:colId xmlns:a16="http://schemas.microsoft.com/office/drawing/2014/main" val="20004"/>
+                      <a16:colId xmlns:a16="http://schemas.microsoft.com/office/drawing/2014/main" xmlns="" val="20004"/>
                     </a:ext>
                   </a:extLst>
                 </a:gridCol>
                 <a:gridCol w="1162756">
                   <a:extLst>
                     <a:ext uri="{9D8B030D-6E8A-4147-A177-3AD203B41FA5}">
-                      <a16:colId xmlns:a16="http://schemas.microsoft.com/office/drawing/2014/main" val="20005"/>
+                      <a16:colId xmlns:a16="http://schemas.microsoft.com/office/drawing/2014/main" xmlns="" val="20005"/>
                     </a:ext>
                   </a:extLst>
                 </a:gridCol>
                 <a:gridCol w="1162756">
                   <a:extLst>
                     <a:ext uri="{9D8B030D-6E8A-4147-A177-3AD203B41FA5}">
-                      <a16:colId xmlns:a16="http://schemas.microsoft.com/office/drawing/2014/main" val="20006"/>
+                      <a16:colId xmlns:a16="http://schemas.microsoft.com/office/drawing/2014/main" xmlns="" val="20006"/>
                     </a:ext>
                   </a:extLst>
                 </a:gridCol>
                 <a:gridCol w="1162756">
                   <a:extLst>
                     <a:ext uri="{9D8B030D-6E8A-4147-A177-3AD203B41FA5}">
-                      <a16:colId xmlns:a16="http://schemas.microsoft.com/office/drawing/2014/main" val="20007"/>
+                      <a16:colId xmlns:a16="http://schemas.microsoft.com/office/drawing/2014/main" xmlns="" val="20007"/>
                     </a:ext>
                   </a:extLst>
                 </a:gridCol>
                 <a:gridCol w="1162756">
                   <a:extLst>
                     <a:ext uri="{9D8B030D-6E8A-4147-A177-3AD203B41FA5}">
-                      <a16:colId xmlns:a16="http://schemas.microsoft.com/office/drawing/2014/main" val="20008"/>
+                      <a16:colId xmlns:a16="http://schemas.microsoft.com/office/drawing/2014/main" xmlns="" val="20008"/>
                     </a:ext>
                   </a:extLst>
                 </a:gridCol>
@@ -12044,7 +12059,7 @@
                 </a:tc>
                 <a:extLst>
                   <a:ext uri="{0D108BD9-81ED-4DB2-BD59-A6C34878D82A}">
-                    <a16:rowId xmlns:a16="http://schemas.microsoft.com/office/drawing/2014/main" val="10000"/>
+                    <a16:rowId xmlns:a16="http://schemas.microsoft.com/office/drawing/2014/main" xmlns="" val="10000"/>
                   </a:ext>
                 </a:extLst>
               </a:tr>
@@ -12615,7 +12630,7 @@
                 </a:tc>
                 <a:extLst>
                   <a:ext uri="{0D108BD9-81ED-4DB2-BD59-A6C34878D82A}">
-                    <a16:rowId xmlns:a16="http://schemas.microsoft.com/office/drawing/2014/main" val="10001"/>
+                    <a16:rowId xmlns:a16="http://schemas.microsoft.com/office/drawing/2014/main" xmlns="" val="10001"/>
                   </a:ext>
                 </a:extLst>
               </a:tr>
@@ -13254,7 +13269,7 @@
                 </a:tc>
                 <a:extLst>
                   <a:ext uri="{0D108BD9-81ED-4DB2-BD59-A6C34878D82A}">
-                    <a16:rowId xmlns:a16="http://schemas.microsoft.com/office/drawing/2014/main" val="10002"/>
+                    <a16:rowId xmlns:a16="http://schemas.microsoft.com/office/drawing/2014/main" xmlns="" val="10002"/>
                   </a:ext>
                 </a:extLst>
               </a:tr>
@@ -13831,7 +13846,7 @@
                 </a:tc>
                 <a:extLst>
                   <a:ext uri="{0D108BD9-81ED-4DB2-BD59-A6C34878D82A}">
-                    <a16:rowId xmlns:a16="http://schemas.microsoft.com/office/drawing/2014/main" val="10003"/>
+                    <a16:rowId xmlns:a16="http://schemas.microsoft.com/office/drawing/2014/main" xmlns="" val="10003"/>
                   </a:ext>
                 </a:extLst>
               </a:tr>

</xml_diff>